<commit_message>
Layout für Quelle eines verschobenen Schritts
</commit_message>
<xml_diff>
--- a/specifications/specman-layouts.pptx
+++ b/specifications/specman-layouts.pptx
@@ -139,7 +139,7 @@
           <p:cNvPr id="2" name="Titel 1">
             <a:extLst>
               <a:ext uri="{FF2B5EF4-FFF2-40B4-BE49-F238E27FC236}">
-                <a16:creationId xmlns:a16="http://schemas.microsoft.com/office/drawing/2014/main" xmlns="" id="{892C4471-AF22-4801-9B32-1F2C2F95C04F}"/>
+                <a16:creationId xmlns:a16="http://schemas.microsoft.com/office/drawing/2014/main" id="{892C4471-AF22-4801-9B32-1F2C2F95C04F}"/>
               </a:ext>
             </a:extLst>
           </p:cNvPr>
@@ -176,7 +176,7 @@
           <p:cNvPr id="3" name="Untertitel 2">
             <a:extLst>
               <a:ext uri="{FF2B5EF4-FFF2-40B4-BE49-F238E27FC236}">
-                <a16:creationId xmlns:a16="http://schemas.microsoft.com/office/drawing/2014/main" xmlns="" id="{0571F5FF-2D16-4123-BC85-038D10BD8D87}"/>
+                <a16:creationId xmlns:a16="http://schemas.microsoft.com/office/drawing/2014/main" id="{0571F5FF-2D16-4123-BC85-038D10BD8D87}"/>
               </a:ext>
             </a:extLst>
           </p:cNvPr>
@@ -246,7 +246,7 @@
           <p:cNvPr id="4" name="Datumsplatzhalter 3">
             <a:extLst>
               <a:ext uri="{FF2B5EF4-FFF2-40B4-BE49-F238E27FC236}">
-                <a16:creationId xmlns:a16="http://schemas.microsoft.com/office/drawing/2014/main" xmlns="" id="{588453CD-A2DC-454F-86D5-FC96F92CBDD1}"/>
+                <a16:creationId xmlns:a16="http://schemas.microsoft.com/office/drawing/2014/main" id="{588453CD-A2DC-454F-86D5-FC96F92CBDD1}"/>
               </a:ext>
             </a:extLst>
           </p:cNvPr>
@@ -264,7 +264,7 @@
           <a:p>
             <a:fld id="{9D2EA739-B840-41DB-9666-B44BD9009BC9}" type="datetimeFigureOut">
               <a:rPr lang="de-DE" smtClean="0"/>
-              <a:t>11.11.2020</a:t>
+              <a:t>13.11.2020</a:t>
             </a:fld>
             <a:endParaRPr lang="de-DE"/>
           </a:p>
@@ -275,7 +275,7 @@
           <p:cNvPr id="5" name="Fußzeilenplatzhalter 4">
             <a:extLst>
               <a:ext uri="{FF2B5EF4-FFF2-40B4-BE49-F238E27FC236}">
-                <a16:creationId xmlns:a16="http://schemas.microsoft.com/office/drawing/2014/main" xmlns="" id="{FB172634-081C-4F9A-9778-E9D48159BCE9}"/>
+                <a16:creationId xmlns:a16="http://schemas.microsoft.com/office/drawing/2014/main" id="{FB172634-081C-4F9A-9778-E9D48159BCE9}"/>
               </a:ext>
             </a:extLst>
           </p:cNvPr>
@@ -300,7 +300,7 @@
           <p:cNvPr id="6" name="Foliennummernplatzhalter 5">
             <a:extLst>
               <a:ext uri="{FF2B5EF4-FFF2-40B4-BE49-F238E27FC236}">
-                <a16:creationId xmlns:a16="http://schemas.microsoft.com/office/drawing/2014/main" xmlns="" id="{B636E0BA-622B-47D6-B149-6B324D1071DF}"/>
+                <a16:creationId xmlns:a16="http://schemas.microsoft.com/office/drawing/2014/main" id="{B636E0BA-622B-47D6-B149-6B324D1071DF}"/>
               </a:ext>
             </a:extLst>
           </p:cNvPr>
@@ -359,7 +359,7 @@
           <p:cNvPr id="2" name="Titel 1">
             <a:extLst>
               <a:ext uri="{FF2B5EF4-FFF2-40B4-BE49-F238E27FC236}">
-                <a16:creationId xmlns:a16="http://schemas.microsoft.com/office/drawing/2014/main" xmlns="" id="{08FA0A50-5FB4-41A9-AEF4-00AB8E0E7B1A}"/>
+                <a16:creationId xmlns:a16="http://schemas.microsoft.com/office/drawing/2014/main" id="{08FA0A50-5FB4-41A9-AEF4-00AB8E0E7B1A}"/>
               </a:ext>
             </a:extLst>
           </p:cNvPr>
@@ -387,7 +387,7 @@
           <p:cNvPr id="3" name="Vertikaler Textplatzhalter 2">
             <a:extLst>
               <a:ext uri="{FF2B5EF4-FFF2-40B4-BE49-F238E27FC236}">
-                <a16:creationId xmlns:a16="http://schemas.microsoft.com/office/drawing/2014/main" xmlns="" id="{6360A378-D645-43F3-B604-EAD67927329E}"/>
+                <a16:creationId xmlns:a16="http://schemas.microsoft.com/office/drawing/2014/main" id="{6360A378-D645-43F3-B604-EAD67927329E}"/>
               </a:ext>
             </a:extLst>
           </p:cNvPr>
@@ -444,7 +444,7 @@
           <p:cNvPr id="4" name="Datumsplatzhalter 3">
             <a:extLst>
               <a:ext uri="{FF2B5EF4-FFF2-40B4-BE49-F238E27FC236}">
-                <a16:creationId xmlns:a16="http://schemas.microsoft.com/office/drawing/2014/main" xmlns="" id="{84480368-54B9-4111-8E13-E39D902EF6C1}"/>
+                <a16:creationId xmlns:a16="http://schemas.microsoft.com/office/drawing/2014/main" id="{84480368-54B9-4111-8E13-E39D902EF6C1}"/>
               </a:ext>
             </a:extLst>
           </p:cNvPr>
@@ -462,7 +462,7 @@
           <a:p>
             <a:fld id="{9D2EA739-B840-41DB-9666-B44BD9009BC9}" type="datetimeFigureOut">
               <a:rPr lang="de-DE" smtClean="0"/>
-              <a:t>11.11.2020</a:t>
+              <a:t>13.11.2020</a:t>
             </a:fld>
             <a:endParaRPr lang="de-DE"/>
           </a:p>
@@ -473,7 +473,7 @@
           <p:cNvPr id="5" name="Fußzeilenplatzhalter 4">
             <a:extLst>
               <a:ext uri="{FF2B5EF4-FFF2-40B4-BE49-F238E27FC236}">
-                <a16:creationId xmlns:a16="http://schemas.microsoft.com/office/drawing/2014/main" xmlns="" id="{81935A86-05AF-4F67-BFD6-2E10DCE1D86F}"/>
+                <a16:creationId xmlns:a16="http://schemas.microsoft.com/office/drawing/2014/main" id="{81935A86-05AF-4F67-BFD6-2E10DCE1D86F}"/>
               </a:ext>
             </a:extLst>
           </p:cNvPr>
@@ -498,7 +498,7 @@
           <p:cNvPr id="6" name="Foliennummernplatzhalter 5">
             <a:extLst>
               <a:ext uri="{FF2B5EF4-FFF2-40B4-BE49-F238E27FC236}">
-                <a16:creationId xmlns:a16="http://schemas.microsoft.com/office/drawing/2014/main" xmlns="" id="{B33DF355-E83A-4DA1-B7CA-8071CD06F892}"/>
+                <a16:creationId xmlns:a16="http://schemas.microsoft.com/office/drawing/2014/main" id="{B33DF355-E83A-4DA1-B7CA-8071CD06F892}"/>
               </a:ext>
             </a:extLst>
           </p:cNvPr>
@@ -557,7 +557,7 @@
           <p:cNvPr id="2" name="Vertikaler Titel 1">
             <a:extLst>
               <a:ext uri="{FF2B5EF4-FFF2-40B4-BE49-F238E27FC236}">
-                <a16:creationId xmlns:a16="http://schemas.microsoft.com/office/drawing/2014/main" xmlns="" id="{2CA07748-8163-4D8D-A612-2180F2A9D41D}"/>
+                <a16:creationId xmlns:a16="http://schemas.microsoft.com/office/drawing/2014/main" id="{2CA07748-8163-4D8D-A612-2180F2A9D41D}"/>
               </a:ext>
             </a:extLst>
           </p:cNvPr>
@@ -590,7 +590,7 @@
           <p:cNvPr id="3" name="Vertikaler Textplatzhalter 2">
             <a:extLst>
               <a:ext uri="{FF2B5EF4-FFF2-40B4-BE49-F238E27FC236}">
-                <a16:creationId xmlns:a16="http://schemas.microsoft.com/office/drawing/2014/main" xmlns="" id="{533F5A58-0D77-4048-A2F7-BB7166964A5E}"/>
+                <a16:creationId xmlns:a16="http://schemas.microsoft.com/office/drawing/2014/main" id="{533F5A58-0D77-4048-A2F7-BB7166964A5E}"/>
               </a:ext>
             </a:extLst>
           </p:cNvPr>
@@ -652,7 +652,7 @@
           <p:cNvPr id="4" name="Datumsplatzhalter 3">
             <a:extLst>
               <a:ext uri="{FF2B5EF4-FFF2-40B4-BE49-F238E27FC236}">
-                <a16:creationId xmlns:a16="http://schemas.microsoft.com/office/drawing/2014/main" xmlns="" id="{1883AFB6-8D56-4FDC-8285-D7C05C863EB4}"/>
+                <a16:creationId xmlns:a16="http://schemas.microsoft.com/office/drawing/2014/main" id="{1883AFB6-8D56-4FDC-8285-D7C05C863EB4}"/>
               </a:ext>
             </a:extLst>
           </p:cNvPr>
@@ -670,7 +670,7 @@
           <a:p>
             <a:fld id="{9D2EA739-B840-41DB-9666-B44BD9009BC9}" type="datetimeFigureOut">
               <a:rPr lang="de-DE" smtClean="0"/>
-              <a:t>11.11.2020</a:t>
+              <a:t>13.11.2020</a:t>
             </a:fld>
             <a:endParaRPr lang="de-DE"/>
           </a:p>
@@ -681,7 +681,7 @@
           <p:cNvPr id="5" name="Fußzeilenplatzhalter 4">
             <a:extLst>
               <a:ext uri="{FF2B5EF4-FFF2-40B4-BE49-F238E27FC236}">
-                <a16:creationId xmlns:a16="http://schemas.microsoft.com/office/drawing/2014/main" xmlns="" id="{5EAAD323-4DCB-4F5F-B799-1736B5D76EC9}"/>
+                <a16:creationId xmlns:a16="http://schemas.microsoft.com/office/drawing/2014/main" id="{5EAAD323-4DCB-4F5F-B799-1736B5D76EC9}"/>
               </a:ext>
             </a:extLst>
           </p:cNvPr>
@@ -706,7 +706,7 @@
           <p:cNvPr id="6" name="Foliennummernplatzhalter 5">
             <a:extLst>
               <a:ext uri="{FF2B5EF4-FFF2-40B4-BE49-F238E27FC236}">
-                <a16:creationId xmlns:a16="http://schemas.microsoft.com/office/drawing/2014/main" xmlns="" id="{1866EB22-9FB0-4DD8-A7BC-46B323AAB484}"/>
+                <a16:creationId xmlns:a16="http://schemas.microsoft.com/office/drawing/2014/main" id="{1866EB22-9FB0-4DD8-A7BC-46B323AAB484}"/>
               </a:ext>
             </a:extLst>
           </p:cNvPr>
@@ -765,7 +765,7 @@
           <p:cNvPr id="2" name="Titel 1">
             <a:extLst>
               <a:ext uri="{FF2B5EF4-FFF2-40B4-BE49-F238E27FC236}">
-                <a16:creationId xmlns:a16="http://schemas.microsoft.com/office/drawing/2014/main" xmlns="" id="{9A4684C6-263F-4A98-8799-05A6AC6316A6}"/>
+                <a16:creationId xmlns:a16="http://schemas.microsoft.com/office/drawing/2014/main" id="{9A4684C6-263F-4A98-8799-05A6AC6316A6}"/>
               </a:ext>
             </a:extLst>
           </p:cNvPr>
@@ -793,7 +793,7 @@
           <p:cNvPr id="3" name="Inhaltsplatzhalter 2">
             <a:extLst>
               <a:ext uri="{FF2B5EF4-FFF2-40B4-BE49-F238E27FC236}">
-                <a16:creationId xmlns:a16="http://schemas.microsoft.com/office/drawing/2014/main" xmlns="" id="{E7873F0D-3C85-4DC0-9F1C-0B2EA8C5304A}"/>
+                <a16:creationId xmlns:a16="http://schemas.microsoft.com/office/drawing/2014/main" id="{E7873F0D-3C85-4DC0-9F1C-0B2EA8C5304A}"/>
               </a:ext>
             </a:extLst>
           </p:cNvPr>
@@ -850,7 +850,7 @@
           <p:cNvPr id="4" name="Datumsplatzhalter 3">
             <a:extLst>
               <a:ext uri="{FF2B5EF4-FFF2-40B4-BE49-F238E27FC236}">
-                <a16:creationId xmlns:a16="http://schemas.microsoft.com/office/drawing/2014/main" xmlns="" id="{E0652819-7FDD-498D-A895-AF38FB2F3FB1}"/>
+                <a16:creationId xmlns:a16="http://schemas.microsoft.com/office/drawing/2014/main" id="{E0652819-7FDD-498D-A895-AF38FB2F3FB1}"/>
               </a:ext>
             </a:extLst>
           </p:cNvPr>
@@ -868,7 +868,7 @@
           <a:p>
             <a:fld id="{9D2EA739-B840-41DB-9666-B44BD9009BC9}" type="datetimeFigureOut">
               <a:rPr lang="de-DE" smtClean="0"/>
-              <a:t>11.11.2020</a:t>
+              <a:t>13.11.2020</a:t>
             </a:fld>
             <a:endParaRPr lang="de-DE"/>
           </a:p>
@@ -879,7 +879,7 @@
           <p:cNvPr id="5" name="Fußzeilenplatzhalter 4">
             <a:extLst>
               <a:ext uri="{FF2B5EF4-FFF2-40B4-BE49-F238E27FC236}">
-                <a16:creationId xmlns:a16="http://schemas.microsoft.com/office/drawing/2014/main" xmlns="" id="{E53E0644-A4EF-40C6-8FEF-F141F928CC2D}"/>
+                <a16:creationId xmlns:a16="http://schemas.microsoft.com/office/drawing/2014/main" id="{E53E0644-A4EF-40C6-8FEF-F141F928CC2D}"/>
               </a:ext>
             </a:extLst>
           </p:cNvPr>
@@ -904,7 +904,7 @@
           <p:cNvPr id="6" name="Foliennummernplatzhalter 5">
             <a:extLst>
               <a:ext uri="{FF2B5EF4-FFF2-40B4-BE49-F238E27FC236}">
-                <a16:creationId xmlns:a16="http://schemas.microsoft.com/office/drawing/2014/main" xmlns="" id="{326D1CFC-9F22-4647-A8A0-0AB98C9D58A4}"/>
+                <a16:creationId xmlns:a16="http://schemas.microsoft.com/office/drawing/2014/main" id="{326D1CFC-9F22-4647-A8A0-0AB98C9D58A4}"/>
               </a:ext>
             </a:extLst>
           </p:cNvPr>
@@ -963,7 +963,7 @@
           <p:cNvPr id="2" name="Titel 1">
             <a:extLst>
               <a:ext uri="{FF2B5EF4-FFF2-40B4-BE49-F238E27FC236}">
-                <a16:creationId xmlns:a16="http://schemas.microsoft.com/office/drawing/2014/main" xmlns="" id="{49E3CA8F-30B8-47C9-B175-02E424ACD4C9}"/>
+                <a16:creationId xmlns:a16="http://schemas.microsoft.com/office/drawing/2014/main" id="{49E3CA8F-30B8-47C9-B175-02E424ACD4C9}"/>
               </a:ext>
             </a:extLst>
           </p:cNvPr>
@@ -1000,7 +1000,7 @@
           <p:cNvPr id="3" name="Textplatzhalter 2">
             <a:extLst>
               <a:ext uri="{FF2B5EF4-FFF2-40B4-BE49-F238E27FC236}">
-                <a16:creationId xmlns:a16="http://schemas.microsoft.com/office/drawing/2014/main" xmlns="" id="{45051635-1B75-4150-A6A8-4A211733E0E3}"/>
+                <a16:creationId xmlns:a16="http://schemas.microsoft.com/office/drawing/2014/main" id="{45051635-1B75-4150-A6A8-4A211733E0E3}"/>
               </a:ext>
             </a:extLst>
           </p:cNvPr>
@@ -1125,7 +1125,7 @@
           <p:cNvPr id="4" name="Datumsplatzhalter 3">
             <a:extLst>
               <a:ext uri="{FF2B5EF4-FFF2-40B4-BE49-F238E27FC236}">
-                <a16:creationId xmlns:a16="http://schemas.microsoft.com/office/drawing/2014/main" xmlns="" id="{2DD7ACA9-99EF-40D0-8893-9C65ADC3812E}"/>
+                <a16:creationId xmlns:a16="http://schemas.microsoft.com/office/drawing/2014/main" id="{2DD7ACA9-99EF-40D0-8893-9C65ADC3812E}"/>
               </a:ext>
             </a:extLst>
           </p:cNvPr>
@@ -1143,7 +1143,7 @@
           <a:p>
             <a:fld id="{9D2EA739-B840-41DB-9666-B44BD9009BC9}" type="datetimeFigureOut">
               <a:rPr lang="de-DE" smtClean="0"/>
-              <a:t>11.11.2020</a:t>
+              <a:t>13.11.2020</a:t>
             </a:fld>
             <a:endParaRPr lang="de-DE"/>
           </a:p>
@@ -1154,7 +1154,7 @@
           <p:cNvPr id="5" name="Fußzeilenplatzhalter 4">
             <a:extLst>
               <a:ext uri="{FF2B5EF4-FFF2-40B4-BE49-F238E27FC236}">
-                <a16:creationId xmlns:a16="http://schemas.microsoft.com/office/drawing/2014/main" xmlns="" id="{384A02A7-4175-4D94-89AC-681549C89E67}"/>
+                <a16:creationId xmlns:a16="http://schemas.microsoft.com/office/drawing/2014/main" id="{384A02A7-4175-4D94-89AC-681549C89E67}"/>
               </a:ext>
             </a:extLst>
           </p:cNvPr>
@@ -1179,7 +1179,7 @@
           <p:cNvPr id="6" name="Foliennummernplatzhalter 5">
             <a:extLst>
               <a:ext uri="{FF2B5EF4-FFF2-40B4-BE49-F238E27FC236}">
-                <a16:creationId xmlns:a16="http://schemas.microsoft.com/office/drawing/2014/main" xmlns="" id="{59B14C87-94D5-4BC2-A283-C4177C1B9AE0}"/>
+                <a16:creationId xmlns:a16="http://schemas.microsoft.com/office/drawing/2014/main" id="{59B14C87-94D5-4BC2-A283-C4177C1B9AE0}"/>
               </a:ext>
             </a:extLst>
           </p:cNvPr>
@@ -1238,7 +1238,7 @@
           <p:cNvPr id="2" name="Titel 1">
             <a:extLst>
               <a:ext uri="{FF2B5EF4-FFF2-40B4-BE49-F238E27FC236}">
-                <a16:creationId xmlns:a16="http://schemas.microsoft.com/office/drawing/2014/main" xmlns="" id="{1683A423-AA55-4305-B98F-572E0CFA609B}"/>
+                <a16:creationId xmlns:a16="http://schemas.microsoft.com/office/drawing/2014/main" id="{1683A423-AA55-4305-B98F-572E0CFA609B}"/>
               </a:ext>
             </a:extLst>
           </p:cNvPr>
@@ -1266,7 +1266,7 @@
           <p:cNvPr id="3" name="Inhaltsplatzhalter 2">
             <a:extLst>
               <a:ext uri="{FF2B5EF4-FFF2-40B4-BE49-F238E27FC236}">
-                <a16:creationId xmlns:a16="http://schemas.microsoft.com/office/drawing/2014/main" xmlns="" id="{3789C9FA-5FAF-451C-93B2-C4C583C208B2}"/>
+                <a16:creationId xmlns:a16="http://schemas.microsoft.com/office/drawing/2014/main" id="{3789C9FA-5FAF-451C-93B2-C4C583C208B2}"/>
               </a:ext>
             </a:extLst>
           </p:cNvPr>
@@ -1328,7 +1328,7 @@
           <p:cNvPr id="4" name="Inhaltsplatzhalter 3">
             <a:extLst>
               <a:ext uri="{FF2B5EF4-FFF2-40B4-BE49-F238E27FC236}">
-                <a16:creationId xmlns:a16="http://schemas.microsoft.com/office/drawing/2014/main" xmlns="" id="{ED97BD7E-FC6F-4277-83C6-F98D336F7577}"/>
+                <a16:creationId xmlns:a16="http://schemas.microsoft.com/office/drawing/2014/main" id="{ED97BD7E-FC6F-4277-83C6-F98D336F7577}"/>
               </a:ext>
             </a:extLst>
           </p:cNvPr>
@@ -1390,7 +1390,7 @@
           <p:cNvPr id="5" name="Datumsplatzhalter 4">
             <a:extLst>
               <a:ext uri="{FF2B5EF4-FFF2-40B4-BE49-F238E27FC236}">
-                <a16:creationId xmlns:a16="http://schemas.microsoft.com/office/drawing/2014/main" xmlns="" id="{23A74315-BC78-4CF2-8557-2586CF0901D7}"/>
+                <a16:creationId xmlns:a16="http://schemas.microsoft.com/office/drawing/2014/main" id="{23A74315-BC78-4CF2-8557-2586CF0901D7}"/>
               </a:ext>
             </a:extLst>
           </p:cNvPr>
@@ -1408,7 +1408,7 @@
           <a:p>
             <a:fld id="{9D2EA739-B840-41DB-9666-B44BD9009BC9}" type="datetimeFigureOut">
               <a:rPr lang="de-DE" smtClean="0"/>
-              <a:t>11.11.2020</a:t>
+              <a:t>13.11.2020</a:t>
             </a:fld>
             <a:endParaRPr lang="de-DE"/>
           </a:p>
@@ -1419,7 +1419,7 @@
           <p:cNvPr id="6" name="Fußzeilenplatzhalter 5">
             <a:extLst>
               <a:ext uri="{FF2B5EF4-FFF2-40B4-BE49-F238E27FC236}">
-                <a16:creationId xmlns:a16="http://schemas.microsoft.com/office/drawing/2014/main" xmlns="" id="{CA38D99A-44C3-450F-9226-F1FDFEF2D520}"/>
+                <a16:creationId xmlns:a16="http://schemas.microsoft.com/office/drawing/2014/main" id="{CA38D99A-44C3-450F-9226-F1FDFEF2D520}"/>
               </a:ext>
             </a:extLst>
           </p:cNvPr>
@@ -1444,7 +1444,7 @@
           <p:cNvPr id="7" name="Foliennummernplatzhalter 6">
             <a:extLst>
               <a:ext uri="{FF2B5EF4-FFF2-40B4-BE49-F238E27FC236}">
-                <a16:creationId xmlns:a16="http://schemas.microsoft.com/office/drawing/2014/main" xmlns="" id="{FEEF1F84-984C-4AD8-BC45-F06857E8E15C}"/>
+                <a16:creationId xmlns:a16="http://schemas.microsoft.com/office/drawing/2014/main" id="{FEEF1F84-984C-4AD8-BC45-F06857E8E15C}"/>
               </a:ext>
             </a:extLst>
           </p:cNvPr>
@@ -1503,7 +1503,7 @@
           <p:cNvPr id="2" name="Titel 1">
             <a:extLst>
               <a:ext uri="{FF2B5EF4-FFF2-40B4-BE49-F238E27FC236}">
-                <a16:creationId xmlns:a16="http://schemas.microsoft.com/office/drawing/2014/main" xmlns="" id="{2FF61ED6-C5E2-4714-8DD0-633DC8AC96D5}"/>
+                <a16:creationId xmlns:a16="http://schemas.microsoft.com/office/drawing/2014/main" id="{2FF61ED6-C5E2-4714-8DD0-633DC8AC96D5}"/>
               </a:ext>
             </a:extLst>
           </p:cNvPr>
@@ -1536,7 +1536,7 @@
           <p:cNvPr id="3" name="Textplatzhalter 2">
             <a:extLst>
               <a:ext uri="{FF2B5EF4-FFF2-40B4-BE49-F238E27FC236}">
-                <a16:creationId xmlns:a16="http://schemas.microsoft.com/office/drawing/2014/main" xmlns="" id="{4BAD7123-09FE-4D6A-B837-9F5BB01D8679}"/>
+                <a16:creationId xmlns:a16="http://schemas.microsoft.com/office/drawing/2014/main" id="{4BAD7123-09FE-4D6A-B837-9F5BB01D8679}"/>
               </a:ext>
             </a:extLst>
           </p:cNvPr>
@@ -1607,7 +1607,7 @@
           <p:cNvPr id="4" name="Inhaltsplatzhalter 3">
             <a:extLst>
               <a:ext uri="{FF2B5EF4-FFF2-40B4-BE49-F238E27FC236}">
-                <a16:creationId xmlns:a16="http://schemas.microsoft.com/office/drawing/2014/main" xmlns="" id="{DEE132E7-8052-4ADB-AFF4-A5BCCC00BB32}"/>
+                <a16:creationId xmlns:a16="http://schemas.microsoft.com/office/drawing/2014/main" id="{DEE132E7-8052-4ADB-AFF4-A5BCCC00BB32}"/>
               </a:ext>
             </a:extLst>
           </p:cNvPr>
@@ -1669,7 +1669,7 @@
           <p:cNvPr id="5" name="Textplatzhalter 4">
             <a:extLst>
               <a:ext uri="{FF2B5EF4-FFF2-40B4-BE49-F238E27FC236}">
-                <a16:creationId xmlns:a16="http://schemas.microsoft.com/office/drawing/2014/main" xmlns="" id="{928D14F0-98B3-499D-831D-C9173FF67EB8}"/>
+                <a16:creationId xmlns:a16="http://schemas.microsoft.com/office/drawing/2014/main" id="{928D14F0-98B3-499D-831D-C9173FF67EB8}"/>
               </a:ext>
             </a:extLst>
           </p:cNvPr>
@@ -1740,7 +1740,7 @@
           <p:cNvPr id="6" name="Inhaltsplatzhalter 5">
             <a:extLst>
               <a:ext uri="{FF2B5EF4-FFF2-40B4-BE49-F238E27FC236}">
-                <a16:creationId xmlns:a16="http://schemas.microsoft.com/office/drawing/2014/main" xmlns="" id="{A0AB0029-8480-4D02-B728-6C22BBE8F132}"/>
+                <a16:creationId xmlns:a16="http://schemas.microsoft.com/office/drawing/2014/main" id="{A0AB0029-8480-4D02-B728-6C22BBE8F132}"/>
               </a:ext>
             </a:extLst>
           </p:cNvPr>
@@ -1802,7 +1802,7 @@
           <p:cNvPr id="7" name="Datumsplatzhalter 6">
             <a:extLst>
               <a:ext uri="{FF2B5EF4-FFF2-40B4-BE49-F238E27FC236}">
-                <a16:creationId xmlns:a16="http://schemas.microsoft.com/office/drawing/2014/main" xmlns="" id="{BD39D256-D75B-46DC-BA97-3BB1F387C4B7}"/>
+                <a16:creationId xmlns:a16="http://schemas.microsoft.com/office/drawing/2014/main" id="{BD39D256-D75B-46DC-BA97-3BB1F387C4B7}"/>
               </a:ext>
             </a:extLst>
           </p:cNvPr>
@@ -1820,7 +1820,7 @@
           <a:p>
             <a:fld id="{9D2EA739-B840-41DB-9666-B44BD9009BC9}" type="datetimeFigureOut">
               <a:rPr lang="de-DE" smtClean="0"/>
-              <a:t>11.11.2020</a:t>
+              <a:t>13.11.2020</a:t>
             </a:fld>
             <a:endParaRPr lang="de-DE"/>
           </a:p>
@@ -1831,7 +1831,7 @@
           <p:cNvPr id="8" name="Fußzeilenplatzhalter 7">
             <a:extLst>
               <a:ext uri="{FF2B5EF4-FFF2-40B4-BE49-F238E27FC236}">
-                <a16:creationId xmlns:a16="http://schemas.microsoft.com/office/drawing/2014/main" xmlns="" id="{1C3A03C2-871F-43EF-95F7-3CA5FB7BFC84}"/>
+                <a16:creationId xmlns:a16="http://schemas.microsoft.com/office/drawing/2014/main" id="{1C3A03C2-871F-43EF-95F7-3CA5FB7BFC84}"/>
               </a:ext>
             </a:extLst>
           </p:cNvPr>
@@ -1856,7 +1856,7 @@
           <p:cNvPr id="9" name="Foliennummernplatzhalter 8">
             <a:extLst>
               <a:ext uri="{FF2B5EF4-FFF2-40B4-BE49-F238E27FC236}">
-                <a16:creationId xmlns:a16="http://schemas.microsoft.com/office/drawing/2014/main" xmlns="" id="{04D6ACF8-D732-4084-8C5E-6CAF2AA5DD90}"/>
+                <a16:creationId xmlns:a16="http://schemas.microsoft.com/office/drawing/2014/main" id="{04D6ACF8-D732-4084-8C5E-6CAF2AA5DD90}"/>
               </a:ext>
             </a:extLst>
           </p:cNvPr>
@@ -1915,7 +1915,7 @@
           <p:cNvPr id="2" name="Titel 1">
             <a:extLst>
               <a:ext uri="{FF2B5EF4-FFF2-40B4-BE49-F238E27FC236}">
-                <a16:creationId xmlns:a16="http://schemas.microsoft.com/office/drawing/2014/main" xmlns="" id="{F08F0666-3EA4-448A-B2B6-E7ECC86DF776}"/>
+                <a16:creationId xmlns:a16="http://schemas.microsoft.com/office/drawing/2014/main" id="{F08F0666-3EA4-448A-B2B6-E7ECC86DF776}"/>
               </a:ext>
             </a:extLst>
           </p:cNvPr>
@@ -1943,7 +1943,7 @@
           <p:cNvPr id="3" name="Datumsplatzhalter 2">
             <a:extLst>
               <a:ext uri="{FF2B5EF4-FFF2-40B4-BE49-F238E27FC236}">
-                <a16:creationId xmlns:a16="http://schemas.microsoft.com/office/drawing/2014/main" xmlns="" id="{032B9C75-4683-492F-AA64-2CA3A220E246}"/>
+                <a16:creationId xmlns:a16="http://schemas.microsoft.com/office/drawing/2014/main" id="{032B9C75-4683-492F-AA64-2CA3A220E246}"/>
               </a:ext>
             </a:extLst>
           </p:cNvPr>
@@ -1961,7 +1961,7 @@
           <a:p>
             <a:fld id="{9D2EA739-B840-41DB-9666-B44BD9009BC9}" type="datetimeFigureOut">
               <a:rPr lang="de-DE" smtClean="0"/>
-              <a:t>11.11.2020</a:t>
+              <a:t>13.11.2020</a:t>
             </a:fld>
             <a:endParaRPr lang="de-DE"/>
           </a:p>
@@ -1972,7 +1972,7 @@
           <p:cNvPr id="4" name="Fußzeilenplatzhalter 3">
             <a:extLst>
               <a:ext uri="{FF2B5EF4-FFF2-40B4-BE49-F238E27FC236}">
-                <a16:creationId xmlns:a16="http://schemas.microsoft.com/office/drawing/2014/main" xmlns="" id="{BEA069DD-BFE5-4B90-9838-792C02443F68}"/>
+                <a16:creationId xmlns:a16="http://schemas.microsoft.com/office/drawing/2014/main" id="{BEA069DD-BFE5-4B90-9838-792C02443F68}"/>
               </a:ext>
             </a:extLst>
           </p:cNvPr>
@@ -1997,7 +1997,7 @@
           <p:cNvPr id="5" name="Foliennummernplatzhalter 4">
             <a:extLst>
               <a:ext uri="{FF2B5EF4-FFF2-40B4-BE49-F238E27FC236}">
-                <a16:creationId xmlns:a16="http://schemas.microsoft.com/office/drawing/2014/main" xmlns="" id="{B08B9D6C-776A-4B81-A438-62CDC5141FEC}"/>
+                <a16:creationId xmlns:a16="http://schemas.microsoft.com/office/drawing/2014/main" id="{B08B9D6C-776A-4B81-A438-62CDC5141FEC}"/>
               </a:ext>
             </a:extLst>
           </p:cNvPr>
@@ -2056,7 +2056,7 @@
           <p:cNvPr id="2" name="Datumsplatzhalter 1">
             <a:extLst>
               <a:ext uri="{FF2B5EF4-FFF2-40B4-BE49-F238E27FC236}">
-                <a16:creationId xmlns:a16="http://schemas.microsoft.com/office/drawing/2014/main" xmlns="" id="{78E1A1A4-3100-4FCD-9A8E-98B93CD56DE6}"/>
+                <a16:creationId xmlns:a16="http://schemas.microsoft.com/office/drawing/2014/main" id="{78E1A1A4-3100-4FCD-9A8E-98B93CD56DE6}"/>
               </a:ext>
             </a:extLst>
           </p:cNvPr>
@@ -2074,7 +2074,7 @@
           <a:p>
             <a:fld id="{9D2EA739-B840-41DB-9666-B44BD9009BC9}" type="datetimeFigureOut">
               <a:rPr lang="de-DE" smtClean="0"/>
-              <a:t>11.11.2020</a:t>
+              <a:t>13.11.2020</a:t>
             </a:fld>
             <a:endParaRPr lang="de-DE"/>
           </a:p>
@@ -2085,7 +2085,7 @@
           <p:cNvPr id="3" name="Fußzeilenplatzhalter 2">
             <a:extLst>
               <a:ext uri="{FF2B5EF4-FFF2-40B4-BE49-F238E27FC236}">
-                <a16:creationId xmlns:a16="http://schemas.microsoft.com/office/drawing/2014/main" xmlns="" id="{694ADBBB-9E69-4E4D-8D1D-BD293E78C2A4}"/>
+                <a16:creationId xmlns:a16="http://schemas.microsoft.com/office/drawing/2014/main" id="{694ADBBB-9E69-4E4D-8D1D-BD293E78C2A4}"/>
               </a:ext>
             </a:extLst>
           </p:cNvPr>
@@ -2110,7 +2110,7 @@
           <p:cNvPr id="4" name="Foliennummernplatzhalter 3">
             <a:extLst>
               <a:ext uri="{FF2B5EF4-FFF2-40B4-BE49-F238E27FC236}">
-                <a16:creationId xmlns:a16="http://schemas.microsoft.com/office/drawing/2014/main" xmlns="" id="{3711E3F8-F949-4391-A2BB-4B84B263A50C}"/>
+                <a16:creationId xmlns:a16="http://schemas.microsoft.com/office/drawing/2014/main" id="{3711E3F8-F949-4391-A2BB-4B84B263A50C}"/>
               </a:ext>
             </a:extLst>
           </p:cNvPr>
@@ -2169,7 +2169,7 @@
           <p:cNvPr id="2" name="Titel 1">
             <a:extLst>
               <a:ext uri="{FF2B5EF4-FFF2-40B4-BE49-F238E27FC236}">
-                <a16:creationId xmlns:a16="http://schemas.microsoft.com/office/drawing/2014/main" xmlns="" id="{C7F8BA7E-086A-4A36-B13B-337FD69E8B95}"/>
+                <a16:creationId xmlns:a16="http://schemas.microsoft.com/office/drawing/2014/main" id="{C7F8BA7E-086A-4A36-B13B-337FD69E8B95}"/>
               </a:ext>
             </a:extLst>
           </p:cNvPr>
@@ -2206,7 +2206,7 @@
           <p:cNvPr id="3" name="Inhaltsplatzhalter 2">
             <a:extLst>
               <a:ext uri="{FF2B5EF4-FFF2-40B4-BE49-F238E27FC236}">
-                <a16:creationId xmlns:a16="http://schemas.microsoft.com/office/drawing/2014/main" xmlns="" id="{30B09874-1593-48E6-9DE8-C423C762E5D6}"/>
+                <a16:creationId xmlns:a16="http://schemas.microsoft.com/office/drawing/2014/main" id="{30B09874-1593-48E6-9DE8-C423C762E5D6}"/>
               </a:ext>
             </a:extLst>
           </p:cNvPr>
@@ -2296,7 +2296,7 @@
           <p:cNvPr id="4" name="Textplatzhalter 3">
             <a:extLst>
               <a:ext uri="{FF2B5EF4-FFF2-40B4-BE49-F238E27FC236}">
-                <a16:creationId xmlns:a16="http://schemas.microsoft.com/office/drawing/2014/main" xmlns="" id="{7E40BA83-5A0D-4C37-A121-666C8C603FE2}"/>
+                <a16:creationId xmlns:a16="http://schemas.microsoft.com/office/drawing/2014/main" id="{7E40BA83-5A0D-4C37-A121-666C8C603FE2}"/>
               </a:ext>
             </a:extLst>
           </p:cNvPr>
@@ -2367,7 +2367,7 @@
           <p:cNvPr id="5" name="Datumsplatzhalter 4">
             <a:extLst>
               <a:ext uri="{FF2B5EF4-FFF2-40B4-BE49-F238E27FC236}">
-                <a16:creationId xmlns:a16="http://schemas.microsoft.com/office/drawing/2014/main" xmlns="" id="{CDF69882-EAA7-4607-AACE-9EA6844BF6EB}"/>
+                <a16:creationId xmlns:a16="http://schemas.microsoft.com/office/drawing/2014/main" id="{CDF69882-EAA7-4607-AACE-9EA6844BF6EB}"/>
               </a:ext>
             </a:extLst>
           </p:cNvPr>
@@ -2385,7 +2385,7 @@
           <a:p>
             <a:fld id="{9D2EA739-B840-41DB-9666-B44BD9009BC9}" type="datetimeFigureOut">
               <a:rPr lang="de-DE" smtClean="0"/>
-              <a:t>11.11.2020</a:t>
+              <a:t>13.11.2020</a:t>
             </a:fld>
             <a:endParaRPr lang="de-DE"/>
           </a:p>
@@ -2396,7 +2396,7 @@
           <p:cNvPr id="6" name="Fußzeilenplatzhalter 5">
             <a:extLst>
               <a:ext uri="{FF2B5EF4-FFF2-40B4-BE49-F238E27FC236}">
-                <a16:creationId xmlns:a16="http://schemas.microsoft.com/office/drawing/2014/main" xmlns="" id="{B1036D9F-DA8C-4CB7-860E-4BB490A47A47}"/>
+                <a16:creationId xmlns:a16="http://schemas.microsoft.com/office/drawing/2014/main" id="{B1036D9F-DA8C-4CB7-860E-4BB490A47A47}"/>
               </a:ext>
             </a:extLst>
           </p:cNvPr>
@@ -2421,7 +2421,7 @@
           <p:cNvPr id="7" name="Foliennummernplatzhalter 6">
             <a:extLst>
               <a:ext uri="{FF2B5EF4-FFF2-40B4-BE49-F238E27FC236}">
-                <a16:creationId xmlns:a16="http://schemas.microsoft.com/office/drawing/2014/main" xmlns="" id="{18A2F68E-C3D9-4BCC-A4AE-E6C3067C34D8}"/>
+                <a16:creationId xmlns:a16="http://schemas.microsoft.com/office/drawing/2014/main" id="{18A2F68E-C3D9-4BCC-A4AE-E6C3067C34D8}"/>
               </a:ext>
             </a:extLst>
           </p:cNvPr>
@@ -2480,7 +2480,7 @@
           <p:cNvPr id="2" name="Titel 1">
             <a:extLst>
               <a:ext uri="{FF2B5EF4-FFF2-40B4-BE49-F238E27FC236}">
-                <a16:creationId xmlns:a16="http://schemas.microsoft.com/office/drawing/2014/main" xmlns="" id="{021CF583-CB0E-49CB-85AE-DDB138237E10}"/>
+                <a16:creationId xmlns:a16="http://schemas.microsoft.com/office/drawing/2014/main" id="{021CF583-CB0E-49CB-85AE-DDB138237E10}"/>
               </a:ext>
             </a:extLst>
           </p:cNvPr>
@@ -2517,7 +2517,7 @@
           <p:cNvPr id="3" name="Bildplatzhalter 2">
             <a:extLst>
               <a:ext uri="{FF2B5EF4-FFF2-40B4-BE49-F238E27FC236}">
-                <a16:creationId xmlns:a16="http://schemas.microsoft.com/office/drawing/2014/main" xmlns="" id="{D3765D39-F7C0-4D17-9409-D4EAA88223C3}"/>
+                <a16:creationId xmlns:a16="http://schemas.microsoft.com/office/drawing/2014/main" id="{D3765D39-F7C0-4D17-9409-D4EAA88223C3}"/>
               </a:ext>
             </a:extLst>
           </p:cNvPr>
@@ -2584,7 +2584,7 @@
           <p:cNvPr id="4" name="Textplatzhalter 3">
             <a:extLst>
               <a:ext uri="{FF2B5EF4-FFF2-40B4-BE49-F238E27FC236}">
-                <a16:creationId xmlns:a16="http://schemas.microsoft.com/office/drawing/2014/main" xmlns="" id="{0B7CFA85-EFA5-4051-BFC7-5229994C3259}"/>
+                <a16:creationId xmlns:a16="http://schemas.microsoft.com/office/drawing/2014/main" id="{0B7CFA85-EFA5-4051-BFC7-5229994C3259}"/>
               </a:ext>
             </a:extLst>
           </p:cNvPr>
@@ -2655,7 +2655,7 @@
           <p:cNvPr id="5" name="Datumsplatzhalter 4">
             <a:extLst>
               <a:ext uri="{FF2B5EF4-FFF2-40B4-BE49-F238E27FC236}">
-                <a16:creationId xmlns:a16="http://schemas.microsoft.com/office/drawing/2014/main" xmlns="" id="{A02A5E17-7FD8-4788-AB10-989767530475}"/>
+                <a16:creationId xmlns:a16="http://schemas.microsoft.com/office/drawing/2014/main" id="{A02A5E17-7FD8-4788-AB10-989767530475}"/>
               </a:ext>
             </a:extLst>
           </p:cNvPr>
@@ -2673,7 +2673,7 @@
           <a:p>
             <a:fld id="{9D2EA739-B840-41DB-9666-B44BD9009BC9}" type="datetimeFigureOut">
               <a:rPr lang="de-DE" smtClean="0"/>
-              <a:t>11.11.2020</a:t>
+              <a:t>13.11.2020</a:t>
             </a:fld>
             <a:endParaRPr lang="de-DE"/>
           </a:p>
@@ -2684,7 +2684,7 @@
           <p:cNvPr id="6" name="Fußzeilenplatzhalter 5">
             <a:extLst>
               <a:ext uri="{FF2B5EF4-FFF2-40B4-BE49-F238E27FC236}">
-                <a16:creationId xmlns:a16="http://schemas.microsoft.com/office/drawing/2014/main" xmlns="" id="{40DE45BF-95A2-473A-A042-9B28E241ED2F}"/>
+                <a16:creationId xmlns:a16="http://schemas.microsoft.com/office/drawing/2014/main" id="{40DE45BF-95A2-473A-A042-9B28E241ED2F}"/>
               </a:ext>
             </a:extLst>
           </p:cNvPr>
@@ -2709,7 +2709,7 @@
           <p:cNvPr id="7" name="Foliennummernplatzhalter 6">
             <a:extLst>
               <a:ext uri="{FF2B5EF4-FFF2-40B4-BE49-F238E27FC236}">
-                <a16:creationId xmlns:a16="http://schemas.microsoft.com/office/drawing/2014/main" xmlns="" id="{5484704D-0A26-4E8C-B04C-3BCD76A3DCFE}"/>
+                <a16:creationId xmlns:a16="http://schemas.microsoft.com/office/drawing/2014/main" id="{5484704D-0A26-4E8C-B04C-3BCD76A3DCFE}"/>
               </a:ext>
             </a:extLst>
           </p:cNvPr>
@@ -2773,7 +2773,7 @@
           <p:cNvPr id="2" name="Titelplatzhalter 1">
             <a:extLst>
               <a:ext uri="{FF2B5EF4-FFF2-40B4-BE49-F238E27FC236}">
-                <a16:creationId xmlns:a16="http://schemas.microsoft.com/office/drawing/2014/main" xmlns="" id="{9D56F7D4-25A2-400A-A800-1BBBBCC9C909}"/>
+                <a16:creationId xmlns:a16="http://schemas.microsoft.com/office/drawing/2014/main" id="{9D56F7D4-25A2-400A-A800-1BBBBCC9C909}"/>
               </a:ext>
             </a:extLst>
           </p:cNvPr>
@@ -2811,7 +2811,7 @@
           <p:cNvPr id="3" name="Textplatzhalter 2">
             <a:extLst>
               <a:ext uri="{FF2B5EF4-FFF2-40B4-BE49-F238E27FC236}">
-                <a16:creationId xmlns:a16="http://schemas.microsoft.com/office/drawing/2014/main" xmlns="" id="{FEC58394-B743-4977-8F6C-8EA6821E2DA6}"/>
+                <a16:creationId xmlns:a16="http://schemas.microsoft.com/office/drawing/2014/main" id="{FEC58394-B743-4977-8F6C-8EA6821E2DA6}"/>
               </a:ext>
             </a:extLst>
           </p:cNvPr>
@@ -2878,7 +2878,7 @@
           <p:cNvPr id="4" name="Datumsplatzhalter 3">
             <a:extLst>
               <a:ext uri="{FF2B5EF4-FFF2-40B4-BE49-F238E27FC236}">
-                <a16:creationId xmlns:a16="http://schemas.microsoft.com/office/drawing/2014/main" xmlns="" id="{D7B56AEC-433A-4D88-9C21-7D8906759460}"/>
+                <a16:creationId xmlns:a16="http://schemas.microsoft.com/office/drawing/2014/main" id="{D7B56AEC-433A-4D88-9C21-7D8906759460}"/>
               </a:ext>
             </a:extLst>
           </p:cNvPr>
@@ -2914,7 +2914,7 @@
           <a:p>
             <a:fld id="{9D2EA739-B840-41DB-9666-B44BD9009BC9}" type="datetimeFigureOut">
               <a:rPr lang="de-DE" smtClean="0"/>
-              <a:t>11.11.2020</a:t>
+              <a:t>13.11.2020</a:t>
             </a:fld>
             <a:endParaRPr lang="de-DE"/>
           </a:p>
@@ -2925,7 +2925,7 @@
           <p:cNvPr id="5" name="Fußzeilenplatzhalter 4">
             <a:extLst>
               <a:ext uri="{FF2B5EF4-FFF2-40B4-BE49-F238E27FC236}">
-                <a16:creationId xmlns:a16="http://schemas.microsoft.com/office/drawing/2014/main" xmlns="" id="{37D21044-10F4-4BB4-BA29-CC0432833145}"/>
+                <a16:creationId xmlns:a16="http://schemas.microsoft.com/office/drawing/2014/main" id="{37D21044-10F4-4BB4-BA29-CC0432833145}"/>
               </a:ext>
             </a:extLst>
           </p:cNvPr>
@@ -2968,7 +2968,7 @@
           <p:cNvPr id="6" name="Foliennummernplatzhalter 5">
             <a:extLst>
               <a:ext uri="{FF2B5EF4-FFF2-40B4-BE49-F238E27FC236}">
-                <a16:creationId xmlns:a16="http://schemas.microsoft.com/office/drawing/2014/main" xmlns="" id="{DD32C5E6-AA19-4B3E-93D1-E6065C2AB8B0}"/>
+                <a16:creationId xmlns:a16="http://schemas.microsoft.com/office/drawing/2014/main" id="{DD32C5E6-AA19-4B3E-93D1-E6065C2AB8B0}"/>
               </a:ext>
             </a:extLst>
           </p:cNvPr>
@@ -3340,14 +3340,14 @@
           <p:nvPr>
             <p:extLst>
               <p:ext uri="{D42A27DB-BD31-4B8C-83A1-F6EECF244321}">
-                <p14:modId xmlns:p14="http://schemas.microsoft.com/office/powerpoint/2010/main" val="1934696494"/>
+                <p14:modId xmlns:p14="http://schemas.microsoft.com/office/powerpoint/2010/main" val="1326807532"/>
               </p:ext>
             </p:extLst>
           </p:nvPr>
         </p:nvGraphicFramePr>
         <p:xfrm>
           <a:off x="1488141" y="755526"/>
-          <a:ext cx="7117975" cy="1517925"/>
+          <a:ext cx="7117975" cy="1883685"/>
         </p:xfrm>
         <a:graphic>
           <a:graphicData uri="http://schemas.openxmlformats.org/drawingml/2006/table">
@@ -3356,11 +3356,41 @@
                 <a:tableStyleId>{5C22544A-7EE6-4342-B048-85BDC9FD1C3A}</a:tableStyleId>
               </a:tblPr>
               <a:tblGrid>
-                <a:gridCol w="753036"/>
-                <a:gridCol w="3059953"/>
-                <a:gridCol w="1045882"/>
-                <a:gridCol w="1021977"/>
-                <a:gridCol w="1237127"/>
+                <a:gridCol w="753036">
+                  <a:extLst>
+                    <a:ext uri="{9D8B030D-6E8A-4147-A177-3AD203B41FA5}">
+                      <a16:colId xmlns:a16="http://schemas.microsoft.com/office/drawing/2014/main" val="20000"/>
+                    </a:ext>
+                  </a:extLst>
+                </a:gridCol>
+                <a:gridCol w="3059953">
+                  <a:extLst>
+                    <a:ext uri="{9D8B030D-6E8A-4147-A177-3AD203B41FA5}">
+                      <a16:colId xmlns:a16="http://schemas.microsoft.com/office/drawing/2014/main" val="20001"/>
+                    </a:ext>
+                  </a:extLst>
+                </a:gridCol>
+                <a:gridCol w="1045882">
+                  <a:extLst>
+                    <a:ext uri="{9D8B030D-6E8A-4147-A177-3AD203B41FA5}">
+                      <a16:colId xmlns:a16="http://schemas.microsoft.com/office/drawing/2014/main" val="20002"/>
+                    </a:ext>
+                  </a:extLst>
+                </a:gridCol>
+                <a:gridCol w="1021977">
+                  <a:extLst>
+                    <a:ext uri="{9D8B030D-6E8A-4147-A177-3AD203B41FA5}">
+                      <a16:colId xmlns:a16="http://schemas.microsoft.com/office/drawing/2014/main" val="20003"/>
+                    </a:ext>
+                  </a:extLst>
+                </a:gridCol>
+                <a:gridCol w="1237127">
+                  <a:extLst>
+                    <a:ext uri="{9D8B030D-6E8A-4147-A177-3AD203B41FA5}">
+                      <a16:colId xmlns:a16="http://schemas.microsoft.com/office/drawing/2014/main" val="20004"/>
+                    </a:ext>
+                  </a:extLst>
+                </a:gridCol>
               </a:tblGrid>
               <a:tr h="262135">
                 <a:tc>
@@ -3374,7 +3404,7 @@
                         </a:spcAft>
                       </a:pPr>
                       <a:r>
-                        <a:rPr lang="de-DE" sz="1200" b="1" dirty="0" smtClean="0">
+                        <a:rPr lang="de-DE" sz="1200" b="1" dirty="0">
                           <a:effectLst/>
                           <a:latin typeface="Arial" panose="020B0604020202020204" pitchFamily="34" charset="0"/>
                           <a:ea typeface="Times New Roman" panose="02020603050405020304" pitchFamily="18" charset="0"/>
@@ -3530,6 +3560,11 @@
                   </a:txBody>
                   <a:tcPr marL="68580" marR="68580" marT="0" marB="0"/>
                 </a:tc>
+                <a:extLst>
+                  <a:ext uri="{0D108BD9-81ED-4DB2-BD59-A6C34878D82A}">
+                    <a16:rowId xmlns:a16="http://schemas.microsoft.com/office/drawing/2014/main" val="10000"/>
+                  </a:ext>
+                </a:extLst>
               </a:tr>
               <a:tr h="262135">
                 <a:tc>
@@ -3639,7 +3674,7 @@
                         </a:spcAft>
                       </a:pPr>
                       <a:r>
-                        <a:rPr lang="en-GB" sz="1200" dirty="0" smtClean="0">
+                        <a:rPr lang="en-GB" sz="1200" dirty="0">
                           <a:effectLst/>
                           <a:latin typeface="Arial" panose="020B0604020202020204" pitchFamily="34" charset="0"/>
                           <a:ea typeface="Times New Roman" panose="02020603050405020304" pitchFamily="18" charset="0"/>
@@ -3668,7 +3703,7 @@
                         </a:spcAft>
                       </a:pPr>
                       <a:r>
-                        <a:rPr lang="en-GB" sz="1200" dirty="0" smtClean="0">
+                        <a:rPr lang="en-GB" sz="1200" dirty="0">
                           <a:effectLst/>
                           <a:latin typeface="Arial" panose="020B0604020202020204" pitchFamily="34" charset="0"/>
                           <a:ea typeface="Times New Roman" panose="02020603050405020304" pitchFamily="18" charset="0"/>
@@ -3686,6 +3721,11 @@
                   </a:txBody>
                   <a:tcPr marL="68580" marR="68580" marT="0" marB="0"/>
                 </a:tc>
+                <a:extLst>
+                  <a:ext uri="{0D108BD9-81ED-4DB2-BD59-A6C34878D82A}">
+                    <a16:rowId xmlns:a16="http://schemas.microsoft.com/office/drawing/2014/main" val="10001"/>
+                  </a:ext>
+                </a:extLst>
               </a:tr>
               <a:tr h="262135">
                 <a:tc>
@@ -3699,7 +3739,7 @@
                         </a:spcAft>
                       </a:pPr>
                       <a:r>
-                        <a:rPr lang="en-US" sz="1200" dirty="0" smtClean="0">
+                        <a:rPr lang="en-US" sz="1200" dirty="0">
                           <a:effectLst/>
                           <a:latin typeface="Arial" panose="020B0604020202020204" pitchFamily="34" charset="0"/>
                           <a:ea typeface="Times New Roman" panose="02020603050405020304" pitchFamily="18" charset="0"/>
@@ -3728,7 +3768,7 @@
                         </a:spcAft>
                       </a:pPr>
                       <a:r>
-                        <a:rPr lang="de-DE" sz="1200" dirty="0" smtClean="0">
+                        <a:rPr lang="de-DE" sz="1200" dirty="0">
                           <a:effectLst/>
                           <a:latin typeface="Arial" panose="020B0604020202020204" pitchFamily="34" charset="0"/>
                           <a:ea typeface="Times New Roman" panose="02020603050405020304" pitchFamily="18" charset="0"/>
@@ -3795,7 +3835,7 @@
                         </a:spcAft>
                       </a:pPr>
                       <a:r>
-                        <a:rPr lang="en-GB" sz="1200" dirty="0" smtClean="0">
+                        <a:rPr lang="en-GB" sz="1200" dirty="0">
                           <a:effectLst/>
                           <a:latin typeface="Arial" panose="020B0604020202020204" pitchFamily="34" charset="0"/>
                           <a:ea typeface="Times New Roman" panose="02020603050405020304" pitchFamily="18" charset="0"/>
@@ -3824,7 +3864,7 @@
                         </a:spcAft>
                       </a:pPr>
                       <a:r>
-                        <a:rPr lang="en-GB" sz="1200" dirty="0" smtClean="0">
+                        <a:rPr lang="en-GB" sz="1200" dirty="0">
                           <a:effectLst/>
                           <a:latin typeface="Arial" panose="020B0604020202020204" pitchFamily="34" charset="0"/>
                           <a:ea typeface="Times New Roman" panose="02020603050405020304" pitchFamily="18" charset="0"/>
@@ -3842,6 +3882,11 @@
                   </a:txBody>
                   <a:tcPr marL="68580" marR="68580" marT="0" marB="0"/>
                 </a:tc>
+                <a:extLst>
+                  <a:ext uri="{0D108BD9-81ED-4DB2-BD59-A6C34878D82A}">
+                    <a16:rowId xmlns:a16="http://schemas.microsoft.com/office/drawing/2014/main" val="10002"/>
+                  </a:ext>
+                </a:extLst>
               </a:tr>
               <a:tr h="262135">
                 <a:tc>
@@ -3855,7 +3900,7 @@
                         </a:spcAft>
                       </a:pPr>
                       <a:r>
-                        <a:rPr lang="de-DE" sz="1200" dirty="0" smtClean="0">
+                        <a:rPr lang="de-DE" sz="1200" dirty="0">
                           <a:effectLst/>
                           <a:latin typeface="Arial" panose="020B0604020202020204" pitchFamily="34" charset="0"/>
                           <a:ea typeface="Times New Roman" panose="02020603050405020304" pitchFamily="18" charset="0"/>
@@ -3863,12 +3908,6 @@
                         </a:rPr>
                         <a:t>0.3</a:t>
                       </a:r>
-                      <a:endParaRPr lang="de-DE" sz="1200" dirty="0">
-                        <a:effectLst/>
-                        <a:latin typeface="Arial" panose="020B0604020202020204" pitchFamily="34" charset="0"/>
-                        <a:ea typeface="Times New Roman" panose="02020603050405020304" pitchFamily="18" charset="0"/>
-                        <a:cs typeface="Times New Roman" panose="02020603050405020304" pitchFamily="18" charset="0"/>
-                      </a:endParaRPr>
                     </a:p>
                   </a:txBody>
                   <a:tcPr marL="68580" marR="68580" marT="0" marB="0"/>
@@ -3884,7 +3923,7 @@
                         </a:spcAft>
                       </a:pPr>
                       <a:r>
-                        <a:rPr lang="de-DE" sz="1200" dirty="0" smtClean="0">
+                        <a:rPr lang="de-DE" sz="1200" dirty="0">
                           <a:effectLst/>
                           <a:latin typeface="Arial" panose="020B0604020202020204" pitchFamily="34" charset="0"/>
                           <a:ea typeface="Times New Roman" panose="02020603050405020304" pitchFamily="18" charset="0"/>
@@ -3892,12 +3931,6 @@
                         </a:rPr>
                         <a:t>Ergänzung abgesetzte Subsequenz</a:t>
                       </a:r>
-                      <a:endParaRPr lang="de-DE" sz="1200" dirty="0">
-                        <a:effectLst/>
-                        <a:latin typeface="Arial" panose="020B0604020202020204" pitchFamily="34" charset="0"/>
-                        <a:ea typeface="Times New Roman" panose="02020603050405020304" pitchFamily="18" charset="0"/>
-                        <a:cs typeface="Times New Roman" panose="02020603050405020304" pitchFamily="18" charset="0"/>
-                      </a:endParaRPr>
                     </a:p>
                   </a:txBody>
                   <a:tcPr marL="68580" marR="68580" marT="0" marB="0"/>
@@ -3913,7 +3946,7 @@
                         </a:spcAft>
                       </a:pPr>
                       <a:r>
-                        <a:rPr lang="de-DE" sz="1200" dirty="0" smtClean="0">
+                        <a:rPr lang="de-DE" sz="1200" dirty="0">
                           <a:effectLst/>
                           <a:latin typeface="Arial" panose="020B0604020202020204" pitchFamily="34" charset="0"/>
                           <a:ea typeface="Times New Roman" panose="02020603050405020304" pitchFamily="18" charset="0"/>
@@ -3922,7 +3955,7 @@
                         <a:t>J. </a:t>
                       </a:r>
                       <a:r>
-                        <a:rPr lang="de-DE" sz="1200" dirty="0" err="1" smtClean="0">
+                        <a:rPr lang="de-DE" sz="1200" dirty="0" err="1">
                           <a:effectLst/>
                           <a:latin typeface="Arial" panose="020B0604020202020204" pitchFamily="34" charset="0"/>
                           <a:ea typeface="Times New Roman" panose="02020603050405020304" pitchFamily="18" charset="0"/>
@@ -3951,7 +3984,7 @@
                         </a:spcAft>
                       </a:pPr>
                       <a:r>
-                        <a:rPr lang="de-DE" sz="1200" dirty="0" smtClean="0">
+                        <a:rPr lang="de-DE" sz="1200" dirty="0">
                           <a:effectLst/>
                           <a:latin typeface="Arial" panose="020B0604020202020204" pitchFamily="34" charset="0"/>
                           <a:ea typeface="Times New Roman" panose="02020603050405020304" pitchFamily="18" charset="0"/>
@@ -3959,12 +3992,6 @@
                         </a:rPr>
                         <a:t>11.11.2020</a:t>
                       </a:r>
-                      <a:endParaRPr lang="de-DE" sz="1200" dirty="0">
-                        <a:effectLst/>
-                        <a:latin typeface="Arial" panose="020B0604020202020204" pitchFamily="34" charset="0"/>
-                        <a:ea typeface="Times New Roman" panose="02020603050405020304" pitchFamily="18" charset="0"/>
-                        <a:cs typeface="Times New Roman" panose="02020603050405020304" pitchFamily="18" charset="0"/>
-                      </a:endParaRPr>
                     </a:p>
                   </a:txBody>
                   <a:tcPr marL="68580" marR="68580" marT="0" marB="0"/>
@@ -3980,7 +4007,7 @@
                         </a:spcAft>
                       </a:pPr>
                       <a:r>
-                        <a:rPr lang="de-DE" sz="1200" dirty="0" smtClean="0">
+                        <a:rPr lang="de-DE" sz="1200" dirty="0">
                           <a:effectLst/>
                           <a:latin typeface="Arial" panose="020B0604020202020204" pitchFamily="34" charset="0"/>
                           <a:ea typeface="Times New Roman" panose="02020603050405020304" pitchFamily="18" charset="0"/>
@@ -3988,16 +4015,15 @@
                         </a:rPr>
                         <a:t>-</a:t>
                       </a:r>
-                      <a:endParaRPr lang="de-DE" sz="1200" dirty="0">
-                        <a:effectLst/>
-                        <a:latin typeface="Arial" panose="020B0604020202020204" pitchFamily="34" charset="0"/>
-                        <a:ea typeface="Times New Roman" panose="02020603050405020304" pitchFamily="18" charset="0"/>
-                        <a:cs typeface="Times New Roman" panose="02020603050405020304" pitchFamily="18" charset="0"/>
-                      </a:endParaRPr>
                     </a:p>
                   </a:txBody>
                   <a:tcPr marL="68580" marR="68580" marT="0" marB="0"/>
                 </a:tc>
+                <a:extLst>
+                  <a:ext uri="{0D108BD9-81ED-4DB2-BD59-A6C34878D82A}">
+                    <a16:rowId xmlns:a16="http://schemas.microsoft.com/office/drawing/2014/main" val="10003"/>
+                  </a:ext>
+                </a:extLst>
               </a:tr>
               <a:tr h="262135">
                 <a:tc>
@@ -4011,7 +4037,7 @@
                         </a:spcAft>
                       </a:pPr>
                       <a:r>
-                        <a:rPr lang="de-DE" sz="1200" dirty="0" smtClean="0">
+                        <a:rPr lang="de-DE" sz="1200" dirty="0">
                           <a:effectLst/>
                           <a:latin typeface="Arial" panose="020B0604020202020204" pitchFamily="34" charset="0"/>
                           <a:ea typeface="Times New Roman" panose="02020603050405020304" pitchFamily="18" charset="0"/>
@@ -4019,12 +4045,6 @@
                         </a:rPr>
                         <a:t>0.4</a:t>
                       </a:r>
-                      <a:endParaRPr lang="de-DE" sz="1200" dirty="0">
-                        <a:effectLst/>
-                        <a:latin typeface="Arial" panose="020B0604020202020204" pitchFamily="34" charset="0"/>
-                        <a:ea typeface="Times New Roman" panose="02020603050405020304" pitchFamily="18" charset="0"/>
-                        <a:cs typeface="Times New Roman" panose="02020603050405020304" pitchFamily="18" charset="0"/>
-                      </a:endParaRPr>
                     </a:p>
                   </a:txBody>
                   <a:tcPr marL="68580" marR="68580" marT="0" marB="0"/>
@@ -4040,7 +4060,7 @@
                         </a:spcAft>
                       </a:pPr>
                       <a:r>
-                        <a:rPr lang="de-DE" sz="1200" dirty="0" smtClean="0">
+                        <a:rPr lang="de-DE" sz="1200" dirty="0">
                           <a:effectLst/>
                           <a:latin typeface="Arial" panose="020B0604020202020204" pitchFamily="34" charset="0"/>
                           <a:ea typeface="Times New Roman" panose="02020603050405020304" pitchFamily="18" charset="0"/>
@@ -4049,7 +4069,7 @@
                         <a:t>Ergänzung</a:t>
                       </a:r>
                       <a:r>
-                        <a:rPr lang="de-DE" sz="1200" baseline="0" dirty="0" smtClean="0">
+                        <a:rPr lang="de-DE" sz="1200" baseline="0" dirty="0">
                           <a:effectLst/>
                           <a:latin typeface="Arial" panose="020B0604020202020204" pitchFamily="34" charset="0"/>
                           <a:ea typeface="Times New Roman" panose="02020603050405020304" pitchFamily="18" charset="0"/>
@@ -4078,7 +4098,7 @@
                         </a:spcAft>
                       </a:pPr>
                       <a:r>
-                        <a:rPr lang="de-DE" sz="1200" dirty="0" smtClean="0">
+                        <a:rPr lang="de-DE" sz="1200" dirty="0">
                           <a:effectLst/>
                           <a:latin typeface="Arial" panose="020B0604020202020204" pitchFamily="34" charset="0"/>
                           <a:ea typeface="Times New Roman" panose="02020603050405020304" pitchFamily="18" charset="0"/>
@@ -4087,7 +4107,7 @@
                         <a:t>J. </a:t>
                       </a:r>
                       <a:r>
-                        <a:rPr lang="de-DE" sz="1200" dirty="0" err="1" smtClean="0">
+                        <a:rPr lang="de-DE" sz="1200" dirty="0" err="1">
                           <a:effectLst/>
                           <a:latin typeface="Arial" panose="020B0604020202020204" pitchFamily="34" charset="0"/>
                           <a:ea typeface="Times New Roman" panose="02020603050405020304" pitchFamily="18" charset="0"/>
@@ -4116,13 +4136,136 @@
                         </a:spcAft>
                       </a:pPr>
                       <a:r>
-                        <a:rPr lang="de-DE" sz="1200" dirty="0" smtClean="0">
+                        <a:rPr lang="de-DE" sz="1200" dirty="0">
                           <a:effectLst/>
                           <a:latin typeface="Arial" panose="020B0604020202020204" pitchFamily="34" charset="0"/>
                           <a:ea typeface="Times New Roman" panose="02020603050405020304" pitchFamily="18" charset="0"/>
                           <a:cs typeface="Times New Roman" panose="02020603050405020304" pitchFamily="18" charset="0"/>
                         </a:rPr>
                         <a:t>11.11.2020</a:t>
+                      </a:r>
+                    </a:p>
+                  </a:txBody>
+                  <a:tcPr marL="68580" marR="68580" marT="0" marB="0"/>
+                </a:tc>
+                <a:tc>
+                  <a:txBody>
+                    <a:bodyPr/>
+                    <a:lstStyle/>
+                    <a:p>
+                      <a:pPr>
+                        <a:spcAft>
+                          <a:spcPts val="0"/>
+                        </a:spcAft>
+                      </a:pPr>
+                      <a:r>
+                        <a:rPr lang="de-DE" sz="1200" dirty="0">
+                          <a:effectLst/>
+                          <a:latin typeface="Arial" panose="020B0604020202020204" pitchFamily="34" charset="0"/>
+                          <a:ea typeface="Times New Roman" panose="02020603050405020304" pitchFamily="18" charset="0"/>
+                          <a:cs typeface="Times New Roman" panose="02020603050405020304" pitchFamily="18" charset="0"/>
+                        </a:rPr>
+                        <a:t>Review Dück</a:t>
+                      </a:r>
+                      <a:r>
+                        <a:rPr lang="de-DE" sz="1200" baseline="0" dirty="0">
+                          <a:effectLst/>
+                          <a:latin typeface="Arial" panose="020B0604020202020204" pitchFamily="34" charset="0"/>
+                          <a:ea typeface="Times New Roman" panose="02020603050405020304" pitchFamily="18" charset="0"/>
+                          <a:cs typeface="Times New Roman" panose="02020603050405020304" pitchFamily="18" charset="0"/>
+                        </a:rPr>
+                        <a:t> / Niemann</a:t>
+                      </a:r>
+                      <a:endParaRPr lang="de-DE" sz="1200" dirty="0">
+                        <a:effectLst/>
+                        <a:latin typeface="Arial" panose="020B0604020202020204" pitchFamily="34" charset="0"/>
+                        <a:ea typeface="Times New Roman" panose="02020603050405020304" pitchFamily="18" charset="0"/>
+                        <a:cs typeface="Times New Roman" panose="02020603050405020304" pitchFamily="18" charset="0"/>
+                      </a:endParaRPr>
+                    </a:p>
+                  </a:txBody>
+                  <a:tcPr marL="68580" marR="68580" marT="0" marB="0"/>
+                </a:tc>
+                <a:extLst>
+                  <a:ext uri="{0D108BD9-81ED-4DB2-BD59-A6C34878D82A}">
+                    <a16:rowId xmlns:a16="http://schemas.microsoft.com/office/drawing/2014/main" val="10004"/>
+                  </a:ext>
+                </a:extLst>
+              </a:tr>
+              <a:tr h="262135">
+                <a:tc>
+                  <a:txBody>
+                    <a:bodyPr/>
+                    <a:lstStyle/>
+                    <a:p>
+                      <a:pPr>
+                        <a:spcAft>
+                          <a:spcPts val="0"/>
+                        </a:spcAft>
+                      </a:pPr>
+                      <a:r>
+                        <a:rPr lang="de-DE" sz="1200" dirty="0">
+                          <a:effectLst/>
+                          <a:latin typeface="Arial" panose="020B0604020202020204" pitchFamily="34" charset="0"/>
+                          <a:ea typeface="Times New Roman" panose="02020603050405020304" pitchFamily="18" charset="0"/>
+                          <a:cs typeface="Times New Roman" panose="02020603050405020304" pitchFamily="18" charset="0"/>
+                        </a:rPr>
+                        <a:t>0.5</a:t>
+                      </a:r>
+                    </a:p>
+                  </a:txBody>
+                  <a:tcPr marL="68580" marR="68580" marT="0" marB="0"/>
+                </a:tc>
+                <a:tc>
+                  <a:txBody>
+                    <a:bodyPr/>
+                    <a:lstStyle/>
+                    <a:p>
+                      <a:pPr>
+                        <a:spcAft>
+                          <a:spcPts val="0"/>
+                        </a:spcAft>
+                      </a:pPr>
+                      <a:r>
+                        <a:rPr lang="de-DE" sz="1200" dirty="0">
+                          <a:effectLst/>
+                          <a:latin typeface="Arial" panose="020B0604020202020204" pitchFamily="34" charset="0"/>
+                          <a:ea typeface="Times New Roman" panose="02020603050405020304" pitchFamily="18" charset="0"/>
+                          <a:cs typeface="Times New Roman" panose="02020603050405020304" pitchFamily="18" charset="0"/>
+                        </a:rPr>
+                        <a:t>Ergänzung: Quelle für verschobenen Schritt</a:t>
+                      </a:r>
+                    </a:p>
+                  </a:txBody>
+                  <a:tcPr marL="68580" marR="68580" marT="0" marB="0"/>
+                </a:tc>
+                <a:tc>
+                  <a:txBody>
+                    <a:bodyPr/>
+                    <a:lstStyle/>
+                    <a:p>
+                      <a:pPr>
+                        <a:spcAft>
+                          <a:spcPts val="0"/>
+                        </a:spcAft>
+                      </a:pPr>
+                      <a:r>
+                        <a:rPr lang="de-DE" sz="1200" dirty="0">
+                          <a:effectLst/>
+                          <a:latin typeface="Arial" panose="020B0604020202020204" pitchFamily="34" charset="0"/>
+                          <a:ea typeface="Times New Roman" panose="02020603050405020304" pitchFamily="18" charset="0"/>
+                          <a:cs typeface="Times New Roman" panose="02020603050405020304" pitchFamily="18" charset="0"/>
+                        </a:rPr>
+                        <a:t>J. </a:t>
+                      </a:r>
+                      <a:r>
+                        <a:rPr lang="de-DE" sz="1200" dirty="0" err="1">
+                          <a:effectLst/>
+                          <a:latin typeface="Arial" panose="020B0604020202020204" pitchFamily="34" charset="0"/>
+                          <a:ea typeface="Times New Roman" panose="02020603050405020304" pitchFamily="18" charset="0"/>
+                          <a:cs typeface="Times New Roman" panose="02020603050405020304" pitchFamily="18" charset="0"/>
+                        </a:rPr>
+                        <a:t>Leßner</a:t>
                       </a:r>
                       <a:endParaRPr lang="de-DE" sz="1200" dirty="0">
                         <a:effectLst/>
@@ -4145,33 +4288,46 @@
                         </a:spcAft>
                       </a:pPr>
                       <a:r>
-                        <a:rPr lang="de-DE" sz="1200" dirty="0" smtClean="0">
+                        <a:rPr lang="de-DE" sz="1200" dirty="0">
                           <a:effectLst/>
                           <a:latin typeface="Arial" panose="020B0604020202020204" pitchFamily="34" charset="0"/>
                           <a:ea typeface="Times New Roman" panose="02020603050405020304" pitchFamily="18" charset="0"/>
                           <a:cs typeface="Times New Roman" panose="02020603050405020304" pitchFamily="18" charset="0"/>
                         </a:rPr>
-                        <a:t>Review Dück</a:t>
+                        <a:t>13.11.2020</a:t>
                       </a:r>
+                    </a:p>
+                  </a:txBody>
+                  <a:tcPr marL="68580" marR="68580" marT="0" marB="0"/>
+                </a:tc>
+                <a:tc>
+                  <a:txBody>
+                    <a:bodyPr/>
+                    <a:lstStyle/>
+                    <a:p>
+                      <a:pPr>
+                        <a:spcAft>
+                          <a:spcPts val="0"/>
+                        </a:spcAft>
+                      </a:pPr>
                       <a:r>
-                        <a:rPr lang="de-DE" sz="1200" baseline="0" dirty="0" smtClean="0">
+                        <a:rPr lang="de-DE" sz="1200" dirty="0">
                           <a:effectLst/>
                           <a:latin typeface="Arial" panose="020B0604020202020204" pitchFamily="34" charset="0"/>
                           <a:ea typeface="Times New Roman" panose="02020603050405020304" pitchFamily="18" charset="0"/>
                           <a:cs typeface="Times New Roman" panose="02020603050405020304" pitchFamily="18" charset="0"/>
                         </a:rPr>
-                        <a:t> / Niemann</a:t>
+                        <a:t>Review </a:t>
                       </a:r>
-                      <a:endParaRPr lang="de-DE" sz="1200" dirty="0">
-                        <a:effectLst/>
-                        <a:latin typeface="Arial" panose="020B0604020202020204" pitchFamily="34" charset="0"/>
-                        <a:ea typeface="Times New Roman" panose="02020603050405020304" pitchFamily="18" charset="0"/>
-                        <a:cs typeface="Times New Roman" panose="02020603050405020304" pitchFamily="18" charset="0"/>
-                      </a:endParaRPr>
                     </a:p>
                   </a:txBody>
                   <a:tcPr marL="68580" marR="68580" marT="0" marB="0"/>
                 </a:tc>
+                <a:extLst>
+                  <a:ext uri="{0D108BD9-81ED-4DB2-BD59-A6C34878D82A}">
+                    <a16:rowId xmlns:a16="http://schemas.microsoft.com/office/drawing/2014/main" val="1023962814"/>
+                  </a:ext>
+                </a:extLst>
               </a:tr>
             </a:tbl>
           </a:graphicData>
@@ -4200,10 +4356,9 @@
           <a:lstStyle/>
           <a:p>
             <a:r>
-              <a:rPr lang="de-DE" dirty="0" smtClean="0"/>
+              <a:rPr lang="de-DE" dirty="0"/>
               <a:t>Dokumentenhistorie</a:t>
             </a:r>
-            <a:endParaRPr lang="de-DE" dirty="0"/>
           </a:p>
         </p:txBody>
       </p:sp>
@@ -4242,7 +4397,7 @@
           <p:cNvPr id="45" name="Rechteck 44">
             <a:extLst>
               <a:ext uri="{FF2B5EF4-FFF2-40B4-BE49-F238E27FC236}">
-                <a16:creationId xmlns:a16="http://schemas.microsoft.com/office/drawing/2014/main" xmlns="" id="{BE0622CD-514A-460B-8F0C-194485DCB382}"/>
+                <a16:creationId xmlns:a16="http://schemas.microsoft.com/office/drawing/2014/main" id="{BE0622CD-514A-460B-8F0C-194485DCB382}"/>
               </a:ext>
             </a:extLst>
           </p:cNvPr>
@@ -4251,7 +4406,7 @@
         </p:nvSpPr>
         <p:spPr>
           <a:xfrm>
-            <a:off x="8038763" y="3498922"/>
+            <a:off x="8038763" y="3096145"/>
             <a:ext cx="2518667" cy="1285758"/>
           </a:xfrm>
           <a:prstGeom prst="rect">
@@ -4294,7 +4449,7 @@
           <p:cNvPr id="44" name="Rechteck 43">
             <a:extLst>
               <a:ext uri="{FF2B5EF4-FFF2-40B4-BE49-F238E27FC236}">
-                <a16:creationId xmlns:a16="http://schemas.microsoft.com/office/drawing/2014/main" xmlns="" id="{C19919CC-DF6A-4463-AF95-7459171A3BD9}"/>
+                <a16:creationId xmlns:a16="http://schemas.microsoft.com/office/drawing/2014/main" id="{C19919CC-DF6A-4463-AF95-7459171A3BD9}"/>
               </a:ext>
             </a:extLst>
           </p:cNvPr>
@@ -4303,7 +4458,7 @@
         </p:nvSpPr>
         <p:spPr>
           <a:xfrm>
-            <a:off x="5484670" y="3498853"/>
+            <a:off x="5484670" y="3096076"/>
             <a:ext cx="2554093" cy="1285827"/>
           </a:xfrm>
           <a:prstGeom prst="rect">
@@ -4346,7 +4501,7 @@
           <p:cNvPr id="6" name="Rechteck 5">
             <a:extLst>
               <a:ext uri="{FF2B5EF4-FFF2-40B4-BE49-F238E27FC236}">
-                <a16:creationId xmlns:a16="http://schemas.microsoft.com/office/drawing/2014/main" xmlns="" id="{5E7DB929-572D-4E95-82E8-B6DD989776DD}"/>
+                <a16:creationId xmlns:a16="http://schemas.microsoft.com/office/drawing/2014/main" id="{5E7DB929-572D-4E95-82E8-B6DD989776DD}"/>
               </a:ext>
             </a:extLst>
           </p:cNvPr>
@@ -4355,7 +4510,7 @@
         </p:nvSpPr>
         <p:spPr>
           <a:xfrm>
-            <a:off x="1374003" y="581440"/>
+            <a:off x="1374003" y="178663"/>
             <a:ext cx="9187543" cy="446314"/>
           </a:xfrm>
           <a:prstGeom prst="rect">
@@ -4400,7 +4555,7 @@
           <p:cNvPr id="7" name="Textfeld 6">
             <a:extLst>
               <a:ext uri="{FF2B5EF4-FFF2-40B4-BE49-F238E27FC236}">
-                <a16:creationId xmlns:a16="http://schemas.microsoft.com/office/drawing/2014/main" xmlns="" id="{672F2C52-F706-4C2C-9BA1-C4050D78BE85}"/>
+                <a16:creationId xmlns:a16="http://schemas.microsoft.com/office/drawing/2014/main" id="{672F2C52-F706-4C2C-9BA1-C4050D78BE85}"/>
               </a:ext>
             </a:extLst>
           </p:cNvPr>
@@ -4409,7 +4564,7 @@
         </p:nvSpPr>
         <p:spPr>
           <a:xfrm flipH="1">
-            <a:off x="1374003" y="581440"/>
+            <a:off x="1374003" y="178663"/>
             <a:ext cx="5050972" cy="461665"/>
           </a:xfrm>
           <a:prstGeom prst="rect">
@@ -4435,7 +4590,7 @@
           <p:cNvPr id="10" name="Rechteck 9">
             <a:extLst>
               <a:ext uri="{FF2B5EF4-FFF2-40B4-BE49-F238E27FC236}">
-                <a16:creationId xmlns:a16="http://schemas.microsoft.com/office/drawing/2014/main" xmlns="" id="{32A3E22E-D260-4C45-BA90-93973AE9B3A5}"/>
+                <a16:creationId xmlns:a16="http://schemas.microsoft.com/office/drawing/2014/main" id="{32A3E22E-D260-4C45-BA90-93973AE9B3A5}"/>
               </a:ext>
             </a:extLst>
           </p:cNvPr>
@@ -4444,7 +4599,7 @@
         </p:nvSpPr>
         <p:spPr>
           <a:xfrm>
-            <a:off x="10162765" y="590738"/>
+            <a:off x="10162765" y="187961"/>
             <a:ext cx="388725" cy="228600"/>
           </a:xfrm>
           <a:prstGeom prst="rect">
@@ -4498,7 +4653,7 @@
           <p:cNvPr id="11" name="Rechteck 10">
             <a:extLst>
               <a:ext uri="{FF2B5EF4-FFF2-40B4-BE49-F238E27FC236}">
-                <a16:creationId xmlns:a16="http://schemas.microsoft.com/office/drawing/2014/main" xmlns="" id="{D1F4732C-79DE-42D2-A58B-E8C11266ACF7}"/>
+                <a16:creationId xmlns:a16="http://schemas.microsoft.com/office/drawing/2014/main" id="{D1F4732C-79DE-42D2-A58B-E8C11266ACF7}"/>
               </a:ext>
             </a:extLst>
           </p:cNvPr>
@@ -4507,7 +4662,7 @@
         </p:nvSpPr>
         <p:spPr>
           <a:xfrm>
-            <a:off x="1374003" y="1027754"/>
+            <a:off x="1374003" y="624977"/>
             <a:ext cx="9187543" cy="446314"/>
           </a:xfrm>
           <a:prstGeom prst="rect">
@@ -4552,7 +4707,7 @@
           <p:cNvPr id="12" name="Textfeld 11">
             <a:extLst>
               <a:ext uri="{FF2B5EF4-FFF2-40B4-BE49-F238E27FC236}">
-                <a16:creationId xmlns:a16="http://schemas.microsoft.com/office/drawing/2014/main" xmlns="" id="{02FC1387-79DE-4020-9DA1-A6B3234ADFEC}"/>
+                <a16:creationId xmlns:a16="http://schemas.microsoft.com/office/drawing/2014/main" id="{02FC1387-79DE-4020-9DA1-A6B3234ADFEC}"/>
               </a:ext>
             </a:extLst>
           </p:cNvPr>
@@ -4561,7 +4716,7 @@
         </p:nvSpPr>
         <p:spPr>
           <a:xfrm flipH="1">
-            <a:off x="1374003" y="1027754"/>
+            <a:off x="1374003" y="624977"/>
             <a:ext cx="7054736" cy="461665"/>
           </a:xfrm>
           <a:prstGeom prst="rect">
@@ -4591,7 +4746,7 @@
           <p:cNvPr id="13" name="Rechteck 12">
             <a:extLst>
               <a:ext uri="{FF2B5EF4-FFF2-40B4-BE49-F238E27FC236}">
-                <a16:creationId xmlns:a16="http://schemas.microsoft.com/office/drawing/2014/main" xmlns="" id="{752BB21E-3E26-4787-B6E4-98DA671FB7D0}"/>
+                <a16:creationId xmlns:a16="http://schemas.microsoft.com/office/drawing/2014/main" id="{752BB21E-3E26-4787-B6E4-98DA671FB7D0}"/>
               </a:ext>
             </a:extLst>
           </p:cNvPr>
@@ -4600,7 +4755,7 @@
         </p:nvSpPr>
         <p:spPr>
           <a:xfrm>
-            <a:off x="10162765" y="1045761"/>
+            <a:off x="10162765" y="642984"/>
             <a:ext cx="388725" cy="228600"/>
           </a:xfrm>
           <a:prstGeom prst="rect">
@@ -4654,7 +4809,7 @@
           <p:cNvPr id="14" name="Rechteck 13">
             <a:extLst>
               <a:ext uri="{FF2B5EF4-FFF2-40B4-BE49-F238E27FC236}">
-                <a16:creationId xmlns:a16="http://schemas.microsoft.com/office/drawing/2014/main" xmlns="" id="{5AAAAF96-C88F-4697-97AA-CB25F4EE9CBE}"/>
+                <a16:creationId xmlns:a16="http://schemas.microsoft.com/office/drawing/2014/main" id="{5AAAAF96-C88F-4697-97AA-CB25F4EE9CBE}"/>
               </a:ext>
             </a:extLst>
           </p:cNvPr>
@@ -4663,7 +4818,7 @@
         </p:nvSpPr>
         <p:spPr>
           <a:xfrm>
-            <a:off x="1374003" y="1474067"/>
+            <a:off x="1374003" y="1071290"/>
             <a:ext cx="9187543" cy="1200329"/>
           </a:xfrm>
           <a:prstGeom prst="rect">
@@ -4708,7 +4863,7 @@
           <p:cNvPr id="15" name="Textfeld 14">
             <a:extLst>
               <a:ext uri="{FF2B5EF4-FFF2-40B4-BE49-F238E27FC236}">
-                <a16:creationId xmlns:a16="http://schemas.microsoft.com/office/drawing/2014/main" xmlns="" id="{4AE2C204-1AD2-4A57-A158-D3E391AA6D54}"/>
+                <a16:creationId xmlns:a16="http://schemas.microsoft.com/office/drawing/2014/main" id="{4AE2C204-1AD2-4A57-A158-D3E391AA6D54}"/>
               </a:ext>
             </a:extLst>
           </p:cNvPr>
@@ -4717,7 +4872,7 @@
         </p:nvSpPr>
         <p:spPr>
           <a:xfrm flipH="1">
-            <a:off x="1374002" y="1474068"/>
+            <a:off x="1374002" y="1071291"/>
             <a:ext cx="5930943" cy="1200329"/>
           </a:xfrm>
           <a:prstGeom prst="rect">
@@ -4763,7 +4918,7 @@
           <p:cNvPr id="16" name="Rechteck 15">
             <a:extLst>
               <a:ext uri="{FF2B5EF4-FFF2-40B4-BE49-F238E27FC236}">
-                <a16:creationId xmlns:a16="http://schemas.microsoft.com/office/drawing/2014/main" xmlns="" id="{01D6F112-ACD3-4890-BEE5-D0DD7EC947C7}"/>
+                <a16:creationId xmlns:a16="http://schemas.microsoft.com/office/drawing/2014/main" id="{01D6F112-ACD3-4890-BEE5-D0DD7EC947C7}"/>
               </a:ext>
             </a:extLst>
           </p:cNvPr>
@@ -4772,7 +4927,7 @@
         </p:nvSpPr>
         <p:spPr>
           <a:xfrm>
-            <a:off x="10162765" y="1483366"/>
+            <a:off x="10162765" y="1080589"/>
             <a:ext cx="388725" cy="228600"/>
           </a:xfrm>
           <a:prstGeom prst="rect">
@@ -4826,7 +4981,7 @@
           <p:cNvPr id="17" name="Rechteck 16">
             <a:extLst>
               <a:ext uri="{FF2B5EF4-FFF2-40B4-BE49-F238E27FC236}">
-                <a16:creationId xmlns:a16="http://schemas.microsoft.com/office/drawing/2014/main" xmlns="" id="{EA1DA133-D603-48EA-92C1-2DAA12C39D85}"/>
+                <a16:creationId xmlns:a16="http://schemas.microsoft.com/office/drawing/2014/main" id="{EA1DA133-D603-48EA-92C1-2DAA12C39D85}"/>
               </a:ext>
             </a:extLst>
           </p:cNvPr>
@@ -4835,7 +4990,7 @@
         </p:nvSpPr>
         <p:spPr>
           <a:xfrm>
-            <a:off x="1374003" y="2608064"/>
+            <a:off x="1374003" y="2205287"/>
             <a:ext cx="9187543" cy="446314"/>
           </a:xfrm>
           <a:prstGeom prst="rect">
@@ -4880,7 +5035,7 @@
           <p:cNvPr id="18" name="Textfeld 17">
             <a:extLst>
               <a:ext uri="{FF2B5EF4-FFF2-40B4-BE49-F238E27FC236}">
-                <a16:creationId xmlns:a16="http://schemas.microsoft.com/office/drawing/2014/main" xmlns="" id="{C53853E5-B461-4D3A-9188-0293B6DDD832}"/>
+                <a16:creationId xmlns:a16="http://schemas.microsoft.com/office/drawing/2014/main" id="{C53853E5-B461-4D3A-9188-0293B6DDD832}"/>
               </a:ext>
             </a:extLst>
           </p:cNvPr>
@@ -4889,7 +5044,7 @@
         </p:nvSpPr>
         <p:spPr>
           <a:xfrm flipH="1">
-            <a:off x="1374003" y="2608064"/>
+            <a:off x="1374003" y="2205287"/>
             <a:ext cx="7054736" cy="461665"/>
           </a:xfrm>
           <a:prstGeom prst="rect">
@@ -4924,7 +5079,7 @@
           <p:cNvPr id="19" name="Rechteck 18">
             <a:extLst>
               <a:ext uri="{FF2B5EF4-FFF2-40B4-BE49-F238E27FC236}">
-                <a16:creationId xmlns:a16="http://schemas.microsoft.com/office/drawing/2014/main" xmlns="" id="{A6985B62-B09B-46F3-9598-C2B18CE11416}"/>
+                <a16:creationId xmlns:a16="http://schemas.microsoft.com/office/drawing/2014/main" id="{A6985B62-B09B-46F3-9598-C2B18CE11416}"/>
               </a:ext>
             </a:extLst>
           </p:cNvPr>
@@ -4933,7 +5088,7 @@
         </p:nvSpPr>
         <p:spPr>
           <a:xfrm>
-            <a:off x="10168706" y="2620628"/>
+            <a:off x="10168706" y="2217851"/>
             <a:ext cx="388725" cy="228600"/>
           </a:xfrm>
           <a:prstGeom prst="rect">
@@ -4989,7 +5144,7 @@
           <p:cNvPr id="20" name="Rechteck 19">
             <a:extLst>
               <a:ext uri="{FF2B5EF4-FFF2-40B4-BE49-F238E27FC236}">
-                <a16:creationId xmlns:a16="http://schemas.microsoft.com/office/drawing/2014/main" xmlns="" id="{4F5A0364-3EAA-4EE8-8B99-9623CB507C49}"/>
+                <a16:creationId xmlns:a16="http://schemas.microsoft.com/office/drawing/2014/main" id="{4F5A0364-3EAA-4EE8-8B99-9623CB507C49}"/>
               </a:ext>
             </a:extLst>
           </p:cNvPr>
@@ -4998,7 +5153,7 @@
         </p:nvSpPr>
         <p:spPr>
           <a:xfrm>
-            <a:off x="1374003" y="3054378"/>
+            <a:off x="1374003" y="2651601"/>
             <a:ext cx="9187543" cy="1730302"/>
           </a:xfrm>
           <a:prstGeom prst="rect">
@@ -5041,7 +5196,7 @@
           <p:cNvPr id="21" name="Textfeld 20">
             <a:extLst>
               <a:ext uri="{FF2B5EF4-FFF2-40B4-BE49-F238E27FC236}">
-                <a16:creationId xmlns:a16="http://schemas.microsoft.com/office/drawing/2014/main" xmlns="" id="{D6FB7548-3D28-4AB5-AE59-C2442EF7AD0B}"/>
+                <a16:creationId xmlns:a16="http://schemas.microsoft.com/office/drawing/2014/main" id="{D6FB7548-3D28-4AB5-AE59-C2442EF7AD0B}"/>
               </a:ext>
             </a:extLst>
           </p:cNvPr>
@@ -5050,7 +5205,7 @@
         </p:nvSpPr>
         <p:spPr>
           <a:xfrm flipH="1">
-            <a:off x="3726678" y="3054378"/>
+            <a:off x="3726678" y="2651601"/>
             <a:ext cx="5050972" cy="461665"/>
           </a:xfrm>
           <a:prstGeom prst="rect">
@@ -5076,7 +5231,7 @@
           <p:cNvPr id="22" name="Rechteck 21">
             <a:extLst>
               <a:ext uri="{FF2B5EF4-FFF2-40B4-BE49-F238E27FC236}">
-                <a16:creationId xmlns:a16="http://schemas.microsoft.com/office/drawing/2014/main" xmlns="" id="{2B993EC2-FADA-4E55-95D7-5E5592E0B3F0}"/>
+                <a16:creationId xmlns:a16="http://schemas.microsoft.com/office/drawing/2014/main" id="{2B993EC2-FADA-4E55-95D7-5E5592E0B3F0}"/>
               </a:ext>
             </a:extLst>
           </p:cNvPr>
@@ -5085,7 +5240,7 @@
         </p:nvSpPr>
         <p:spPr>
           <a:xfrm>
-            <a:off x="10162765" y="3063676"/>
+            <a:off x="10162765" y="2660899"/>
             <a:ext cx="388725" cy="228600"/>
           </a:xfrm>
           <a:prstGeom prst="rect">
@@ -5139,7 +5294,7 @@
           <p:cNvPr id="23" name="Flussdiagramm: Verzweigung 22">
             <a:extLst>
               <a:ext uri="{FF2B5EF4-FFF2-40B4-BE49-F238E27FC236}">
-                <a16:creationId xmlns:a16="http://schemas.microsoft.com/office/drawing/2014/main" xmlns="" id="{605B1548-1E32-4D6D-B8E2-C30E1E6E5D23}"/>
+                <a16:creationId xmlns:a16="http://schemas.microsoft.com/office/drawing/2014/main" id="{605B1548-1E32-4D6D-B8E2-C30E1E6E5D23}"/>
               </a:ext>
             </a:extLst>
           </p:cNvPr>
@@ -5148,7 +5303,7 @@
         </p:nvSpPr>
         <p:spPr>
           <a:xfrm>
-            <a:off x="2442209" y="3064369"/>
+            <a:off x="2442209" y="2661592"/>
             <a:ext cx="923311" cy="877398"/>
           </a:xfrm>
           <a:prstGeom prst="flowChartDecision">
@@ -5193,7 +5348,7 @@
           <p:cNvPr id="25" name="Gerader Verbinder 24">
             <a:extLst>
               <a:ext uri="{FF2B5EF4-FFF2-40B4-BE49-F238E27FC236}">
-                <a16:creationId xmlns:a16="http://schemas.microsoft.com/office/drawing/2014/main" xmlns="" id="{A2C7D6EE-6738-46BE-9D2A-9F8FD98231C3}"/>
+                <a16:creationId xmlns:a16="http://schemas.microsoft.com/office/drawing/2014/main" id="{A2C7D6EE-6738-46BE-9D2A-9F8FD98231C3}"/>
               </a:ext>
             </a:extLst>
           </p:cNvPr>
@@ -5205,7 +5360,7 @@
         </p:nvCxnSpPr>
         <p:spPr>
           <a:xfrm>
-            <a:off x="2903865" y="3941767"/>
+            <a:off x="2903865" y="3538990"/>
             <a:ext cx="0" cy="852904"/>
           </a:xfrm>
           <a:prstGeom prst="line">
@@ -5237,7 +5392,7 @@
           <p:cNvPr id="26" name="Gerader Verbinder 25">
             <a:extLst>
               <a:ext uri="{FF2B5EF4-FFF2-40B4-BE49-F238E27FC236}">
-                <a16:creationId xmlns:a16="http://schemas.microsoft.com/office/drawing/2014/main" xmlns="" id="{FDC038D3-387F-4886-8CEE-C6A85FC7202D}"/>
+                <a16:creationId xmlns:a16="http://schemas.microsoft.com/office/drawing/2014/main" id="{FDC038D3-387F-4886-8CEE-C6A85FC7202D}"/>
               </a:ext>
             </a:extLst>
           </p:cNvPr>
@@ -5248,7 +5403,7 @@
         </p:nvCxnSpPr>
         <p:spPr>
           <a:xfrm>
-            <a:off x="3373786" y="3498853"/>
+            <a:off x="3373786" y="3096076"/>
             <a:ext cx="7183645" cy="0"/>
           </a:xfrm>
           <a:prstGeom prst="line">
@@ -5280,7 +5435,7 @@
           <p:cNvPr id="28" name="Gerader Verbinder 27">
             <a:extLst>
               <a:ext uri="{FF2B5EF4-FFF2-40B4-BE49-F238E27FC236}">
-                <a16:creationId xmlns:a16="http://schemas.microsoft.com/office/drawing/2014/main" xmlns="" id="{B36979FA-BDED-4A1D-B825-1E2296FFEA21}"/>
+                <a16:creationId xmlns:a16="http://schemas.microsoft.com/office/drawing/2014/main" id="{B36979FA-BDED-4A1D-B825-1E2296FFEA21}"/>
               </a:ext>
             </a:extLst>
           </p:cNvPr>
@@ -5292,7 +5447,7 @@
         </p:nvCxnSpPr>
         <p:spPr>
           <a:xfrm flipV="1">
-            <a:off x="1390650" y="3503068"/>
+            <a:off x="1390650" y="3100291"/>
             <a:ext cx="1051559" cy="2132"/>
           </a:xfrm>
           <a:prstGeom prst="line">
@@ -5324,7 +5479,7 @@
           <p:cNvPr id="31" name="Gerader Verbinder 30">
             <a:extLst>
               <a:ext uri="{FF2B5EF4-FFF2-40B4-BE49-F238E27FC236}">
-                <a16:creationId xmlns:a16="http://schemas.microsoft.com/office/drawing/2014/main" xmlns="" id="{E6BEA95A-F3A8-4BA3-9EC2-A03D9D760BC7}"/>
+                <a16:creationId xmlns:a16="http://schemas.microsoft.com/office/drawing/2014/main" id="{E6BEA95A-F3A8-4BA3-9EC2-A03D9D760BC7}"/>
               </a:ext>
             </a:extLst>
           </p:cNvPr>
@@ -5335,7 +5490,7 @@
         </p:nvCxnSpPr>
         <p:spPr>
           <a:xfrm flipV="1">
-            <a:off x="1374002" y="4287255"/>
+            <a:off x="1374002" y="3884478"/>
             <a:ext cx="9166781" cy="12719"/>
           </a:xfrm>
           <a:prstGeom prst="line">
@@ -5367,7 +5522,7 @@
           <p:cNvPr id="34" name="Gerader Verbinder 33">
             <a:extLst>
               <a:ext uri="{FF2B5EF4-FFF2-40B4-BE49-F238E27FC236}">
-                <a16:creationId xmlns:a16="http://schemas.microsoft.com/office/drawing/2014/main" xmlns="" id="{84A372C1-C308-4C2E-B7B5-65187E4F0D36}"/>
+                <a16:creationId xmlns:a16="http://schemas.microsoft.com/office/drawing/2014/main" id="{84A372C1-C308-4C2E-B7B5-65187E4F0D36}"/>
               </a:ext>
             </a:extLst>
           </p:cNvPr>
@@ -5378,7 +5533,7 @@
         </p:nvCxnSpPr>
         <p:spPr>
           <a:xfrm flipH="1">
-            <a:off x="5483490" y="3489328"/>
+            <a:off x="5483490" y="3086551"/>
             <a:ext cx="10705" cy="1305343"/>
           </a:xfrm>
           <a:prstGeom prst="line">
@@ -5410,7 +5565,7 @@
           <p:cNvPr id="36" name="Gerader Verbinder 35">
             <a:extLst>
               <a:ext uri="{FF2B5EF4-FFF2-40B4-BE49-F238E27FC236}">
-                <a16:creationId xmlns:a16="http://schemas.microsoft.com/office/drawing/2014/main" xmlns="" id="{1F7C7724-C429-454E-A9C6-092605A4BC2D}"/>
+                <a16:creationId xmlns:a16="http://schemas.microsoft.com/office/drawing/2014/main" id="{1F7C7724-C429-454E-A9C6-092605A4BC2D}"/>
               </a:ext>
             </a:extLst>
           </p:cNvPr>
@@ -5421,7 +5576,7 @@
         </p:nvCxnSpPr>
         <p:spPr>
           <a:xfrm flipH="1">
-            <a:off x="8038763" y="3489328"/>
+            <a:off x="8038763" y="3086551"/>
             <a:ext cx="1" cy="1295352"/>
           </a:xfrm>
           <a:prstGeom prst="line">
@@ -5453,7 +5608,7 @@
           <p:cNvPr id="38" name="Textfeld 37">
             <a:extLst>
               <a:ext uri="{FF2B5EF4-FFF2-40B4-BE49-F238E27FC236}">
-                <a16:creationId xmlns:a16="http://schemas.microsoft.com/office/drawing/2014/main" xmlns="" id="{75D030C6-DAA2-4F52-AD28-A45A8A20ABC4}"/>
+                <a16:creationId xmlns:a16="http://schemas.microsoft.com/office/drawing/2014/main" id="{75D030C6-DAA2-4F52-AD28-A45A8A20ABC4}"/>
               </a:ext>
             </a:extLst>
           </p:cNvPr>
@@ -5462,7 +5617,7 @@
         </p:nvSpPr>
         <p:spPr>
           <a:xfrm>
-            <a:off x="3407285" y="3486151"/>
+            <a:off x="3407285" y="3083374"/>
             <a:ext cx="1864375" cy="830997"/>
           </a:xfrm>
           <a:prstGeom prst="rect">
@@ -5494,7 +5649,7 @@
           <p:cNvPr id="39" name="Rechteck 38">
             <a:extLst>
               <a:ext uri="{FF2B5EF4-FFF2-40B4-BE49-F238E27FC236}">
-                <a16:creationId xmlns:a16="http://schemas.microsoft.com/office/drawing/2014/main" xmlns="" id="{BD83A34B-09D0-44E1-A2D2-C826F949147B}"/>
+                <a16:creationId xmlns:a16="http://schemas.microsoft.com/office/drawing/2014/main" id="{BD83A34B-09D0-44E1-A2D2-C826F949147B}"/>
               </a:ext>
             </a:extLst>
           </p:cNvPr>
@@ -5503,7 +5658,7 @@
         </p:nvSpPr>
         <p:spPr>
           <a:xfrm>
-            <a:off x="4956219" y="4309498"/>
+            <a:off x="4956219" y="3906721"/>
             <a:ext cx="520185" cy="281889"/>
           </a:xfrm>
           <a:prstGeom prst="rect">
@@ -5557,7 +5712,7 @@
           <p:cNvPr id="40" name="Textfeld 39">
             <a:extLst>
               <a:ext uri="{FF2B5EF4-FFF2-40B4-BE49-F238E27FC236}">
-                <a16:creationId xmlns:a16="http://schemas.microsoft.com/office/drawing/2014/main" xmlns="" id="{20304CDD-0D68-4FA8-AB24-52ACD0FFC3DA}"/>
+                <a16:creationId xmlns:a16="http://schemas.microsoft.com/office/drawing/2014/main" id="{20304CDD-0D68-4FA8-AB24-52ACD0FFC3DA}"/>
               </a:ext>
             </a:extLst>
           </p:cNvPr>
@@ -5566,7 +5721,7 @@
         </p:nvSpPr>
         <p:spPr>
           <a:xfrm>
-            <a:off x="5541220" y="3486151"/>
+            <a:off x="5541220" y="3083374"/>
             <a:ext cx="1864375" cy="830997"/>
           </a:xfrm>
           <a:prstGeom prst="rect">
@@ -5606,7 +5761,7 @@
           <p:cNvPr id="41" name="Rechteck 40">
             <a:extLst>
               <a:ext uri="{FF2B5EF4-FFF2-40B4-BE49-F238E27FC236}">
-                <a16:creationId xmlns:a16="http://schemas.microsoft.com/office/drawing/2014/main" xmlns="" id="{5EE12F05-72FE-4D21-A134-1EF962759C16}"/>
+                <a16:creationId xmlns:a16="http://schemas.microsoft.com/office/drawing/2014/main" id="{5EE12F05-72FE-4D21-A134-1EF962759C16}"/>
               </a:ext>
             </a:extLst>
           </p:cNvPr>
@@ -5615,7 +5770,7 @@
         </p:nvSpPr>
         <p:spPr>
           <a:xfrm>
-            <a:off x="7505289" y="4299974"/>
+            <a:off x="7505289" y="3897197"/>
             <a:ext cx="520185" cy="281889"/>
           </a:xfrm>
           <a:prstGeom prst="rect">
@@ -5669,7 +5824,7 @@
           <p:cNvPr id="42" name="Textfeld 41">
             <a:extLst>
               <a:ext uri="{FF2B5EF4-FFF2-40B4-BE49-F238E27FC236}">
-                <a16:creationId xmlns:a16="http://schemas.microsoft.com/office/drawing/2014/main" xmlns="" id="{639243E7-DF44-4B8A-8821-654D39B4F293}"/>
+                <a16:creationId xmlns:a16="http://schemas.microsoft.com/office/drawing/2014/main" id="{639243E7-DF44-4B8A-8821-654D39B4F293}"/>
               </a:ext>
             </a:extLst>
           </p:cNvPr>
@@ -5678,7 +5833,7 @@
         </p:nvSpPr>
         <p:spPr>
           <a:xfrm>
-            <a:off x="8113664" y="3478501"/>
+            <a:off x="8113664" y="3075724"/>
             <a:ext cx="1864375" cy="830997"/>
           </a:xfrm>
           <a:prstGeom prst="rect">
@@ -5728,7 +5883,7 @@
           <p:cNvPr id="43" name="Rechteck 42">
             <a:extLst>
               <a:ext uri="{FF2B5EF4-FFF2-40B4-BE49-F238E27FC236}">
-                <a16:creationId xmlns:a16="http://schemas.microsoft.com/office/drawing/2014/main" xmlns="" id="{9A7974D8-2E8C-4167-8ED8-ED182EC6892E}"/>
+                <a16:creationId xmlns:a16="http://schemas.microsoft.com/office/drawing/2014/main" id="{9A7974D8-2E8C-4167-8ED8-ED182EC6892E}"/>
               </a:ext>
             </a:extLst>
           </p:cNvPr>
@@ -5737,7 +5892,7 @@
         </p:nvSpPr>
         <p:spPr>
           <a:xfrm>
-            <a:off x="10021305" y="4299047"/>
+            <a:off x="10021305" y="3896270"/>
             <a:ext cx="520185" cy="281889"/>
           </a:xfrm>
           <a:prstGeom prst="rect">
@@ -5793,7 +5948,7 @@
           <p:cNvPr id="46" name="Textfeld 45">
             <a:extLst>
               <a:ext uri="{FF2B5EF4-FFF2-40B4-BE49-F238E27FC236}">
-                <a16:creationId xmlns:a16="http://schemas.microsoft.com/office/drawing/2014/main" xmlns="" id="{5069F620-E394-483F-9947-FB412E14449C}"/>
+                <a16:creationId xmlns:a16="http://schemas.microsoft.com/office/drawing/2014/main" id="{5069F620-E394-483F-9947-FB412E14449C}"/>
               </a:ext>
             </a:extLst>
           </p:cNvPr>
@@ -5802,7 +5957,7 @@
         </p:nvSpPr>
         <p:spPr>
           <a:xfrm>
-            <a:off x="5541219" y="4311821"/>
+            <a:off x="5541219" y="3909044"/>
             <a:ext cx="1864375" cy="461665"/>
           </a:xfrm>
           <a:prstGeom prst="rect">
@@ -5832,7 +5987,7 @@
           <p:cNvPr id="50" name="Textfeld 49">
             <a:extLst>
               <a:ext uri="{FF2B5EF4-FFF2-40B4-BE49-F238E27FC236}">
-                <a16:creationId xmlns:a16="http://schemas.microsoft.com/office/drawing/2014/main" xmlns="" id="{C7DEE1C3-E740-4E71-95E8-9BF837E7C8E0}"/>
+                <a16:creationId xmlns:a16="http://schemas.microsoft.com/office/drawing/2014/main" id="{C7DEE1C3-E740-4E71-95E8-9BF837E7C8E0}"/>
               </a:ext>
             </a:extLst>
           </p:cNvPr>
@@ -5841,7 +5996,7 @@
         </p:nvSpPr>
         <p:spPr>
           <a:xfrm>
-            <a:off x="8121634" y="4283815"/>
+            <a:off x="8121634" y="3881038"/>
             <a:ext cx="1864375" cy="461665"/>
           </a:xfrm>
           <a:prstGeom prst="rect">
@@ -5876,7 +6031,7 @@
           <p:cNvPr id="53" name="Rechteck 52">
             <a:extLst>
               <a:ext uri="{FF2B5EF4-FFF2-40B4-BE49-F238E27FC236}">
-                <a16:creationId xmlns:a16="http://schemas.microsoft.com/office/drawing/2014/main" xmlns="" id="{07B8D367-13E0-4B9A-ADE8-EAB16A08B3EC}"/>
+                <a16:creationId xmlns:a16="http://schemas.microsoft.com/office/drawing/2014/main" id="{07B8D367-13E0-4B9A-ADE8-EAB16A08B3EC}"/>
               </a:ext>
             </a:extLst>
           </p:cNvPr>
@@ -5885,7 +6040,7 @@
         </p:nvSpPr>
         <p:spPr>
           <a:xfrm>
-            <a:off x="1374003" y="4780907"/>
+            <a:off x="1374003" y="4378130"/>
             <a:ext cx="9187543" cy="1375890"/>
           </a:xfrm>
           <a:prstGeom prst="rect">
@@ -5930,7 +6085,7 @@
           <p:cNvPr id="54" name="Textfeld 53">
             <a:extLst>
               <a:ext uri="{FF2B5EF4-FFF2-40B4-BE49-F238E27FC236}">
-                <a16:creationId xmlns:a16="http://schemas.microsoft.com/office/drawing/2014/main" xmlns="" id="{6B9A3CCE-7802-40D6-ABE7-DF11B0BDDAF5}"/>
+                <a16:creationId xmlns:a16="http://schemas.microsoft.com/office/drawing/2014/main" id="{6B9A3CCE-7802-40D6-ABE7-DF11B0BDDAF5}"/>
               </a:ext>
             </a:extLst>
           </p:cNvPr>
@@ -5939,7 +6094,7 @@
         </p:nvSpPr>
         <p:spPr>
           <a:xfrm flipH="1">
-            <a:off x="4212082" y="4780907"/>
+            <a:off x="4212082" y="4378130"/>
             <a:ext cx="5213267" cy="461665"/>
           </a:xfrm>
           <a:prstGeom prst="rect">
@@ -5969,7 +6124,7 @@
           <p:cNvPr id="55" name="Rechteck 54">
             <a:extLst>
               <a:ext uri="{FF2B5EF4-FFF2-40B4-BE49-F238E27FC236}">
-                <a16:creationId xmlns:a16="http://schemas.microsoft.com/office/drawing/2014/main" xmlns="" id="{C23B636F-3718-46D7-A7EE-507BC5F875CF}"/>
+                <a16:creationId xmlns:a16="http://schemas.microsoft.com/office/drawing/2014/main" id="{C23B636F-3718-46D7-A7EE-507BC5F875CF}"/>
               </a:ext>
             </a:extLst>
           </p:cNvPr>
@@ -5978,7 +6133,7 @@
         </p:nvSpPr>
         <p:spPr>
           <a:xfrm>
-            <a:off x="10162765" y="4790205"/>
+            <a:off x="10162765" y="4387428"/>
             <a:ext cx="388725" cy="228600"/>
           </a:xfrm>
           <a:prstGeom prst="rect">
@@ -6032,7 +6187,7 @@
           <p:cNvPr id="56" name="Flussdiagramm: Verzweigung 55">
             <a:extLst>
               <a:ext uri="{FF2B5EF4-FFF2-40B4-BE49-F238E27FC236}">
-                <a16:creationId xmlns:a16="http://schemas.microsoft.com/office/drawing/2014/main" xmlns="" id="{3861DF78-49F6-41D6-A8EE-CC51F7C910DC}"/>
+                <a16:creationId xmlns:a16="http://schemas.microsoft.com/office/drawing/2014/main" id="{3861DF78-49F6-41D6-A8EE-CC51F7C910DC}"/>
               </a:ext>
             </a:extLst>
           </p:cNvPr>
@@ -6041,7 +6196,7 @@
         </p:nvSpPr>
         <p:spPr>
           <a:xfrm>
-            <a:off x="3175101" y="4789311"/>
+            <a:off x="3175101" y="4386534"/>
             <a:ext cx="923311" cy="877398"/>
           </a:xfrm>
           <a:prstGeom prst="flowChartDecision">
@@ -6086,7 +6241,7 @@
           <p:cNvPr id="57" name="Gerader Verbinder 56">
             <a:extLst>
               <a:ext uri="{FF2B5EF4-FFF2-40B4-BE49-F238E27FC236}">
-                <a16:creationId xmlns:a16="http://schemas.microsoft.com/office/drawing/2014/main" xmlns="" id="{FED9E886-5F2A-4EF9-99B3-A8DE23C2F43E}"/>
+                <a16:creationId xmlns:a16="http://schemas.microsoft.com/office/drawing/2014/main" id="{FED9E886-5F2A-4EF9-99B3-A8DE23C2F43E}"/>
               </a:ext>
             </a:extLst>
           </p:cNvPr>
@@ -6098,7 +6253,7 @@
         </p:nvCxnSpPr>
         <p:spPr>
           <a:xfrm>
-            <a:off x="3636757" y="5666709"/>
+            <a:off x="3636757" y="5263932"/>
             <a:ext cx="0" cy="490088"/>
           </a:xfrm>
           <a:prstGeom prst="line">
@@ -6130,7 +6285,7 @@
           <p:cNvPr id="58" name="Gerader Verbinder 57">
             <a:extLst>
               <a:ext uri="{FF2B5EF4-FFF2-40B4-BE49-F238E27FC236}">
-                <a16:creationId xmlns:a16="http://schemas.microsoft.com/office/drawing/2014/main" xmlns="" id="{55D52922-B6E8-4F7E-99E0-65055030F77F}"/>
+                <a16:creationId xmlns:a16="http://schemas.microsoft.com/office/drawing/2014/main" id="{55D52922-B6E8-4F7E-99E0-65055030F77F}"/>
               </a:ext>
             </a:extLst>
           </p:cNvPr>
@@ -6141,7 +6296,7 @@
         </p:nvCxnSpPr>
         <p:spPr>
           <a:xfrm>
-            <a:off x="4098412" y="5225382"/>
+            <a:off x="4098412" y="4822605"/>
             <a:ext cx="6459019" cy="0"/>
           </a:xfrm>
           <a:prstGeom prst="line">
@@ -6173,7 +6328,7 @@
           <p:cNvPr id="59" name="Gerader Verbinder 58">
             <a:extLst>
               <a:ext uri="{FF2B5EF4-FFF2-40B4-BE49-F238E27FC236}">
-                <a16:creationId xmlns:a16="http://schemas.microsoft.com/office/drawing/2014/main" xmlns="" id="{8CA3D68D-52FF-47CA-B1F9-434DEE2B7E1C}"/>
+                <a16:creationId xmlns:a16="http://schemas.microsoft.com/office/drawing/2014/main" id="{8CA3D68D-52FF-47CA-B1F9-434DEE2B7E1C}"/>
               </a:ext>
             </a:extLst>
           </p:cNvPr>
@@ -6185,7 +6340,7 @@
         </p:nvCxnSpPr>
         <p:spPr>
           <a:xfrm>
-            <a:off x="1390650" y="5228010"/>
+            <a:off x="1390650" y="4825233"/>
             <a:ext cx="1784451" cy="0"/>
           </a:xfrm>
           <a:prstGeom prst="line">
@@ -6217,7 +6372,7 @@
           <p:cNvPr id="60" name="Gerader Verbinder 59">
             <a:extLst>
               <a:ext uri="{FF2B5EF4-FFF2-40B4-BE49-F238E27FC236}">
-                <a16:creationId xmlns:a16="http://schemas.microsoft.com/office/drawing/2014/main" xmlns="" id="{92E74442-E99C-4F20-9D5E-BAC827DCDB54}"/>
+                <a16:creationId xmlns:a16="http://schemas.microsoft.com/office/drawing/2014/main" id="{92E74442-E99C-4F20-9D5E-BAC827DCDB54}"/>
               </a:ext>
             </a:extLst>
           </p:cNvPr>
@@ -6228,7 +6383,7 @@
         </p:nvCxnSpPr>
         <p:spPr>
           <a:xfrm flipV="1">
-            <a:off x="1394446" y="5662753"/>
+            <a:off x="1394446" y="5259976"/>
             <a:ext cx="9166781" cy="12719"/>
           </a:xfrm>
           <a:prstGeom prst="line">
@@ -6260,7 +6415,7 @@
           <p:cNvPr id="61" name="Gerader Verbinder 60">
             <a:extLst>
               <a:ext uri="{FF2B5EF4-FFF2-40B4-BE49-F238E27FC236}">
-                <a16:creationId xmlns:a16="http://schemas.microsoft.com/office/drawing/2014/main" xmlns="" id="{C64059E0-FB5E-4B79-BA96-15DF0A4E4B09}"/>
+                <a16:creationId xmlns:a16="http://schemas.microsoft.com/office/drawing/2014/main" id="{C64059E0-FB5E-4B79-BA96-15DF0A4E4B09}"/>
               </a:ext>
             </a:extLst>
           </p:cNvPr>
@@ -6271,7 +6426,7 @@
         </p:nvCxnSpPr>
         <p:spPr>
           <a:xfrm flipH="1">
-            <a:off x="6828412" y="5225382"/>
+            <a:off x="6828412" y="4822605"/>
             <a:ext cx="10705" cy="931415"/>
           </a:xfrm>
           <a:prstGeom prst="line">
@@ -6303,7 +6458,7 @@
           <p:cNvPr id="63" name="Textfeld 62">
             <a:extLst>
               <a:ext uri="{FF2B5EF4-FFF2-40B4-BE49-F238E27FC236}">
-                <a16:creationId xmlns:a16="http://schemas.microsoft.com/office/drawing/2014/main" xmlns="" id="{29B398EC-3388-477A-99FD-F08BF4259BAA}"/>
+                <a16:creationId xmlns:a16="http://schemas.microsoft.com/office/drawing/2014/main" id="{29B398EC-3388-477A-99FD-F08BF4259BAA}"/>
               </a:ext>
             </a:extLst>
           </p:cNvPr>
@@ -6312,7 +6467,7 @@
         </p:nvSpPr>
         <p:spPr>
           <a:xfrm>
-            <a:off x="4212084" y="5231668"/>
+            <a:off x="4212084" y="4828891"/>
             <a:ext cx="1423073" cy="461665"/>
           </a:xfrm>
           <a:prstGeom prst="rect">
@@ -6342,7 +6497,7 @@
           <p:cNvPr id="64" name="Rechteck 63">
             <a:extLst>
               <a:ext uri="{FF2B5EF4-FFF2-40B4-BE49-F238E27FC236}">
-                <a16:creationId xmlns:a16="http://schemas.microsoft.com/office/drawing/2014/main" xmlns="" id="{3957B726-45C8-4B79-8B25-ACA0DF14BAD7}"/>
+                <a16:creationId xmlns:a16="http://schemas.microsoft.com/office/drawing/2014/main" id="{3957B726-45C8-4B79-8B25-ACA0DF14BAD7}"/>
               </a:ext>
             </a:extLst>
           </p:cNvPr>
@@ -6351,7 +6506,7 @@
         </p:nvSpPr>
         <p:spPr>
           <a:xfrm>
-            <a:off x="6184083" y="5686799"/>
+            <a:off x="6184083" y="5284022"/>
             <a:ext cx="635684" cy="281889"/>
           </a:xfrm>
           <a:prstGeom prst="rect">
@@ -6405,7 +6560,7 @@
           <p:cNvPr id="66" name="Rechteck 65">
             <a:extLst>
               <a:ext uri="{FF2B5EF4-FFF2-40B4-BE49-F238E27FC236}">
-                <a16:creationId xmlns:a16="http://schemas.microsoft.com/office/drawing/2014/main" xmlns="" id="{8B1C817D-9BCB-42A4-B889-A93AC772DC83}"/>
+                <a16:creationId xmlns:a16="http://schemas.microsoft.com/office/drawing/2014/main" id="{8B1C817D-9BCB-42A4-B889-A93AC772DC83}"/>
               </a:ext>
             </a:extLst>
           </p:cNvPr>
@@ -6414,7 +6569,7 @@
         </p:nvSpPr>
         <p:spPr>
           <a:xfrm>
-            <a:off x="9915729" y="5677762"/>
+            <a:off x="9915729" y="5274985"/>
             <a:ext cx="633763" cy="281889"/>
           </a:xfrm>
           <a:prstGeom prst="rect">
@@ -6468,7 +6623,7 @@
           <p:cNvPr id="69" name="Textfeld 68">
             <a:extLst>
               <a:ext uri="{FF2B5EF4-FFF2-40B4-BE49-F238E27FC236}">
-                <a16:creationId xmlns:a16="http://schemas.microsoft.com/office/drawing/2014/main" xmlns="" id="{8989343F-B7A4-463D-9D82-FC147975ED85}"/>
+                <a16:creationId xmlns:a16="http://schemas.microsoft.com/office/drawing/2014/main" id="{8989343F-B7A4-463D-9D82-FC147975ED85}"/>
               </a:ext>
             </a:extLst>
           </p:cNvPr>
@@ -6477,7 +6632,7 @@
         </p:nvSpPr>
         <p:spPr>
           <a:xfrm>
-            <a:off x="3770782" y="5676453"/>
+            <a:off x="3770782" y="5273676"/>
             <a:ext cx="1864375" cy="461665"/>
           </a:xfrm>
           <a:prstGeom prst="rect">
@@ -6507,7 +6662,7 @@
           <p:cNvPr id="73" name="Textfeld 72">
             <a:extLst>
               <a:ext uri="{FF2B5EF4-FFF2-40B4-BE49-F238E27FC236}">
-                <a16:creationId xmlns:a16="http://schemas.microsoft.com/office/drawing/2014/main" xmlns="" id="{3EA93BE8-7667-4633-B7C8-7126C5273994}"/>
+                <a16:creationId xmlns:a16="http://schemas.microsoft.com/office/drawing/2014/main" id="{3EA93BE8-7667-4633-B7C8-7126C5273994}"/>
               </a:ext>
             </a:extLst>
           </p:cNvPr>
@@ -6516,7 +6671,7 @@
         </p:nvSpPr>
         <p:spPr>
           <a:xfrm>
-            <a:off x="6916803" y="5211992"/>
+            <a:off x="6916803" y="4809215"/>
             <a:ext cx="1423073" cy="461665"/>
           </a:xfrm>
           <a:prstGeom prst="rect">
@@ -6546,7 +6701,7 @@
           <p:cNvPr id="74" name="Textfeld 73">
             <a:extLst>
               <a:ext uri="{FF2B5EF4-FFF2-40B4-BE49-F238E27FC236}">
-                <a16:creationId xmlns:a16="http://schemas.microsoft.com/office/drawing/2014/main" xmlns="" id="{10927610-97FB-426A-9626-EFFF25564851}"/>
+                <a16:creationId xmlns:a16="http://schemas.microsoft.com/office/drawing/2014/main" id="{10927610-97FB-426A-9626-EFFF25564851}"/>
               </a:ext>
             </a:extLst>
           </p:cNvPr>
@@ -6555,7 +6710,7 @@
         </p:nvSpPr>
         <p:spPr>
           <a:xfrm>
-            <a:off x="6913275" y="5687035"/>
+            <a:off x="6913275" y="5284258"/>
             <a:ext cx="1864375" cy="461665"/>
           </a:xfrm>
           <a:prstGeom prst="rect">
@@ -6585,7 +6740,7 @@
           <p:cNvPr id="49" name="Rechteck 48">
             <a:extLst>
               <a:ext uri="{FF2B5EF4-FFF2-40B4-BE49-F238E27FC236}">
-                <a16:creationId xmlns:a16="http://schemas.microsoft.com/office/drawing/2014/main" xmlns="" id="{E4985257-E640-4C7B-9B97-8AA430D96AF0}"/>
+                <a16:creationId xmlns:a16="http://schemas.microsoft.com/office/drawing/2014/main" id="{E4985257-E640-4C7B-9B97-8AA430D96AF0}"/>
               </a:ext>
             </a:extLst>
           </p:cNvPr>
@@ -6594,7 +6749,7 @@
         </p:nvSpPr>
         <p:spPr>
           <a:xfrm>
-            <a:off x="1374002" y="6157136"/>
+            <a:off x="1374002" y="5754359"/>
             <a:ext cx="9187543" cy="446314"/>
           </a:xfrm>
           <a:prstGeom prst="rect">
@@ -6639,7 +6794,7 @@
           <p:cNvPr id="51" name="Textfeld 50">
             <a:extLst>
               <a:ext uri="{FF2B5EF4-FFF2-40B4-BE49-F238E27FC236}">
-                <a16:creationId xmlns:a16="http://schemas.microsoft.com/office/drawing/2014/main" xmlns="" id="{AF5659D3-D7CC-439C-AE0C-E27782F47D82}"/>
+                <a16:creationId xmlns:a16="http://schemas.microsoft.com/office/drawing/2014/main" id="{AF5659D3-D7CC-439C-AE0C-E27782F47D82}"/>
               </a:ext>
             </a:extLst>
           </p:cNvPr>
@@ -6648,8 +6803,8 @@
         </p:nvSpPr>
         <p:spPr>
           <a:xfrm flipH="1">
-            <a:off x="1374002" y="6157136"/>
-            <a:ext cx="5376724" cy="461665"/>
+            <a:off x="1374001" y="5754359"/>
+            <a:ext cx="6098203" cy="461665"/>
           </a:xfrm>
           <a:prstGeom prst="rect">
             <a:avLst/>
@@ -6663,12 +6818,8 @@
           <a:lstStyle/>
           <a:p>
             <a:r>
-              <a:rPr lang="de-DE" sz="2400" dirty="0" smtClean="0"/>
-              <a:t>Verschobener, schon vorhandener </a:t>
-            </a:r>
-            <a:r>
               <a:rPr lang="de-DE" sz="2400" dirty="0"/>
-              <a:t>Schritt</a:t>
+              <a:t>Verschobener, schon vorhandener Schritt - Ziel</a:t>
             </a:r>
           </a:p>
         </p:txBody>
@@ -6678,7 +6829,7 @@
           <p:cNvPr id="52" name="Rechteck 51">
             <a:extLst>
               <a:ext uri="{FF2B5EF4-FFF2-40B4-BE49-F238E27FC236}">
-                <a16:creationId xmlns:a16="http://schemas.microsoft.com/office/drawing/2014/main" xmlns="" id="{3148A8B5-980C-49A8-AE95-E55FF982A224}"/>
+                <a16:creationId xmlns:a16="http://schemas.microsoft.com/office/drawing/2014/main" id="{3148A8B5-980C-49A8-AE95-E55FF982A224}"/>
               </a:ext>
             </a:extLst>
           </p:cNvPr>
@@ -6687,8 +6838,8 @@
         </p:nvSpPr>
         <p:spPr>
           <a:xfrm>
-            <a:off x="9732398" y="6167192"/>
-            <a:ext cx="819092" cy="228600"/>
+            <a:off x="9524999" y="5764415"/>
+            <a:ext cx="1026491" cy="270906"/>
           </a:xfrm>
           <a:prstGeom prst="rect">
             <a:avLst/>
@@ -6734,6 +6885,15 @@
               <a:t>5.13 </a:t>
             </a:r>
             <a:r>
+              <a:rPr lang="de-DE" sz="1600" dirty="0">
+                <a:solidFill>
+                  <a:schemeClr val="tx1"/>
+                </a:solidFill>
+                <a:sym typeface="Wingdings" panose="05000000000000000000" pitchFamily="2" charset="2"/>
+              </a:rPr>
+              <a:t> </a:t>
+            </a:r>
+            <a:r>
               <a:rPr lang="de-DE" sz="1600" strike="sngStrike" dirty="0">
                 <a:solidFill>
                   <a:schemeClr val="tx1"/>
@@ -6752,7 +6912,7 @@
         </p:nvSpPr>
         <p:spPr>
           <a:xfrm>
-            <a:off x="876685" y="590738"/>
+            <a:off x="876685" y="187961"/>
             <a:ext cx="317500" cy="323662"/>
           </a:xfrm>
           <a:prstGeom prst="ellipse">
@@ -6781,10 +6941,9 @@
           <a:p>
             <a:pPr algn="ctr"/>
             <a:r>
-              <a:rPr lang="de-DE" sz="2400" dirty="0" smtClean="0"/>
+              <a:rPr lang="de-DE" sz="2400" dirty="0"/>
               <a:t>1</a:t>
             </a:r>
-            <a:endParaRPr lang="de-DE" sz="2400" dirty="0"/>
           </a:p>
         </p:txBody>
       </p:sp>
@@ -6796,7 +6955,7 @@
         </p:nvSpPr>
         <p:spPr>
           <a:xfrm>
-            <a:off x="876685" y="1089080"/>
+            <a:off x="876685" y="686303"/>
             <a:ext cx="317500" cy="323662"/>
           </a:xfrm>
           <a:prstGeom prst="ellipse">
@@ -6839,7 +6998,7 @@
         </p:nvSpPr>
         <p:spPr>
           <a:xfrm>
-            <a:off x="876685" y="1587422"/>
+            <a:off x="876685" y="1184645"/>
             <a:ext cx="317500" cy="323662"/>
           </a:xfrm>
           <a:prstGeom prst="ellipse">
@@ -6882,7 +7041,7 @@
         </p:nvSpPr>
         <p:spPr>
           <a:xfrm>
-            <a:off x="7293870" y="3608957"/>
+            <a:off x="7293870" y="3206180"/>
             <a:ext cx="317500" cy="323662"/>
           </a:xfrm>
           <a:prstGeom prst="ellipse">
@@ -6925,7 +7084,7 @@
         </p:nvSpPr>
         <p:spPr>
           <a:xfrm>
-            <a:off x="10052939" y="3612562"/>
+            <a:off x="10052939" y="3209785"/>
             <a:ext cx="317500" cy="323662"/>
           </a:xfrm>
           <a:prstGeom prst="ellipse">
@@ -6968,7 +7127,7 @@
         </p:nvSpPr>
         <p:spPr>
           <a:xfrm>
-            <a:off x="876685" y="4849908"/>
+            <a:off x="876685" y="4447131"/>
             <a:ext cx="317500" cy="323662"/>
           </a:xfrm>
           <a:prstGeom prst="ellipse">
@@ -7011,7 +7170,7 @@
         </p:nvSpPr>
         <p:spPr>
           <a:xfrm>
-            <a:off x="876685" y="6218462"/>
+            <a:off x="876685" y="5764415"/>
             <a:ext cx="317500" cy="323662"/>
           </a:xfrm>
           <a:prstGeom prst="ellipse">
@@ -7053,8 +7212,8 @@
           <p:nvPr/>
         </p:nvSpPr>
         <p:spPr>
-          <a:xfrm>
-            <a:off x="74571" y="60584"/>
+          <a:xfrm rot="16200000">
+            <a:off x="-2262412" y="1402755"/>
             <a:ext cx="5077873" cy="369332"/>
           </a:xfrm>
           <a:prstGeom prst="rect">
@@ -7069,10 +7228,249 @@
           <a:lstStyle/>
           <a:p>
             <a:r>
-              <a:rPr lang="de-DE" dirty="0" smtClean="0"/>
+              <a:rPr lang="de-DE" dirty="0"/>
               <a:t>Darstellungsformen im Änderungsmodus</a:t>
             </a:r>
-            <a:endParaRPr lang="de-DE" dirty="0"/>
+          </a:p>
+        </p:txBody>
+      </p:sp>
+      <p:sp>
+        <p:nvSpPr>
+          <p:cNvPr id="72" name="Rechteck 71">
+            <a:extLst>
+              <a:ext uri="{FF2B5EF4-FFF2-40B4-BE49-F238E27FC236}">
+                <a16:creationId xmlns:a16="http://schemas.microsoft.com/office/drawing/2014/main" id="{C3B77CF2-813C-49FE-895A-9DC2FF17F7F5}"/>
+              </a:ext>
+            </a:extLst>
+          </p:cNvPr>
+          <p:cNvSpPr/>
+          <p:nvPr/>
+        </p:nvSpPr>
+        <p:spPr>
+          <a:xfrm>
+            <a:off x="1374001" y="6200063"/>
+            <a:ext cx="9187543" cy="270906"/>
+          </a:xfrm>
+          <a:prstGeom prst="rect">
+            <a:avLst/>
+          </a:prstGeom>
+          <a:solidFill>
+            <a:schemeClr val="bg1"/>
+          </a:solidFill>
+          <a:ln w="19050">
+            <a:solidFill>
+              <a:schemeClr val="tx1"/>
+            </a:solidFill>
+          </a:ln>
+        </p:spPr>
+        <p:style>
+          <a:lnRef idx="2">
+            <a:schemeClr val="accent1">
+              <a:shade val="50000"/>
+            </a:schemeClr>
+          </a:lnRef>
+          <a:fillRef idx="1">
+            <a:schemeClr val="accent1"/>
+          </a:fillRef>
+          <a:effectRef idx="0">
+            <a:schemeClr val="accent1"/>
+          </a:effectRef>
+          <a:fontRef idx="minor">
+            <a:schemeClr val="lt1"/>
+          </a:fontRef>
+        </p:style>
+        <p:txBody>
+          <a:bodyPr rtlCol="0" anchor="ctr"/>
+          <a:lstStyle/>
+          <a:p>
+            <a:pPr algn="ctr"/>
+            <a:endParaRPr lang="de-DE"/>
+          </a:p>
+        </p:txBody>
+      </p:sp>
+      <p:sp>
+        <p:nvSpPr>
+          <p:cNvPr id="76" name="Rechteck 75">
+            <a:extLst>
+              <a:ext uri="{FF2B5EF4-FFF2-40B4-BE49-F238E27FC236}">
+                <a16:creationId xmlns:a16="http://schemas.microsoft.com/office/drawing/2014/main" id="{6751CE07-E151-468C-BC13-581C281AEDD0}"/>
+              </a:ext>
+            </a:extLst>
+          </p:cNvPr>
+          <p:cNvSpPr/>
+          <p:nvPr/>
+        </p:nvSpPr>
+        <p:spPr>
+          <a:xfrm>
+            <a:off x="9541647" y="6210118"/>
+            <a:ext cx="1009842" cy="263071"/>
+          </a:xfrm>
+          <a:prstGeom prst="rect">
+            <a:avLst/>
+          </a:prstGeom>
+          <a:solidFill>
+            <a:schemeClr val="tx1"/>
+          </a:solidFill>
+          <a:ln w="19050">
+            <a:solidFill>
+              <a:srgbClr val="000000">
+                <a:alpha val="0"/>
+              </a:srgbClr>
+            </a:solidFill>
+          </a:ln>
+        </p:spPr>
+        <p:style>
+          <a:lnRef idx="2">
+            <a:schemeClr val="accent1">
+              <a:shade val="50000"/>
+            </a:schemeClr>
+          </a:lnRef>
+          <a:fillRef idx="1">
+            <a:schemeClr val="accent1"/>
+          </a:fillRef>
+          <a:effectRef idx="0">
+            <a:schemeClr val="accent1"/>
+          </a:effectRef>
+          <a:fontRef idx="minor">
+            <a:schemeClr val="lt1"/>
+          </a:fontRef>
+        </p:style>
+        <p:txBody>
+          <a:bodyPr lIns="36000" rIns="36000" rtlCol="0" anchor="ctr"/>
+          <a:lstStyle/>
+          <a:p>
+            <a:pPr algn="ctr"/>
+            <a:r>
+              <a:rPr lang="de-DE" sz="1600" strike="sngStrike" dirty="0">
+                <a:solidFill>
+                  <a:schemeClr val="bg1">
+                    <a:lumMod val="65000"/>
+                  </a:schemeClr>
+                </a:solidFill>
+              </a:rPr>
+              <a:t>5.14</a:t>
+            </a:r>
+            <a:r>
+              <a:rPr lang="de-DE" sz="1600" dirty="0">
+                <a:solidFill>
+                  <a:schemeClr val="bg1">
+                    <a:lumMod val="65000"/>
+                  </a:schemeClr>
+                </a:solidFill>
+              </a:rPr>
+              <a:t> </a:t>
+            </a:r>
+            <a:r>
+              <a:rPr lang="de-DE" sz="1600" dirty="0">
+                <a:solidFill>
+                  <a:schemeClr val="bg1">
+                    <a:lumMod val="65000"/>
+                  </a:schemeClr>
+                </a:solidFill>
+                <a:sym typeface="Wingdings" panose="05000000000000000000" pitchFamily="2" charset="2"/>
+              </a:rPr>
+              <a:t> </a:t>
+            </a:r>
+            <a:r>
+              <a:rPr lang="de-DE" sz="1600" dirty="0">
+                <a:solidFill>
+                  <a:schemeClr val="bg1">
+                    <a:lumMod val="65000"/>
+                  </a:schemeClr>
+                </a:solidFill>
+              </a:rPr>
+              <a:t>2.1</a:t>
+            </a:r>
+          </a:p>
+        </p:txBody>
+      </p:sp>
+      <p:sp>
+        <p:nvSpPr>
+          <p:cNvPr id="77" name="Textfeld 76">
+            <a:extLst>
+              <a:ext uri="{FF2B5EF4-FFF2-40B4-BE49-F238E27FC236}">
+                <a16:creationId xmlns:a16="http://schemas.microsoft.com/office/drawing/2014/main" id="{412C5B2F-CBE0-47C8-BABE-EFD7EC23F014}"/>
+              </a:ext>
+            </a:extLst>
+          </p:cNvPr>
+          <p:cNvSpPr txBox="1"/>
+          <p:nvPr/>
+        </p:nvSpPr>
+        <p:spPr>
+          <a:xfrm flipH="1">
+            <a:off x="1390650" y="6179596"/>
+            <a:ext cx="8134349" cy="307777"/>
+          </a:xfrm>
+          <a:prstGeom prst="rect">
+            <a:avLst/>
+          </a:prstGeom>
+          <a:noFill/>
+        </p:spPr>
+        <p:txBody>
+          <a:bodyPr wrap="square" rtlCol="0">
+            <a:spAutoFit/>
+          </a:bodyPr>
+          <a:lstStyle/>
+          <a:p>
+            <a:r>
+              <a:rPr lang="de-DE" sz="1400" dirty="0">
+                <a:solidFill>
+                  <a:schemeClr val="bg1">
+                    <a:lumMod val="65000"/>
+                  </a:schemeClr>
+                </a:solidFill>
+              </a:rPr>
+              <a:t>Verschobener, schon vorhandener Schritt – Quelle: kein Text, keine Unterstruktur, so schmal wie das ID-Label</a:t>
+            </a:r>
+          </a:p>
+        </p:txBody>
+      </p:sp>
+      <p:sp>
+        <p:nvSpPr>
+          <p:cNvPr id="78" name="Ellipse 77">
+            <a:extLst>
+              <a:ext uri="{FF2B5EF4-FFF2-40B4-BE49-F238E27FC236}">
+                <a16:creationId xmlns:a16="http://schemas.microsoft.com/office/drawing/2014/main" id="{39006C0F-CB62-4BBE-B4FD-A97CFF701616}"/>
+              </a:ext>
+            </a:extLst>
+          </p:cNvPr>
+          <p:cNvSpPr/>
+          <p:nvPr/>
+        </p:nvSpPr>
+        <p:spPr>
+          <a:xfrm>
+            <a:off x="876685" y="6182387"/>
+            <a:ext cx="317500" cy="323662"/>
+          </a:xfrm>
+          <a:prstGeom prst="ellipse">
+            <a:avLst/>
+          </a:prstGeom>
+        </p:spPr>
+        <p:style>
+          <a:lnRef idx="2">
+            <a:schemeClr val="accent1">
+              <a:shade val="50000"/>
+            </a:schemeClr>
+          </a:lnRef>
+          <a:fillRef idx="1">
+            <a:schemeClr val="accent1"/>
+          </a:fillRef>
+          <a:effectRef idx="0">
+            <a:schemeClr val="accent1"/>
+          </a:effectRef>
+          <a:fontRef idx="minor">
+            <a:schemeClr val="lt1"/>
+          </a:fontRef>
+        </p:style>
+        <p:txBody>
+          <a:bodyPr rtlCol="0" anchor="ctr"/>
+          <a:lstStyle/>
+          <a:p>
+            <a:pPr algn="ctr"/>
+            <a:r>
+              <a:rPr lang="de-DE" sz="2400" dirty="0"/>
+              <a:t>8</a:t>
+            </a:r>
           </a:p>
         </p:txBody>
       </p:sp>
@@ -7129,10 +7527,9 @@
           <a:lstStyle/>
           <a:p>
             <a:r>
-              <a:rPr lang="de-DE" dirty="0" smtClean="0"/>
+              <a:rPr lang="de-DE" dirty="0"/>
               <a:t>Darstellung abgesetzte Subsequenz </a:t>
             </a:r>
-            <a:endParaRPr lang="de-DE" dirty="0"/>
           </a:p>
         </p:txBody>
       </p:sp>
@@ -7141,7 +7538,7 @@
           <p:cNvPr id="5" name="Rechteck 4">
             <a:extLst>
               <a:ext uri="{FF2B5EF4-FFF2-40B4-BE49-F238E27FC236}">
-                <a16:creationId xmlns:a16="http://schemas.microsoft.com/office/drawing/2014/main" xmlns="" id="{5E7DB929-572D-4E95-82E8-B6DD989776DD}"/>
+                <a16:creationId xmlns:a16="http://schemas.microsoft.com/office/drawing/2014/main" id="{5E7DB929-572D-4E95-82E8-B6DD989776DD}"/>
               </a:ext>
             </a:extLst>
           </p:cNvPr>
@@ -7195,7 +7592,7 @@
           <p:cNvPr id="6" name="Textfeld 5">
             <a:extLst>
               <a:ext uri="{FF2B5EF4-FFF2-40B4-BE49-F238E27FC236}">
-                <a16:creationId xmlns:a16="http://schemas.microsoft.com/office/drawing/2014/main" xmlns="" id="{672F2C52-F706-4C2C-9BA1-C4050D78BE85}"/>
+                <a16:creationId xmlns:a16="http://schemas.microsoft.com/office/drawing/2014/main" id="{672F2C52-F706-4C2C-9BA1-C4050D78BE85}"/>
               </a:ext>
             </a:extLst>
           </p:cNvPr>
@@ -7219,10 +7616,9 @@
           <a:lstStyle/>
           <a:p>
             <a:r>
-              <a:rPr lang="de-DE" sz="2400" dirty="0" smtClean="0"/>
+              <a:rPr lang="de-DE" sz="2400" dirty="0"/>
               <a:t>Vorgängerschritt in gleicher Sequenz</a:t>
             </a:r>
-            <a:endParaRPr lang="de-DE" sz="2400" dirty="0"/>
           </a:p>
         </p:txBody>
       </p:sp>
@@ -7231,7 +7627,7 @@
           <p:cNvPr id="7" name="Rechteck 6">
             <a:extLst>
               <a:ext uri="{FF2B5EF4-FFF2-40B4-BE49-F238E27FC236}">
-                <a16:creationId xmlns:a16="http://schemas.microsoft.com/office/drawing/2014/main" xmlns="" id="{32A3E22E-D260-4C45-BA90-93973AE9B3A5}"/>
+                <a16:creationId xmlns:a16="http://schemas.microsoft.com/office/drawing/2014/main" id="{32A3E22E-D260-4C45-BA90-93973AE9B3A5}"/>
               </a:ext>
             </a:extLst>
           </p:cNvPr>
@@ -7294,7 +7690,7 @@
           <p:cNvPr id="8" name="Rechteck 7">
             <a:extLst>
               <a:ext uri="{FF2B5EF4-FFF2-40B4-BE49-F238E27FC236}">
-                <a16:creationId xmlns:a16="http://schemas.microsoft.com/office/drawing/2014/main" xmlns="" id="{5E7DB929-572D-4E95-82E8-B6DD989776DD}"/>
+                <a16:creationId xmlns:a16="http://schemas.microsoft.com/office/drawing/2014/main" id="{5E7DB929-572D-4E95-82E8-B6DD989776DD}"/>
               </a:ext>
             </a:extLst>
           </p:cNvPr>
@@ -7348,7 +7744,7 @@
           <p:cNvPr id="12" name="Rechteck 11">
             <a:extLst>
               <a:ext uri="{FF2B5EF4-FFF2-40B4-BE49-F238E27FC236}">
-                <a16:creationId xmlns:a16="http://schemas.microsoft.com/office/drawing/2014/main" xmlns="" id="{5E7DB929-572D-4E95-82E8-B6DD989776DD}"/>
+                <a16:creationId xmlns:a16="http://schemas.microsoft.com/office/drawing/2014/main" id="{5E7DB929-572D-4E95-82E8-B6DD989776DD}"/>
               </a:ext>
             </a:extLst>
           </p:cNvPr>
@@ -7402,7 +7798,7 @@
           <p:cNvPr id="13" name="Textfeld 12">
             <a:extLst>
               <a:ext uri="{FF2B5EF4-FFF2-40B4-BE49-F238E27FC236}">
-                <a16:creationId xmlns:a16="http://schemas.microsoft.com/office/drawing/2014/main" xmlns="" id="{672F2C52-F706-4C2C-9BA1-C4050D78BE85}"/>
+                <a16:creationId xmlns:a16="http://schemas.microsoft.com/office/drawing/2014/main" id="{672F2C52-F706-4C2C-9BA1-C4050D78BE85}"/>
               </a:ext>
             </a:extLst>
           </p:cNvPr>
@@ -7426,10 +7822,9 @@
           <a:lstStyle/>
           <a:p>
             <a:r>
-              <a:rPr lang="de-DE" sz="2400" dirty="0" smtClean="0"/>
+              <a:rPr lang="de-DE" sz="2400" dirty="0"/>
               <a:t>Nachfolgeschritt in gleicher Sequenz</a:t>
             </a:r>
-            <a:endParaRPr lang="de-DE" sz="2400" dirty="0"/>
           </a:p>
         </p:txBody>
       </p:sp>
@@ -7438,7 +7833,7 @@
           <p:cNvPr id="14" name="Rechteck 13">
             <a:extLst>
               <a:ext uri="{FF2B5EF4-FFF2-40B4-BE49-F238E27FC236}">
-                <a16:creationId xmlns:a16="http://schemas.microsoft.com/office/drawing/2014/main" xmlns="" id="{32A3E22E-D260-4C45-BA90-93973AE9B3A5}"/>
+                <a16:creationId xmlns:a16="http://schemas.microsoft.com/office/drawing/2014/main" id="{32A3E22E-D260-4C45-BA90-93973AE9B3A5}"/>
               </a:ext>
             </a:extLst>
           </p:cNvPr>
@@ -7486,18 +7881,13 @@
           <a:p>
             <a:pPr algn="ctr"/>
             <a:r>
-              <a:rPr lang="de-DE" sz="1600" dirty="0" smtClean="0">
+              <a:rPr lang="de-DE" sz="1600" dirty="0">
                 <a:solidFill>
                   <a:schemeClr val="tx1"/>
                 </a:solidFill>
               </a:rPr>
               <a:t>5.3</a:t>
             </a:r>
-            <a:endParaRPr lang="de-DE" sz="1600" dirty="0">
-              <a:solidFill>
-                <a:schemeClr val="tx1"/>
-              </a:solidFill>
-            </a:endParaRPr>
           </a:p>
         </p:txBody>
       </p:sp>
@@ -7644,7 +8034,7 @@
           <p:cNvPr id="9" name="Textfeld 8">
             <a:extLst>
               <a:ext uri="{FF2B5EF4-FFF2-40B4-BE49-F238E27FC236}">
-                <a16:creationId xmlns:a16="http://schemas.microsoft.com/office/drawing/2014/main" xmlns="" id="{672F2C52-F706-4C2C-9BA1-C4050D78BE85}"/>
+                <a16:creationId xmlns:a16="http://schemas.microsoft.com/office/drawing/2014/main" id="{672F2C52-F706-4C2C-9BA1-C4050D78BE85}"/>
               </a:ext>
             </a:extLst>
           </p:cNvPr>
@@ -7668,10 +8058,9 @@
           <a:lstStyle/>
           <a:p>
             <a:r>
-              <a:rPr lang="de-DE" sz="2400" b="1" dirty="0" smtClean="0"/>
+              <a:rPr lang="de-DE" sz="2400" b="1" dirty="0"/>
               <a:t>Überschrift Subsequenz</a:t>
             </a:r>
-            <a:endParaRPr lang="de-DE" sz="2400" b="1" dirty="0"/>
           </a:p>
         </p:txBody>
       </p:sp>
@@ -7737,7 +8126,7 @@
           <p:cNvPr id="10" name="Rechteck 9">
             <a:extLst>
               <a:ext uri="{FF2B5EF4-FFF2-40B4-BE49-F238E27FC236}">
-                <a16:creationId xmlns:a16="http://schemas.microsoft.com/office/drawing/2014/main" xmlns="" id="{32A3E22E-D260-4C45-BA90-93973AE9B3A5}"/>
+                <a16:creationId xmlns:a16="http://schemas.microsoft.com/office/drawing/2014/main" id="{32A3E22E-D260-4C45-BA90-93973AE9B3A5}"/>
               </a:ext>
             </a:extLst>
           </p:cNvPr>
@@ -7785,18 +8174,13 @@
           <a:p>
             <a:pPr algn="ctr"/>
             <a:r>
-              <a:rPr lang="de-DE" sz="1600" dirty="0" smtClean="0">
+              <a:rPr lang="de-DE" sz="1600" dirty="0">
                 <a:solidFill>
                   <a:schemeClr val="tx1"/>
                 </a:solidFill>
               </a:rPr>
               <a:t>5.2</a:t>
             </a:r>
-            <a:endParaRPr lang="de-DE" sz="1600" dirty="0">
-              <a:solidFill>
-                <a:schemeClr val="tx1"/>
-              </a:solidFill>
-            </a:endParaRPr>
           </a:p>
         </p:txBody>
       </p:sp>
@@ -7805,7 +8189,7 @@
           <p:cNvPr id="24" name="Textfeld 23">
             <a:extLst>
               <a:ext uri="{FF2B5EF4-FFF2-40B4-BE49-F238E27FC236}">
-                <a16:creationId xmlns:a16="http://schemas.microsoft.com/office/drawing/2014/main" xmlns="" id="{672F2C52-F706-4C2C-9BA1-C4050D78BE85}"/>
+                <a16:creationId xmlns:a16="http://schemas.microsoft.com/office/drawing/2014/main" id="{672F2C52-F706-4C2C-9BA1-C4050D78BE85}"/>
               </a:ext>
             </a:extLst>
           </p:cNvPr>
@@ -7829,10 +8213,9 @@
           <a:lstStyle/>
           <a:p>
             <a:r>
-              <a:rPr lang="de-DE" sz="2400" dirty="0" smtClean="0"/>
+              <a:rPr lang="de-DE" sz="2400" dirty="0"/>
               <a:t>Schritt in Subsequenz</a:t>
             </a:r>
-            <a:endParaRPr lang="de-DE" sz="2400" dirty="0"/>
           </a:p>
         </p:txBody>
       </p:sp>
@@ -7841,7 +8224,7 @@
           <p:cNvPr id="25" name="Rechteck 24">
             <a:extLst>
               <a:ext uri="{FF2B5EF4-FFF2-40B4-BE49-F238E27FC236}">
-                <a16:creationId xmlns:a16="http://schemas.microsoft.com/office/drawing/2014/main" xmlns="" id="{32A3E22E-D260-4C45-BA90-93973AE9B3A5}"/>
+                <a16:creationId xmlns:a16="http://schemas.microsoft.com/office/drawing/2014/main" id="{32A3E22E-D260-4C45-BA90-93973AE9B3A5}"/>
               </a:ext>
             </a:extLst>
           </p:cNvPr>
@@ -7889,18 +8272,13 @@
           <a:p>
             <a:pPr algn="ctr"/>
             <a:r>
-              <a:rPr lang="de-DE" sz="1600" dirty="0" smtClean="0">
+              <a:rPr lang="de-DE" sz="1600" dirty="0">
                 <a:solidFill>
                   <a:schemeClr val="tx1"/>
                 </a:solidFill>
               </a:rPr>
               <a:t>5.2.1</a:t>
             </a:r>
-            <a:endParaRPr lang="de-DE" sz="1600" dirty="0">
-              <a:solidFill>
-                <a:schemeClr val="tx1"/>
-              </a:solidFill>
-            </a:endParaRPr>
           </a:p>
         </p:txBody>
       </p:sp>
@@ -7960,7 +8338,7 @@
           <p:cNvPr id="26" name="Rechteck 25">
             <a:extLst>
               <a:ext uri="{FF2B5EF4-FFF2-40B4-BE49-F238E27FC236}">
-                <a16:creationId xmlns:a16="http://schemas.microsoft.com/office/drawing/2014/main" xmlns="" id="{32A3E22E-D260-4C45-BA90-93973AE9B3A5}"/>
+                <a16:creationId xmlns:a16="http://schemas.microsoft.com/office/drawing/2014/main" id="{32A3E22E-D260-4C45-BA90-93973AE9B3A5}"/>
               </a:ext>
             </a:extLst>
           </p:cNvPr>
@@ -8008,18 +8386,13 @@
           <a:p>
             <a:pPr algn="ctr"/>
             <a:r>
-              <a:rPr lang="de-DE" sz="1600" dirty="0" smtClean="0">
+              <a:rPr lang="de-DE" sz="1600" dirty="0">
                 <a:solidFill>
                   <a:schemeClr val="tx1"/>
                 </a:solidFill>
               </a:rPr>
               <a:t>5.2.2</a:t>
             </a:r>
-            <a:endParaRPr lang="de-DE" sz="1600" dirty="0">
-              <a:solidFill>
-                <a:schemeClr val="tx1"/>
-              </a:solidFill>
-            </a:endParaRPr>
           </a:p>
         </p:txBody>
       </p:sp>
@@ -8028,7 +8401,7 @@
           <p:cNvPr id="29" name="Textfeld 28">
             <a:extLst>
               <a:ext uri="{FF2B5EF4-FFF2-40B4-BE49-F238E27FC236}">
-                <a16:creationId xmlns:a16="http://schemas.microsoft.com/office/drawing/2014/main" xmlns="" id="{672F2C52-F706-4C2C-9BA1-C4050D78BE85}"/>
+                <a16:creationId xmlns:a16="http://schemas.microsoft.com/office/drawing/2014/main" id="{672F2C52-F706-4C2C-9BA1-C4050D78BE85}"/>
               </a:ext>
             </a:extLst>
           </p:cNvPr>
@@ -8052,10 +8425,9 @@
           <a:lstStyle/>
           <a:p>
             <a:r>
-              <a:rPr lang="de-DE" sz="2400" dirty="0" smtClean="0"/>
+              <a:rPr lang="de-DE" sz="2400" dirty="0"/>
               <a:t>Letzter Schritt in Subsequenz</a:t>
             </a:r>
-            <a:endParaRPr lang="de-DE" sz="2400" dirty="0"/>
           </a:p>
         </p:txBody>
       </p:sp>
@@ -8117,7 +8489,7 @@
           <p:cNvPr id="61" name="Textfeld 60">
             <a:extLst>
               <a:ext uri="{FF2B5EF4-FFF2-40B4-BE49-F238E27FC236}">
-                <a16:creationId xmlns:a16="http://schemas.microsoft.com/office/drawing/2014/main" xmlns="" id="{672F2C52-F706-4C2C-9BA1-C4050D78BE85}"/>
+                <a16:creationId xmlns:a16="http://schemas.microsoft.com/office/drawing/2014/main" id="{672F2C52-F706-4C2C-9BA1-C4050D78BE85}"/>
               </a:ext>
             </a:extLst>
           </p:cNvPr>
@@ -8150,10 +8522,9 @@
           <a:lstStyle/>
           <a:p>
             <a:r>
-              <a:rPr lang="de-DE" sz="3200" b="1" dirty="0" smtClean="0"/>
+              <a:rPr lang="de-DE" sz="3200" b="1" dirty="0"/>
               <a:t>Überschrift</a:t>
             </a:r>
-            <a:endParaRPr lang="de-DE" sz="3200" b="1" dirty="0"/>
           </a:p>
         </p:txBody>
       </p:sp>
@@ -8219,7 +8590,7 @@
           <p:cNvPr id="63" name="Rechteck 62">
             <a:extLst>
               <a:ext uri="{FF2B5EF4-FFF2-40B4-BE49-F238E27FC236}">
-                <a16:creationId xmlns:a16="http://schemas.microsoft.com/office/drawing/2014/main" xmlns="" id="{32A3E22E-D260-4C45-BA90-93973AE9B3A5}"/>
+                <a16:creationId xmlns:a16="http://schemas.microsoft.com/office/drawing/2014/main" id="{32A3E22E-D260-4C45-BA90-93973AE9B3A5}"/>
               </a:ext>
             </a:extLst>
           </p:cNvPr>
@@ -8267,18 +8638,13 @@
           <a:p>
             <a:pPr algn="ctr"/>
             <a:r>
-              <a:rPr lang="de-DE" sz="2800" dirty="0" smtClean="0">
+              <a:rPr lang="de-DE" sz="2800" dirty="0">
                 <a:solidFill>
                   <a:schemeClr val="tx1"/>
                 </a:solidFill>
               </a:rPr>
               <a:t>5.2</a:t>
             </a:r>
-            <a:endParaRPr lang="de-DE" sz="2800" dirty="0">
-              <a:solidFill>
-                <a:schemeClr val="tx1"/>
-              </a:solidFill>
-            </a:endParaRPr>
           </a:p>
         </p:txBody>
       </p:sp>
@@ -8338,16 +8704,15 @@
           <a:lstStyle/>
           <a:p>
             <a:r>
-              <a:rPr lang="de-DE" dirty="0" smtClean="0"/>
+              <a:rPr lang="de-DE" dirty="0"/>
               <a:t>Einzug der Überschrift links und rechts </a:t>
             </a:r>
           </a:p>
           <a:p>
             <a:r>
-              <a:rPr lang="de-DE" dirty="0" smtClean="0"/>
+              <a:rPr lang="de-DE" dirty="0"/>
               <a:t>= Radius der Abrundung</a:t>
             </a:r>
-            <a:endParaRPr lang="de-DE" dirty="0"/>
           </a:p>
         </p:txBody>
       </p:sp>
@@ -8407,16 +8772,15 @@
           <a:lstStyle/>
           <a:p>
             <a:r>
-              <a:rPr lang="de-DE" dirty="0" smtClean="0"/>
+              <a:rPr lang="de-DE" dirty="0"/>
               <a:t>Einzug der Schrittnummer rechts </a:t>
             </a:r>
           </a:p>
           <a:p>
             <a:r>
-              <a:rPr lang="de-DE" dirty="0" smtClean="0"/>
+              <a:rPr lang="de-DE" dirty="0"/>
               <a:t>= Radius der Abrundung</a:t>
             </a:r>
-            <a:endParaRPr lang="de-DE" dirty="0"/>
           </a:p>
         </p:txBody>
       </p:sp>
@@ -8466,18 +8830,13 @@
           <a:p>
             <a:pPr algn="ctr"/>
             <a:r>
-              <a:rPr lang="de-DE" sz="1600" dirty="0" smtClean="0">
+              <a:rPr lang="de-DE" sz="1600" dirty="0">
                 <a:solidFill>
                   <a:schemeClr val="tx1"/>
                 </a:solidFill>
               </a:rPr>
               <a:t>Radius muss sich abhängig vom Zoomfaktor ändern</a:t>
             </a:r>
-            <a:endParaRPr lang="de-DE" sz="1600" dirty="0">
-              <a:solidFill>
-                <a:schemeClr val="tx1"/>
-              </a:solidFill>
-            </a:endParaRPr>
           </a:p>
         </p:txBody>
       </p:sp>
@@ -8516,7 +8875,7 @@
           <p:cNvPr id="4" name="Rechteck 3">
             <a:extLst>
               <a:ext uri="{FF2B5EF4-FFF2-40B4-BE49-F238E27FC236}">
-                <a16:creationId xmlns:a16="http://schemas.microsoft.com/office/drawing/2014/main" xmlns="" id="{5E7DB929-572D-4E95-82E8-B6DD989776DD}"/>
+                <a16:creationId xmlns:a16="http://schemas.microsoft.com/office/drawing/2014/main" id="{5E7DB929-572D-4E95-82E8-B6DD989776DD}"/>
               </a:ext>
             </a:extLst>
           </p:cNvPr>
@@ -8570,7 +8929,7 @@
           <p:cNvPr id="5" name="Textfeld 4">
             <a:extLst>
               <a:ext uri="{FF2B5EF4-FFF2-40B4-BE49-F238E27FC236}">
-                <a16:creationId xmlns:a16="http://schemas.microsoft.com/office/drawing/2014/main" xmlns="" id="{672F2C52-F706-4C2C-9BA1-C4050D78BE85}"/>
+                <a16:creationId xmlns:a16="http://schemas.microsoft.com/office/drawing/2014/main" id="{672F2C52-F706-4C2C-9BA1-C4050D78BE85}"/>
               </a:ext>
             </a:extLst>
           </p:cNvPr>
@@ -8594,10 +8953,9 @@
           <a:lstStyle/>
           <a:p>
             <a:r>
-              <a:rPr lang="de-DE" sz="2400" dirty="0" smtClean="0"/>
+              <a:rPr lang="de-DE" sz="2400" dirty="0"/>
               <a:t>Vorgängerschritt in gleicher Sequenz</a:t>
             </a:r>
-            <a:endParaRPr lang="de-DE" sz="2400" dirty="0"/>
           </a:p>
         </p:txBody>
       </p:sp>
@@ -8606,7 +8964,7 @@
           <p:cNvPr id="6" name="Rechteck 5">
             <a:extLst>
               <a:ext uri="{FF2B5EF4-FFF2-40B4-BE49-F238E27FC236}">
-                <a16:creationId xmlns:a16="http://schemas.microsoft.com/office/drawing/2014/main" xmlns="" id="{32A3E22E-D260-4C45-BA90-93973AE9B3A5}"/>
+                <a16:creationId xmlns:a16="http://schemas.microsoft.com/office/drawing/2014/main" id="{32A3E22E-D260-4C45-BA90-93973AE9B3A5}"/>
               </a:ext>
             </a:extLst>
           </p:cNvPr>
@@ -8669,7 +9027,7 @@
           <p:cNvPr id="7" name="Rechteck 6">
             <a:extLst>
               <a:ext uri="{FF2B5EF4-FFF2-40B4-BE49-F238E27FC236}">
-                <a16:creationId xmlns:a16="http://schemas.microsoft.com/office/drawing/2014/main" xmlns="" id="{5E7DB929-572D-4E95-82E8-B6DD989776DD}"/>
+                <a16:creationId xmlns:a16="http://schemas.microsoft.com/office/drawing/2014/main" id="{5E7DB929-572D-4E95-82E8-B6DD989776DD}"/>
               </a:ext>
             </a:extLst>
           </p:cNvPr>
@@ -8723,7 +9081,7 @@
           <p:cNvPr id="8" name="Rechteck 7">
             <a:extLst>
               <a:ext uri="{FF2B5EF4-FFF2-40B4-BE49-F238E27FC236}">
-                <a16:creationId xmlns:a16="http://schemas.microsoft.com/office/drawing/2014/main" xmlns="" id="{5E7DB929-572D-4E95-82E8-B6DD989776DD}"/>
+                <a16:creationId xmlns:a16="http://schemas.microsoft.com/office/drawing/2014/main" id="{5E7DB929-572D-4E95-82E8-B6DD989776DD}"/>
               </a:ext>
             </a:extLst>
           </p:cNvPr>
@@ -8777,7 +9135,7 @@
           <p:cNvPr id="9" name="Textfeld 8">
             <a:extLst>
               <a:ext uri="{FF2B5EF4-FFF2-40B4-BE49-F238E27FC236}">
-                <a16:creationId xmlns:a16="http://schemas.microsoft.com/office/drawing/2014/main" xmlns="" id="{672F2C52-F706-4C2C-9BA1-C4050D78BE85}"/>
+                <a16:creationId xmlns:a16="http://schemas.microsoft.com/office/drawing/2014/main" id="{672F2C52-F706-4C2C-9BA1-C4050D78BE85}"/>
               </a:ext>
             </a:extLst>
           </p:cNvPr>
@@ -8801,10 +9159,9 @@
           <a:lstStyle/>
           <a:p>
             <a:r>
-              <a:rPr lang="de-DE" sz="2400" dirty="0" smtClean="0"/>
+              <a:rPr lang="de-DE" sz="2400" dirty="0"/>
               <a:t>Nachfolgeschritt in gleicher Sequenz</a:t>
             </a:r>
-            <a:endParaRPr lang="de-DE" sz="2400" dirty="0"/>
           </a:p>
         </p:txBody>
       </p:sp>
@@ -8813,7 +9170,7 @@
           <p:cNvPr id="10" name="Rechteck 9">
             <a:extLst>
               <a:ext uri="{FF2B5EF4-FFF2-40B4-BE49-F238E27FC236}">
-                <a16:creationId xmlns:a16="http://schemas.microsoft.com/office/drawing/2014/main" xmlns="" id="{32A3E22E-D260-4C45-BA90-93973AE9B3A5}"/>
+                <a16:creationId xmlns:a16="http://schemas.microsoft.com/office/drawing/2014/main" id="{32A3E22E-D260-4C45-BA90-93973AE9B3A5}"/>
               </a:ext>
             </a:extLst>
           </p:cNvPr>
@@ -8861,18 +9218,13 @@
           <a:p>
             <a:pPr algn="ctr"/>
             <a:r>
-              <a:rPr lang="de-DE" sz="1600" dirty="0" smtClean="0">
+              <a:rPr lang="de-DE" sz="1600" dirty="0">
                 <a:solidFill>
                   <a:schemeClr val="tx1"/>
                 </a:solidFill>
               </a:rPr>
               <a:t>5.4</a:t>
             </a:r>
-            <a:endParaRPr lang="de-DE" sz="1600" dirty="0">
-              <a:solidFill>
-                <a:schemeClr val="tx1"/>
-              </a:solidFill>
-            </a:endParaRPr>
           </a:p>
         </p:txBody>
       </p:sp>
@@ -9019,7 +9371,7 @@
           <p:cNvPr id="14" name="Textfeld 13">
             <a:extLst>
               <a:ext uri="{FF2B5EF4-FFF2-40B4-BE49-F238E27FC236}">
-                <a16:creationId xmlns:a16="http://schemas.microsoft.com/office/drawing/2014/main" xmlns="" id="{672F2C52-F706-4C2C-9BA1-C4050D78BE85}"/>
+                <a16:creationId xmlns:a16="http://schemas.microsoft.com/office/drawing/2014/main" id="{672F2C52-F706-4C2C-9BA1-C4050D78BE85}"/>
               </a:ext>
             </a:extLst>
           </p:cNvPr>
@@ -9043,10 +9395,9 @@
           <a:lstStyle/>
           <a:p>
             <a:r>
-              <a:rPr lang="de-DE" sz="2400" b="1" dirty="0" smtClean="0"/>
+              <a:rPr lang="de-DE" sz="2400" b="1" dirty="0"/>
               <a:t>Überschrift Subsequenz I</a:t>
             </a:r>
-            <a:endParaRPr lang="de-DE" sz="2400" b="1" dirty="0"/>
           </a:p>
         </p:txBody>
       </p:sp>
@@ -9112,7 +9463,7 @@
           <p:cNvPr id="16" name="Rechteck 15">
             <a:extLst>
               <a:ext uri="{FF2B5EF4-FFF2-40B4-BE49-F238E27FC236}">
-                <a16:creationId xmlns:a16="http://schemas.microsoft.com/office/drawing/2014/main" xmlns="" id="{32A3E22E-D260-4C45-BA90-93973AE9B3A5}"/>
+                <a16:creationId xmlns:a16="http://schemas.microsoft.com/office/drawing/2014/main" id="{32A3E22E-D260-4C45-BA90-93973AE9B3A5}"/>
               </a:ext>
             </a:extLst>
           </p:cNvPr>
@@ -9160,18 +9511,13 @@
           <a:p>
             <a:pPr algn="ctr"/>
             <a:r>
-              <a:rPr lang="de-DE" sz="1600" dirty="0" smtClean="0">
+              <a:rPr lang="de-DE" sz="1600" dirty="0">
                 <a:solidFill>
                   <a:schemeClr val="tx1"/>
                 </a:solidFill>
               </a:rPr>
               <a:t>5.2</a:t>
             </a:r>
-            <a:endParaRPr lang="de-DE" sz="1600" dirty="0">
-              <a:solidFill>
-                <a:schemeClr val="tx1"/>
-              </a:solidFill>
-            </a:endParaRPr>
           </a:p>
         </p:txBody>
       </p:sp>
@@ -9180,7 +9526,7 @@
           <p:cNvPr id="17" name="Textfeld 16">
             <a:extLst>
               <a:ext uri="{FF2B5EF4-FFF2-40B4-BE49-F238E27FC236}">
-                <a16:creationId xmlns:a16="http://schemas.microsoft.com/office/drawing/2014/main" xmlns="" id="{672F2C52-F706-4C2C-9BA1-C4050D78BE85}"/>
+                <a16:creationId xmlns:a16="http://schemas.microsoft.com/office/drawing/2014/main" id="{672F2C52-F706-4C2C-9BA1-C4050D78BE85}"/>
               </a:ext>
             </a:extLst>
           </p:cNvPr>
@@ -9204,10 +9550,9 @@
           <a:lstStyle/>
           <a:p>
             <a:r>
-              <a:rPr lang="de-DE" sz="2400" dirty="0" smtClean="0"/>
+              <a:rPr lang="de-DE" sz="2400" dirty="0"/>
               <a:t>Schritt in Subsequenz</a:t>
             </a:r>
-            <a:endParaRPr lang="de-DE" sz="2400" dirty="0"/>
           </a:p>
         </p:txBody>
       </p:sp>
@@ -9216,7 +9561,7 @@
           <p:cNvPr id="18" name="Rechteck 17">
             <a:extLst>
               <a:ext uri="{FF2B5EF4-FFF2-40B4-BE49-F238E27FC236}">
-                <a16:creationId xmlns:a16="http://schemas.microsoft.com/office/drawing/2014/main" xmlns="" id="{32A3E22E-D260-4C45-BA90-93973AE9B3A5}"/>
+                <a16:creationId xmlns:a16="http://schemas.microsoft.com/office/drawing/2014/main" id="{32A3E22E-D260-4C45-BA90-93973AE9B3A5}"/>
               </a:ext>
             </a:extLst>
           </p:cNvPr>
@@ -9264,18 +9609,13 @@
           <a:p>
             <a:pPr algn="ctr"/>
             <a:r>
-              <a:rPr lang="de-DE" sz="1600" dirty="0" smtClean="0">
+              <a:rPr lang="de-DE" sz="1600" dirty="0">
                 <a:solidFill>
                   <a:schemeClr val="tx1"/>
                 </a:solidFill>
               </a:rPr>
               <a:t>5.2.1</a:t>
             </a:r>
-            <a:endParaRPr lang="de-DE" sz="1600" dirty="0">
-              <a:solidFill>
-                <a:schemeClr val="tx1"/>
-              </a:solidFill>
-            </a:endParaRPr>
           </a:p>
         </p:txBody>
       </p:sp>
@@ -9335,7 +9675,7 @@
           <p:cNvPr id="20" name="Rechteck 19">
             <a:extLst>
               <a:ext uri="{FF2B5EF4-FFF2-40B4-BE49-F238E27FC236}">
-                <a16:creationId xmlns:a16="http://schemas.microsoft.com/office/drawing/2014/main" xmlns="" id="{32A3E22E-D260-4C45-BA90-93973AE9B3A5}"/>
+                <a16:creationId xmlns:a16="http://schemas.microsoft.com/office/drawing/2014/main" id="{32A3E22E-D260-4C45-BA90-93973AE9B3A5}"/>
               </a:ext>
             </a:extLst>
           </p:cNvPr>
@@ -9383,18 +9723,13 @@
           <a:p>
             <a:pPr algn="ctr"/>
             <a:r>
-              <a:rPr lang="de-DE" sz="1600" dirty="0" smtClean="0">
+              <a:rPr lang="de-DE" sz="1600" dirty="0">
                 <a:solidFill>
                   <a:schemeClr val="tx1"/>
                 </a:solidFill>
               </a:rPr>
               <a:t>5.2.2</a:t>
             </a:r>
-            <a:endParaRPr lang="de-DE" sz="1600" dirty="0">
-              <a:solidFill>
-                <a:schemeClr val="tx1"/>
-              </a:solidFill>
-            </a:endParaRPr>
           </a:p>
         </p:txBody>
       </p:sp>
@@ -9403,7 +9738,7 @@
           <p:cNvPr id="21" name="Textfeld 20">
             <a:extLst>
               <a:ext uri="{FF2B5EF4-FFF2-40B4-BE49-F238E27FC236}">
-                <a16:creationId xmlns:a16="http://schemas.microsoft.com/office/drawing/2014/main" xmlns="" id="{672F2C52-F706-4C2C-9BA1-C4050D78BE85}"/>
+                <a16:creationId xmlns:a16="http://schemas.microsoft.com/office/drawing/2014/main" id="{672F2C52-F706-4C2C-9BA1-C4050D78BE85}"/>
               </a:ext>
             </a:extLst>
           </p:cNvPr>
@@ -9427,10 +9762,9 @@
           <a:lstStyle/>
           <a:p>
             <a:r>
-              <a:rPr lang="de-DE" sz="2400" dirty="0" smtClean="0"/>
+              <a:rPr lang="de-DE" sz="2400" dirty="0"/>
               <a:t>Letzter Schritt in Subsequenz</a:t>
             </a:r>
-            <a:endParaRPr lang="de-DE" sz="2400" dirty="0"/>
           </a:p>
         </p:txBody>
       </p:sp>
@@ -9577,7 +9911,7 @@
           <p:cNvPr id="25" name="Textfeld 24">
             <a:extLst>
               <a:ext uri="{FF2B5EF4-FFF2-40B4-BE49-F238E27FC236}">
-                <a16:creationId xmlns:a16="http://schemas.microsoft.com/office/drawing/2014/main" xmlns="" id="{672F2C52-F706-4C2C-9BA1-C4050D78BE85}"/>
+                <a16:creationId xmlns:a16="http://schemas.microsoft.com/office/drawing/2014/main" id="{672F2C52-F706-4C2C-9BA1-C4050D78BE85}"/>
               </a:ext>
             </a:extLst>
           </p:cNvPr>
@@ -9601,10 +9935,9 @@
           <a:lstStyle/>
           <a:p>
             <a:r>
-              <a:rPr lang="de-DE" sz="2400" b="1" dirty="0" smtClean="0"/>
+              <a:rPr lang="de-DE" sz="2400" b="1" dirty="0"/>
               <a:t>Überschrift Subsequenz II</a:t>
             </a:r>
-            <a:endParaRPr lang="de-DE" sz="2400" b="1" dirty="0"/>
           </a:p>
         </p:txBody>
       </p:sp>
@@ -9670,7 +10003,7 @@
           <p:cNvPr id="27" name="Rechteck 26">
             <a:extLst>
               <a:ext uri="{FF2B5EF4-FFF2-40B4-BE49-F238E27FC236}">
-                <a16:creationId xmlns:a16="http://schemas.microsoft.com/office/drawing/2014/main" xmlns="" id="{32A3E22E-D260-4C45-BA90-93973AE9B3A5}"/>
+                <a16:creationId xmlns:a16="http://schemas.microsoft.com/office/drawing/2014/main" id="{32A3E22E-D260-4C45-BA90-93973AE9B3A5}"/>
               </a:ext>
             </a:extLst>
           </p:cNvPr>
@@ -9718,18 +10051,13 @@
           <a:p>
             <a:pPr algn="ctr"/>
             <a:r>
-              <a:rPr lang="de-DE" sz="1600" dirty="0" smtClean="0">
+              <a:rPr lang="de-DE" sz="1600" dirty="0">
                 <a:solidFill>
                   <a:schemeClr val="tx1"/>
                 </a:solidFill>
               </a:rPr>
               <a:t>5.3</a:t>
             </a:r>
-            <a:endParaRPr lang="de-DE" sz="1600" dirty="0">
-              <a:solidFill>
-                <a:schemeClr val="tx1"/>
-              </a:solidFill>
-            </a:endParaRPr>
           </a:p>
         </p:txBody>
       </p:sp>
@@ -9738,7 +10066,7 @@
           <p:cNvPr id="28" name="Textfeld 27">
             <a:extLst>
               <a:ext uri="{FF2B5EF4-FFF2-40B4-BE49-F238E27FC236}">
-                <a16:creationId xmlns:a16="http://schemas.microsoft.com/office/drawing/2014/main" xmlns="" id="{672F2C52-F706-4C2C-9BA1-C4050D78BE85}"/>
+                <a16:creationId xmlns:a16="http://schemas.microsoft.com/office/drawing/2014/main" id="{672F2C52-F706-4C2C-9BA1-C4050D78BE85}"/>
               </a:ext>
             </a:extLst>
           </p:cNvPr>
@@ -9762,10 +10090,9 @@
           <a:lstStyle/>
           <a:p>
             <a:r>
-              <a:rPr lang="de-DE" sz="2400" dirty="0" smtClean="0"/>
+              <a:rPr lang="de-DE" sz="2400" dirty="0"/>
               <a:t>Schritt in Subsequenz</a:t>
             </a:r>
-            <a:endParaRPr lang="de-DE" sz="2400" dirty="0"/>
           </a:p>
         </p:txBody>
       </p:sp>
@@ -9774,7 +10101,7 @@
           <p:cNvPr id="29" name="Rechteck 28">
             <a:extLst>
               <a:ext uri="{FF2B5EF4-FFF2-40B4-BE49-F238E27FC236}">
-                <a16:creationId xmlns:a16="http://schemas.microsoft.com/office/drawing/2014/main" xmlns="" id="{32A3E22E-D260-4C45-BA90-93973AE9B3A5}"/>
+                <a16:creationId xmlns:a16="http://schemas.microsoft.com/office/drawing/2014/main" id="{32A3E22E-D260-4C45-BA90-93973AE9B3A5}"/>
               </a:ext>
             </a:extLst>
           </p:cNvPr>
@@ -9822,18 +10149,13 @@
           <a:p>
             <a:pPr algn="ctr"/>
             <a:r>
-              <a:rPr lang="de-DE" sz="1600" dirty="0" smtClean="0">
+              <a:rPr lang="de-DE" sz="1600" dirty="0">
                 <a:solidFill>
                   <a:schemeClr val="tx1"/>
                 </a:solidFill>
               </a:rPr>
               <a:t>5.3.1</a:t>
             </a:r>
-            <a:endParaRPr lang="de-DE" sz="1600" dirty="0">
-              <a:solidFill>
-                <a:schemeClr val="tx1"/>
-              </a:solidFill>
-            </a:endParaRPr>
           </a:p>
         </p:txBody>
       </p:sp>
@@ -9893,7 +10215,7 @@
           <p:cNvPr id="31" name="Rechteck 30">
             <a:extLst>
               <a:ext uri="{FF2B5EF4-FFF2-40B4-BE49-F238E27FC236}">
-                <a16:creationId xmlns:a16="http://schemas.microsoft.com/office/drawing/2014/main" xmlns="" id="{32A3E22E-D260-4C45-BA90-93973AE9B3A5}"/>
+                <a16:creationId xmlns:a16="http://schemas.microsoft.com/office/drawing/2014/main" id="{32A3E22E-D260-4C45-BA90-93973AE9B3A5}"/>
               </a:ext>
             </a:extLst>
           </p:cNvPr>
@@ -9941,18 +10263,13 @@
           <a:p>
             <a:pPr algn="ctr"/>
             <a:r>
-              <a:rPr lang="de-DE" sz="1600" dirty="0" smtClean="0">
+              <a:rPr lang="de-DE" sz="1600" dirty="0">
                 <a:solidFill>
                   <a:schemeClr val="tx1"/>
                 </a:solidFill>
               </a:rPr>
               <a:t>5.3.2</a:t>
             </a:r>
-            <a:endParaRPr lang="de-DE" sz="1600" dirty="0">
-              <a:solidFill>
-                <a:schemeClr val="tx1"/>
-              </a:solidFill>
-            </a:endParaRPr>
           </a:p>
         </p:txBody>
       </p:sp>
@@ -9961,7 +10278,7 @@
           <p:cNvPr id="32" name="Textfeld 31">
             <a:extLst>
               <a:ext uri="{FF2B5EF4-FFF2-40B4-BE49-F238E27FC236}">
-                <a16:creationId xmlns:a16="http://schemas.microsoft.com/office/drawing/2014/main" xmlns="" id="{672F2C52-F706-4C2C-9BA1-C4050D78BE85}"/>
+                <a16:creationId xmlns:a16="http://schemas.microsoft.com/office/drawing/2014/main" id="{672F2C52-F706-4C2C-9BA1-C4050D78BE85}"/>
               </a:ext>
             </a:extLst>
           </p:cNvPr>
@@ -9985,10 +10302,9 @@
           <a:lstStyle/>
           <a:p>
             <a:r>
-              <a:rPr lang="de-DE" sz="2400" dirty="0" smtClean="0"/>
+              <a:rPr lang="de-DE" sz="2400" dirty="0"/>
               <a:t>Letzter Schritt in Subsequenz</a:t>
             </a:r>
-            <a:endParaRPr lang="de-DE" sz="2400" dirty="0"/>
           </a:p>
         </p:txBody>
       </p:sp>
@@ -10073,7 +10389,7 @@
           <p:cNvPr id="35" name="Rechteck 34">
             <a:extLst>
               <a:ext uri="{FF2B5EF4-FFF2-40B4-BE49-F238E27FC236}">
-                <a16:creationId xmlns:a16="http://schemas.microsoft.com/office/drawing/2014/main" xmlns="" id="{5E7DB929-572D-4E95-82E8-B6DD989776DD}"/>
+                <a16:creationId xmlns:a16="http://schemas.microsoft.com/office/drawing/2014/main" id="{5E7DB929-572D-4E95-82E8-B6DD989776DD}"/>
               </a:ext>
             </a:extLst>
           </p:cNvPr>
@@ -10127,7 +10443,7 @@
           <p:cNvPr id="36" name="Textfeld 35">
             <a:extLst>
               <a:ext uri="{FF2B5EF4-FFF2-40B4-BE49-F238E27FC236}">
-                <a16:creationId xmlns:a16="http://schemas.microsoft.com/office/drawing/2014/main" xmlns="" id="{672F2C52-F706-4C2C-9BA1-C4050D78BE85}"/>
+                <a16:creationId xmlns:a16="http://schemas.microsoft.com/office/drawing/2014/main" id="{672F2C52-F706-4C2C-9BA1-C4050D78BE85}"/>
               </a:ext>
             </a:extLst>
           </p:cNvPr>
@@ -10151,10 +10467,9 @@
           <a:lstStyle/>
           <a:p>
             <a:r>
-              <a:rPr lang="de-DE" sz="2400" dirty="0" smtClean="0"/>
+              <a:rPr lang="de-DE" sz="2400" dirty="0"/>
               <a:t>Vorgängerschritt in gleicher Sequenz</a:t>
             </a:r>
-            <a:endParaRPr lang="de-DE" sz="2400" dirty="0"/>
           </a:p>
         </p:txBody>
       </p:sp>
@@ -10163,7 +10478,7 @@
           <p:cNvPr id="37" name="Rechteck 36">
             <a:extLst>
               <a:ext uri="{FF2B5EF4-FFF2-40B4-BE49-F238E27FC236}">
-                <a16:creationId xmlns:a16="http://schemas.microsoft.com/office/drawing/2014/main" xmlns="" id="{32A3E22E-D260-4C45-BA90-93973AE9B3A5}"/>
+                <a16:creationId xmlns:a16="http://schemas.microsoft.com/office/drawing/2014/main" id="{32A3E22E-D260-4C45-BA90-93973AE9B3A5}"/>
               </a:ext>
             </a:extLst>
           </p:cNvPr>
@@ -10226,7 +10541,7 @@
           <p:cNvPr id="38" name="Rechteck 37">
             <a:extLst>
               <a:ext uri="{FF2B5EF4-FFF2-40B4-BE49-F238E27FC236}">
-                <a16:creationId xmlns:a16="http://schemas.microsoft.com/office/drawing/2014/main" xmlns="" id="{5E7DB929-572D-4E95-82E8-B6DD989776DD}"/>
+                <a16:creationId xmlns:a16="http://schemas.microsoft.com/office/drawing/2014/main" id="{5E7DB929-572D-4E95-82E8-B6DD989776DD}"/>
               </a:ext>
             </a:extLst>
           </p:cNvPr>
@@ -10280,7 +10595,7 @@
           <p:cNvPr id="39" name="Rechteck 38">
             <a:extLst>
               <a:ext uri="{FF2B5EF4-FFF2-40B4-BE49-F238E27FC236}">
-                <a16:creationId xmlns:a16="http://schemas.microsoft.com/office/drawing/2014/main" xmlns="" id="{5E7DB929-572D-4E95-82E8-B6DD989776DD}"/>
+                <a16:creationId xmlns:a16="http://schemas.microsoft.com/office/drawing/2014/main" id="{5E7DB929-572D-4E95-82E8-B6DD989776DD}"/>
               </a:ext>
             </a:extLst>
           </p:cNvPr>
@@ -10334,7 +10649,7 @@
           <p:cNvPr id="40" name="Textfeld 39">
             <a:extLst>
               <a:ext uri="{FF2B5EF4-FFF2-40B4-BE49-F238E27FC236}">
-                <a16:creationId xmlns:a16="http://schemas.microsoft.com/office/drawing/2014/main" xmlns="" id="{672F2C52-F706-4C2C-9BA1-C4050D78BE85}"/>
+                <a16:creationId xmlns:a16="http://schemas.microsoft.com/office/drawing/2014/main" id="{672F2C52-F706-4C2C-9BA1-C4050D78BE85}"/>
               </a:ext>
             </a:extLst>
           </p:cNvPr>
@@ -10358,10 +10673,9 @@
           <a:lstStyle/>
           <a:p>
             <a:r>
-              <a:rPr lang="de-DE" sz="2400" dirty="0" smtClean="0"/>
+              <a:rPr lang="de-DE" sz="2400" dirty="0"/>
               <a:t>Nachfolgeschritt in gleicher Sequenz</a:t>
             </a:r>
-            <a:endParaRPr lang="de-DE" sz="2400" dirty="0"/>
           </a:p>
         </p:txBody>
       </p:sp>
@@ -10370,7 +10684,7 @@
           <p:cNvPr id="41" name="Rechteck 40">
             <a:extLst>
               <a:ext uri="{FF2B5EF4-FFF2-40B4-BE49-F238E27FC236}">
-                <a16:creationId xmlns:a16="http://schemas.microsoft.com/office/drawing/2014/main" xmlns="" id="{32A3E22E-D260-4C45-BA90-93973AE9B3A5}"/>
+                <a16:creationId xmlns:a16="http://schemas.microsoft.com/office/drawing/2014/main" id="{32A3E22E-D260-4C45-BA90-93973AE9B3A5}"/>
               </a:ext>
             </a:extLst>
           </p:cNvPr>
@@ -10418,18 +10732,13 @@
           <a:p>
             <a:pPr algn="ctr"/>
             <a:r>
-              <a:rPr lang="de-DE" sz="1600" dirty="0" smtClean="0">
+              <a:rPr lang="de-DE" sz="1600" dirty="0">
                 <a:solidFill>
                   <a:schemeClr val="tx1"/>
                 </a:solidFill>
               </a:rPr>
               <a:t>5.5</a:t>
             </a:r>
-            <a:endParaRPr lang="de-DE" sz="1600" dirty="0">
-              <a:solidFill>
-                <a:schemeClr val="tx1"/>
-              </a:solidFill>
-            </a:endParaRPr>
           </a:p>
         </p:txBody>
       </p:sp>
@@ -10576,7 +10885,7 @@
           <p:cNvPr id="45" name="Textfeld 44">
             <a:extLst>
               <a:ext uri="{FF2B5EF4-FFF2-40B4-BE49-F238E27FC236}">
-                <a16:creationId xmlns:a16="http://schemas.microsoft.com/office/drawing/2014/main" xmlns="" id="{672F2C52-F706-4C2C-9BA1-C4050D78BE85}"/>
+                <a16:creationId xmlns:a16="http://schemas.microsoft.com/office/drawing/2014/main" id="{672F2C52-F706-4C2C-9BA1-C4050D78BE85}"/>
               </a:ext>
             </a:extLst>
           </p:cNvPr>
@@ -10600,10 +10909,9 @@
           <a:lstStyle/>
           <a:p>
             <a:r>
-              <a:rPr lang="de-DE" sz="2400" b="1" dirty="0" smtClean="0"/>
+              <a:rPr lang="de-DE" sz="2400" b="1" dirty="0"/>
               <a:t>Überschrift Subsequenz I</a:t>
             </a:r>
-            <a:endParaRPr lang="de-DE" sz="2400" b="1" dirty="0"/>
           </a:p>
         </p:txBody>
       </p:sp>
@@ -10669,7 +10977,7 @@
           <p:cNvPr id="47" name="Rechteck 46">
             <a:extLst>
               <a:ext uri="{FF2B5EF4-FFF2-40B4-BE49-F238E27FC236}">
-                <a16:creationId xmlns:a16="http://schemas.microsoft.com/office/drawing/2014/main" xmlns="" id="{32A3E22E-D260-4C45-BA90-93973AE9B3A5}"/>
+                <a16:creationId xmlns:a16="http://schemas.microsoft.com/office/drawing/2014/main" id="{32A3E22E-D260-4C45-BA90-93973AE9B3A5}"/>
               </a:ext>
             </a:extLst>
           </p:cNvPr>
@@ -10717,18 +11025,13 @@
           <a:p>
             <a:pPr algn="ctr"/>
             <a:r>
-              <a:rPr lang="de-DE" sz="1600" dirty="0" smtClean="0">
+              <a:rPr lang="de-DE" sz="1600" dirty="0">
                 <a:solidFill>
                   <a:schemeClr val="tx1"/>
                 </a:solidFill>
               </a:rPr>
               <a:t>5.2</a:t>
             </a:r>
-            <a:endParaRPr lang="de-DE" sz="1600" dirty="0">
-              <a:solidFill>
-                <a:schemeClr val="tx1"/>
-              </a:solidFill>
-            </a:endParaRPr>
           </a:p>
         </p:txBody>
       </p:sp>
@@ -10737,7 +11040,7 @@
           <p:cNvPr id="48" name="Textfeld 47">
             <a:extLst>
               <a:ext uri="{FF2B5EF4-FFF2-40B4-BE49-F238E27FC236}">
-                <a16:creationId xmlns:a16="http://schemas.microsoft.com/office/drawing/2014/main" xmlns="" id="{672F2C52-F706-4C2C-9BA1-C4050D78BE85}"/>
+                <a16:creationId xmlns:a16="http://schemas.microsoft.com/office/drawing/2014/main" id="{672F2C52-F706-4C2C-9BA1-C4050D78BE85}"/>
               </a:ext>
             </a:extLst>
           </p:cNvPr>
@@ -10761,10 +11064,9 @@
           <a:lstStyle/>
           <a:p>
             <a:r>
-              <a:rPr lang="de-DE" sz="2400" dirty="0" smtClean="0"/>
+              <a:rPr lang="de-DE" sz="2400" dirty="0"/>
               <a:t>Schritt in Subsequenz</a:t>
             </a:r>
-            <a:endParaRPr lang="de-DE" sz="2400" dirty="0"/>
           </a:p>
         </p:txBody>
       </p:sp>
@@ -10773,7 +11075,7 @@
           <p:cNvPr id="49" name="Rechteck 48">
             <a:extLst>
               <a:ext uri="{FF2B5EF4-FFF2-40B4-BE49-F238E27FC236}">
-                <a16:creationId xmlns:a16="http://schemas.microsoft.com/office/drawing/2014/main" xmlns="" id="{32A3E22E-D260-4C45-BA90-93973AE9B3A5}"/>
+                <a16:creationId xmlns:a16="http://schemas.microsoft.com/office/drawing/2014/main" id="{32A3E22E-D260-4C45-BA90-93973AE9B3A5}"/>
               </a:ext>
             </a:extLst>
           </p:cNvPr>
@@ -10821,18 +11123,13 @@
           <a:p>
             <a:pPr algn="ctr"/>
             <a:r>
-              <a:rPr lang="de-DE" sz="1600" dirty="0" smtClean="0">
+              <a:rPr lang="de-DE" sz="1600" dirty="0">
                 <a:solidFill>
                   <a:schemeClr val="tx1"/>
                 </a:solidFill>
               </a:rPr>
               <a:t>5.2.1</a:t>
             </a:r>
-            <a:endParaRPr lang="de-DE" sz="1600" dirty="0">
-              <a:solidFill>
-                <a:schemeClr val="tx1"/>
-              </a:solidFill>
-            </a:endParaRPr>
           </a:p>
         </p:txBody>
       </p:sp>
@@ -10892,7 +11189,7 @@
           <p:cNvPr id="51" name="Rechteck 50">
             <a:extLst>
               <a:ext uri="{FF2B5EF4-FFF2-40B4-BE49-F238E27FC236}">
-                <a16:creationId xmlns:a16="http://schemas.microsoft.com/office/drawing/2014/main" xmlns="" id="{32A3E22E-D260-4C45-BA90-93973AE9B3A5}"/>
+                <a16:creationId xmlns:a16="http://schemas.microsoft.com/office/drawing/2014/main" id="{32A3E22E-D260-4C45-BA90-93973AE9B3A5}"/>
               </a:ext>
             </a:extLst>
           </p:cNvPr>
@@ -10940,18 +11237,13 @@
           <a:p>
             <a:pPr algn="ctr"/>
             <a:r>
-              <a:rPr lang="de-DE" sz="1600" dirty="0" smtClean="0">
+              <a:rPr lang="de-DE" sz="1600" dirty="0">
                 <a:solidFill>
                   <a:schemeClr val="tx1"/>
                 </a:solidFill>
               </a:rPr>
               <a:t>5.2.2</a:t>
             </a:r>
-            <a:endParaRPr lang="de-DE" sz="1600" dirty="0">
-              <a:solidFill>
-                <a:schemeClr val="tx1"/>
-              </a:solidFill>
-            </a:endParaRPr>
           </a:p>
         </p:txBody>
       </p:sp>
@@ -10960,7 +11252,7 @@
           <p:cNvPr id="52" name="Textfeld 51">
             <a:extLst>
               <a:ext uri="{FF2B5EF4-FFF2-40B4-BE49-F238E27FC236}">
-                <a16:creationId xmlns:a16="http://schemas.microsoft.com/office/drawing/2014/main" xmlns="" id="{672F2C52-F706-4C2C-9BA1-C4050D78BE85}"/>
+                <a16:creationId xmlns:a16="http://schemas.microsoft.com/office/drawing/2014/main" id="{672F2C52-F706-4C2C-9BA1-C4050D78BE85}"/>
               </a:ext>
             </a:extLst>
           </p:cNvPr>
@@ -10984,10 +11276,9 @@
           <a:lstStyle/>
           <a:p>
             <a:r>
-              <a:rPr lang="de-DE" sz="2400" dirty="0" smtClean="0"/>
+              <a:rPr lang="de-DE" sz="2400" dirty="0"/>
               <a:t>Letzter Schritt in Subsequenz</a:t>
             </a:r>
-            <a:endParaRPr lang="de-DE" sz="2400" dirty="0"/>
           </a:p>
         </p:txBody>
       </p:sp>
@@ -11134,7 +11425,7 @@
           <p:cNvPr id="56" name="Textfeld 55">
             <a:extLst>
               <a:ext uri="{FF2B5EF4-FFF2-40B4-BE49-F238E27FC236}">
-                <a16:creationId xmlns:a16="http://schemas.microsoft.com/office/drawing/2014/main" xmlns="" id="{672F2C52-F706-4C2C-9BA1-C4050D78BE85}"/>
+                <a16:creationId xmlns:a16="http://schemas.microsoft.com/office/drawing/2014/main" id="{672F2C52-F706-4C2C-9BA1-C4050D78BE85}"/>
               </a:ext>
             </a:extLst>
           </p:cNvPr>
@@ -11158,10 +11449,9 @@
           <a:lstStyle/>
           <a:p>
             <a:r>
-              <a:rPr lang="de-DE" sz="2400" b="1" dirty="0" smtClean="0"/>
+              <a:rPr lang="de-DE" sz="2400" b="1" dirty="0"/>
               <a:t>Überschrift Subsequenz II</a:t>
             </a:r>
-            <a:endParaRPr lang="de-DE" sz="2400" b="1" dirty="0"/>
           </a:p>
         </p:txBody>
       </p:sp>
@@ -11227,7 +11517,7 @@
           <p:cNvPr id="58" name="Rechteck 57">
             <a:extLst>
               <a:ext uri="{FF2B5EF4-FFF2-40B4-BE49-F238E27FC236}">
-                <a16:creationId xmlns:a16="http://schemas.microsoft.com/office/drawing/2014/main" xmlns="" id="{32A3E22E-D260-4C45-BA90-93973AE9B3A5}"/>
+                <a16:creationId xmlns:a16="http://schemas.microsoft.com/office/drawing/2014/main" id="{32A3E22E-D260-4C45-BA90-93973AE9B3A5}"/>
               </a:ext>
             </a:extLst>
           </p:cNvPr>
@@ -11275,18 +11565,13 @@
           <a:p>
             <a:pPr algn="ctr"/>
             <a:r>
-              <a:rPr lang="de-DE" sz="1600" dirty="0" smtClean="0">
+              <a:rPr lang="de-DE" sz="1600" dirty="0">
                 <a:solidFill>
                   <a:schemeClr val="tx1"/>
                 </a:solidFill>
               </a:rPr>
               <a:t>5.4</a:t>
             </a:r>
-            <a:endParaRPr lang="de-DE" sz="1600" dirty="0">
-              <a:solidFill>
-                <a:schemeClr val="tx1"/>
-              </a:solidFill>
-            </a:endParaRPr>
           </a:p>
         </p:txBody>
       </p:sp>
@@ -11295,7 +11580,7 @@
           <p:cNvPr id="59" name="Textfeld 58">
             <a:extLst>
               <a:ext uri="{FF2B5EF4-FFF2-40B4-BE49-F238E27FC236}">
-                <a16:creationId xmlns:a16="http://schemas.microsoft.com/office/drawing/2014/main" xmlns="" id="{672F2C52-F706-4C2C-9BA1-C4050D78BE85}"/>
+                <a16:creationId xmlns:a16="http://schemas.microsoft.com/office/drawing/2014/main" id="{672F2C52-F706-4C2C-9BA1-C4050D78BE85}"/>
               </a:ext>
             </a:extLst>
           </p:cNvPr>
@@ -11319,10 +11604,9 @@
           <a:lstStyle/>
           <a:p>
             <a:r>
-              <a:rPr lang="de-DE" sz="2400" dirty="0" smtClean="0"/>
+              <a:rPr lang="de-DE" sz="2400" dirty="0"/>
               <a:t>Schritt in Subsequenz</a:t>
             </a:r>
-            <a:endParaRPr lang="de-DE" sz="2400" dirty="0"/>
           </a:p>
         </p:txBody>
       </p:sp>
@@ -11331,7 +11615,7 @@
           <p:cNvPr id="60" name="Rechteck 59">
             <a:extLst>
               <a:ext uri="{FF2B5EF4-FFF2-40B4-BE49-F238E27FC236}">
-                <a16:creationId xmlns:a16="http://schemas.microsoft.com/office/drawing/2014/main" xmlns="" id="{32A3E22E-D260-4C45-BA90-93973AE9B3A5}"/>
+                <a16:creationId xmlns:a16="http://schemas.microsoft.com/office/drawing/2014/main" id="{32A3E22E-D260-4C45-BA90-93973AE9B3A5}"/>
               </a:ext>
             </a:extLst>
           </p:cNvPr>
@@ -11379,18 +11663,13 @@
           <a:p>
             <a:pPr algn="ctr"/>
             <a:r>
-              <a:rPr lang="de-DE" sz="1600" dirty="0" smtClean="0">
+              <a:rPr lang="de-DE" sz="1600" dirty="0">
                 <a:solidFill>
                   <a:schemeClr val="tx1"/>
                 </a:solidFill>
               </a:rPr>
               <a:t>5.4.1</a:t>
             </a:r>
-            <a:endParaRPr lang="de-DE" sz="1600" dirty="0">
-              <a:solidFill>
-                <a:schemeClr val="tx1"/>
-              </a:solidFill>
-            </a:endParaRPr>
           </a:p>
         </p:txBody>
       </p:sp>
@@ -11450,7 +11729,7 @@
           <p:cNvPr id="62" name="Rechteck 61">
             <a:extLst>
               <a:ext uri="{FF2B5EF4-FFF2-40B4-BE49-F238E27FC236}">
-                <a16:creationId xmlns:a16="http://schemas.microsoft.com/office/drawing/2014/main" xmlns="" id="{32A3E22E-D260-4C45-BA90-93973AE9B3A5}"/>
+                <a16:creationId xmlns:a16="http://schemas.microsoft.com/office/drawing/2014/main" id="{32A3E22E-D260-4C45-BA90-93973AE9B3A5}"/>
               </a:ext>
             </a:extLst>
           </p:cNvPr>
@@ -11498,18 +11777,13 @@
           <a:p>
             <a:pPr algn="ctr"/>
             <a:r>
-              <a:rPr lang="de-DE" sz="1600" dirty="0" smtClean="0">
+              <a:rPr lang="de-DE" sz="1600" dirty="0">
                 <a:solidFill>
                   <a:schemeClr val="tx1"/>
                 </a:solidFill>
               </a:rPr>
               <a:t>5.4.2</a:t>
             </a:r>
-            <a:endParaRPr lang="de-DE" sz="1600" dirty="0">
-              <a:solidFill>
-                <a:schemeClr val="tx1"/>
-              </a:solidFill>
-            </a:endParaRPr>
           </a:p>
         </p:txBody>
       </p:sp>
@@ -11518,7 +11792,7 @@
           <p:cNvPr id="63" name="Textfeld 62">
             <a:extLst>
               <a:ext uri="{FF2B5EF4-FFF2-40B4-BE49-F238E27FC236}">
-                <a16:creationId xmlns:a16="http://schemas.microsoft.com/office/drawing/2014/main" xmlns="" id="{672F2C52-F706-4C2C-9BA1-C4050D78BE85}"/>
+                <a16:creationId xmlns:a16="http://schemas.microsoft.com/office/drawing/2014/main" id="{672F2C52-F706-4C2C-9BA1-C4050D78BE85}"/>
               </a:ext>
             </a:extLst>
           </p:cNvPr>
@@ -11542,10 +11816,9 @@
           <a:lstStyle/>
           <a:p>
             <a:r>
-              <a:rPr lang="de-DE" sz="2400" dirty="0" smtClean="0"/>
+              <a:rPr lang="de-DE" sz="2400" dirty="0"/>
               <a:t>Letzter Schritt in Subsequenz</a:t>
             </a:r>
-            <a:endParaRPr lang="de-DE" sz="2400" dirty="0"/>
           </a:p>
         </p:txBody>
       </p:sp>
@@ -11554,7 +11827,7 @@
           <p:cNvPr id="65" name="Rechteck 64">
             <a:extLst>
               <a:ext uri="{FF2B5EF4-FFF2-40B4-BE49-F238E27FC236}">
-                <a16:creationId xmlns:a16="http://schemas.microsoft.com/office/drawing/2014/main" xmlns="" id="{5E7DB929-572D-4E95-82E8-B6DD989776DD}"/>
+                <a16:creationId xmlns:a16="http://schemas.microsoft.com/office/drawing/2014/main" id="{5E7DB929-572D-4E95-82E8-B6DD989776DD}"/>
               </a:ext>
             </a:extLst>
           </p:cNvPr>
@@ -11608,7 +11881,7 @@
           <p:cNvPr id="66" name="Textfeld 65">
             <a:extLst>
               <a:ext uri="{FF2B5EF4-FFF2-40B4-BE49-F238E27FC236}">
-                <a16:creationId xmlns:a16="http://schemas.microsoft.com/office/drawing/2014/main" xmlns="" id="{672F2C52-F706-4C2C-9BA1-C4050D78BE85}"/>
+                <a16:creationId xmlns:a16="http://schemas.microsoft.com/office/drawing/2014/main" id="{672F2C52-F706-4C2C-9BA1-C4050D78BE85}"/>
               </a:ext>
             </a:extLst>
           </p:cNvPr>
@@ -11632,10 +11905,9 @@
           <a:lstStyle/>
           <a:p>
             <a:r>
-              <a:rPr lang="de-DE" sz="2400" dirty="0" smtClean="0"/>
+              <a:rPr lang="de-DE" sz="2400" dirty="0"/>
               <a:t>Schritt zwischen Subsequenzen</a:t>
             </a:r>
-            <a:endParaRPr lang="de-DE" sz="2400" dirty="0"/>
           </a:p>
         </p:txBody>
       </p:sp>
@@ -11644,7 +11916,7 @@
           <p:cNvPr id="67" name="Rechteck 66">
             <a:extLst>
               <a:ext uri="{FF2B5EF4-FFF2-40B4-BE49-F238E27FC236}">
-                <a16:creationId xmlns:a16="http://schemas.microsoft.com/office/drawing/2014/main" xmlns="" id="{32A3E22E-D260-4C45-BA90-93973AE9B3A5}"/>
+                <a16:creationId xmlns:a16="http://schemas.microsoft.com/office/drawing/2014/main" id="{32A3E22E-D260-4C45-BA90-93973AE9B3A5}"/>
               </a:ext>
             </a:extLst>
           </p:cNvPr>
@@ -11692,18 +11964,13 @@
           <a:p>
             <a:pPr algn="ctr"/>
             <a:r>
-              <a:rPr lang="de-DE" sz="1600" dirty="0" smtClean="0">
+              <a:rPr lang="de-DE" sz="1600" dirty="0">
                 <a:solidFill>
                   <a:schemeClr val="tx1"/>
                 </a:solidFill>
               </a:rPr>
               <a:t>5.3</a:t>
             </a:r>
-            <a:endParaRPr lang="de-DE" sz="1600" dirty="0">
-              <a:solidFill>
-                <a:schemeClr val="tx1"/>
-              </a:solidFill>
-            </a:endParaRPr>
           </a:p>
         </p:txBody>
       </p:sp>
@@ -11753,7 +12020,7 @@
           <a:p>
             <a:pPr algn="ctr"/>
             <a:r>
-              <a:rPr lang="de-DE" sz="1600" dirty="0" err="1" smtClean="0">
+              <a:rPr lang="de-DE" sz="1600" dirty="0" err="1">
                 <a:solidFill>
                   <a:schemeClr val="tx1"/>
                 </a:solidFill>
@@ -11761,18 +12028,13 @@
               <a:t>Subsequnzen</a:t>
             </a:r>
             <a:r>
-              <a:rPr lang="de-DE" sz="1600" dirty="0" smtClean="0">
+              <a:rPr lang="de-DE" sz="1600" dirty="0">
                 <a:solidFill>
                   <a:schemeClr val="tx1"/>
                 </a:solidFill>
               </a:rPr>
               <a:t> in gleicher Sequenz aber mit einer anderen Art von Schritt dazwischen liegend </a:t>
             </a:r>
-            <a:endParaRPr lang="de-DE" sz="1600" dirty="0">
-              <a:solidFill>
-                <a:schemeClr val="tx1"/>
-              </a:solidFill>
-            </a:endParaRPr>
           </a:p>
           <a:p>
             <a:pPr algn="ctr"/>
@@ -11783,16 +12045,7 @@
                 </a:solidFill>
                 <a:sym typeface="Wingdings" panose="05000000000000000000" pitchFamily="2" charset="2"/>
               </a:rPr>
-              <a:t> </a:t>
-            </a:r>
-            <a:r>
-              <a:rPr lang="de-DE" sz="1600" dirty="0" smtClean="0">
-                <a:solidFill>
-                  <a:schemeClr val="tx1"/>
-                </a:solidFill>
-                <a:sym typeface="Wingdings" panose="05000000000000000000" pitchFamily="2" charset="2"/>
-              </a:rPr>
-              <a:t>mit Trennstrichen</a:t>
+              <a:t> mit Trennstrichen</a:t>
             </a:r>
             <a:endParaRPr lang="de-DE" sz="1600" dirty="0">
               <a:solidFill>
@@ -11825,10 +12078,9 @@
           <a:lstStyle/>
           <a:p>
             <a:r>
-              <a:rPr lang="de-DE" dirty="0" smtClean="0"/>
+              <a:rPr lang="de-DE" dirty="0"/>
               <a:t>Darstellung aufeinanderfolgender abgesetzter Subsequenzen </a:t>
             </a:r>
-            <a:endParaRPr lang="de-DE" dirty="0"/>
           </a:p>
         </p:txBody>
       </p:sp>
@@ -11867,7 +12119,7 @@
           <p:cNvPr id="38" name="Rechteck 37">
             <a:extLst>
               <a:ext uri="{FF2B5EF4-FFF2-40B4-BE49-F238E27FC236}">
-                <a16:creationId xmlns:a16="http://schemas.microsoft.com/office/drawing/2014/main" xmlns="" id="{5E7DB929-572D-4E95-82E8-B6DD989776DD}"/>
+                <a16:creationId xmlns:a16="http://schemas.microsoft.com/office/drawing/2014/main" id="{5E7DB929-572D-4E95-82E8-B6DD989776DD}"/>
               </a:ext>
             </a:extLst>
           </p:cNvPr>
@@ -12059,7 +12311,7 @@
           <p:cNvPr id="45" name="Textfeld 44">
             <a:extLst>
               <a:ext uri="{FF2B5EF4-FFF2-40B4-BE49-F238E27FC236}">
-                <a16:creationId xmlns:a16="http://schemas.microsoft.com/office/drawing/2014/main" xmlns="" id="{672F2C52-F706-4C2C-9BA1-C4050D78BE85}"/>
+                <a16:creationId xmlns:a16="http://schemas.microsoft.com/office/drawing/2014/main" id="{672F2C52-F706-4C2C-9BA1-C4050D78BE85}"/>
               </a:ext>
             </a:extLst>
           </p:cNvPr>
@@ -12083,10 +12335,9 @@
           <a:lstStyle/>
           <a:p>
             <a:r>
-              <a:rPr lang="de-DE" sz="2400" b="1" dirty="0" smtClean="0"/>
+              <a:rPr lang="de-DE" sz="2400" b="1" dirty="0"/>
               <a:t>Überschrift Subsequenz I</a:t>
             </a:r>
-            <a:endParaRPr lang="de-DE" sz="2400" b="1" dirty="0"/>
           </a:p>
         </p:txBody>
       </p:sp>
@@ -12152,7 +12403,7 @@
           <p:cNvPr id="47" name="Rechteck 46">
             <a:extLst>
               <a:ext uri="{FF2B5EF4-FFF2-40B4-BE49-F238E27FC236}">
-                <a16:creationId xmlns:a16="http://schemas.microsoft.com/office/drawing/2014/main" xmlns="" id="{32A3E22E-D260-4C45-BA90-93973AE9B3A5}"/>
+                <a16:creationId xmlns:a16="http://schemas.microsoft.com/office/drawing/2014/main" id="{32A3E22E-D260-4C45-BA90-93973AE9B3A5}"/>
               </a:ext>
             </a:extLst>
           </p:cNvPr>
@@ -12200,18 +12451,13 @@
           <a:p>
             <a:pPr algn="ctr"/>
             <a:r>
-              <a:rPr lang="de-DE" sz="1600" dirty="0" smtClean="0">
+              <a:rPr lang="de-DE" sz="1600" dirty="0">
                 <a:solidFill>
                   <a:schemeClr val="tx1"/>
                 </a:solidFill>
               </a:rPr>
               <a:t>5.2</a:t>
             </a:r>
-            <a:endParaRPr lang="de-DE" sz="1600" dirty="0">
-              <a:solidFill>
-                <a:schemeClr val="tx1"/>
-              </a:solidFill>
-            </a:endParaRPr>
           </a:p>
         </p:txBody>
       </p:sp>
@@ -12220,7 +12466,7 @@
           <p:cNvPr id="48" name="Textfeld 47">
             <a:extLst>
               <a:ext uri="{FF2B5EF4-FFF2-40B4-BE49-F238E27FC236}">
-                <a16:creationId xmlns:a16="http://schemas.microsoft.com/office/drawing/2014/main" xmlns="" id="{672F2C52-F706-4C2C-9BA1-C4050D78BE85}"/>
+                <a16:creationId xmlns:a16="http://schemas.microsoft.com/office/drawing/2014/main" id="{672F2C52-F706-4C2C-9BA1-C4050D78BE85}"/>
               </a:ext>
             </a:extLst>
           </p:cNvPr>
@@ -12244,10 +12490,9 @@
           <a:lstStyle/>
           <a:p>
             <a:r>
-              <a:rPr lang="de-DE" sz="2400" dirty="0" smtClean="0"/>
+              <a:rPr lang="de-DE" sz="2400" dirty="0"/>
               <a:t>Schritt in Subsequenz</a:t>
             </a:r>
-            <a:endParaRPr lang="de-DE" sz="2400" dirty="0"/>
           </a:p>
         </p:txBody>
       </p:sp>
@@ -12256,7 +12501,7 @@
           <p:cNvPr id="49" name="Rechteck 48">
             <a:extLst>
               <a:ext uri="{FF2B5EF4-FFF2-40B4-BE49-F238E27FC236}">
-                <a16:creationId xmlns:a16="http://schemas.microsoft.com/office/drawing/2014/main" xmlns="" id="{32A3E22E-D260-4C45-BA90-93973AE9B3A5}"/>
+                <a16:creationId xmlns:a16="http://schemas.microsoft.com/office/drawing/2014/main" id="{32A3E22E-D260-4C45-BA90-93973AE9B3A5}"/>
               </a:ext>
             </a:extLst>
           </p:cNvPr>
@@ -12304,18 +12549,13 @@
           <a:p>
             <a:pPr algn="ctr"/>
             <a:r>
-              <a:rPr lang="de-DE" sz="1600" dirty="0" smtClean="0">
+              <a:rPr lang="de-DE" sz="1600" dirty="0">
                 <a:solidFill>
                   <a:schemeClr val="tx1"/>
                 </a:solidFill>
               </a:rPr>
               <a:t>5.2.1</a:t>
             </a:r>
-            <a:endParaRPr lang="de-DE" sz="1600" dirty="0">
-              <a:solidFill>
-                <a:schemeClr val="tx1"/>
-              </a:solidFill>
-            </a:endParaRPr>
           </a:p>
         </p:txBody>
       </p:sp>
@@ -12375,7 +12615,7 @@
           <p:cNvPr id="51" name="Rechteck 50">
             <a:extLst>
               <a:ext uri="{FF2B5EF4-FFF2-40B4-BE49-F238E27FC236}">
-                <a16:creationId xmlns:a16="http://schemas.microsoft.com/office/drawing/2014/main" xmlns="" id="{32A3E22E-D260-4C45-BA90-93973AE9B3A5}"/>
+                <a16:creationId xmlns:a16="http://schemas.microsoft.com/office/drawing/2014/main" id="{32A3E22E-D260-4C45-BA90-93973AE9B3A5}"/>
               </a:ext>
             </a:extLst>
           </p:cNvPr>
@@ -12423,18 +12663,13 @@
           <a:p>
             <a:pPr algn="ctr"/>
             <a:r>
-              <a:rPr lang="de-DE" sz="1600" dirty="0" smtClean="0">
+              <a:rPr lang="de-DE" sz="1600" dirty="0">
                 <a:solidFill>
                   <a:schemeClr val="tx1"/>
                 </a:solidFill>
               </a:rPr>
               <a:t>5.2.2</a:t>
             </a:r>
-            <a:endParaRPr lang="de-DE" sz="1600" dirty="0">
-              <a:solidFill>
-                <a:schemeClr val="tx1"/>
-              </a:solidFill>
-            </a:endParaRPr>
           </a:p>
         </p:txBody>
       </p:sp>
@@ -12443,7 +12678,7 @@
           <p:cNvPr id="52" name="Textfeld 51">
             <a:extLst>
               <a:ext uri="{FF2B5EF4-FFF2-40B4-BE49-F238E27FC236}">
-                <a16:creationId xmlns:a16="http://schemas.microsoft.com/office/drawing/2014/main" xmlns="" id="{672F2C52-F706-4C2C-9BA1-C4050D78BE85}"/>
+                <a16:creationId xmlns:a16="http://schemas.microsoft.com/office/drawing/2014/main" id="{672F2C52-F706-4C2C-9BA1-C4050D78BE85}"/>
               </a:ext>
             </a:extLst>
           </p:cNvPr>
@@ -12467,10 +12702,9 @@
           <a:lstStyle/>
           <a:p>
             <a:r>
-              <a:rPr lang="de-DE" sz="2400" dirty="0" smtClean="0"/>
+              <a:rPr lang="de-DE" sz="2400" dirty="0"/>
               <a:t>Letzter Schritt in Subsequenz</a:t>
             </a:r>
-            <a:endParaRPr lang="de-DE" sz="2400" dirty="0"/>
           </a:p>
         </p:txBody>
       </p:sp>
@@ -12617,7 +12851,7 @@
           <p:cNvPr id="56" name="Textfeld 55">
             <a:extLst>
               <a:ext uri="{FF2B5EF4-FFF2-40B4-BE49-F238E27FC236}">
-                <a16:creationId xmlns:a16="http://schemas.microsoft.com/office/drawing/2014/main" xmlns="" id="{672F2C52-F706-4C2C-9BA1-C4050D78BE85}"/>
+                <a16:creationId xmlns:a16="http://schemas.microsoft.com/office/drawing/2014/main" id="{672F2C52-F706-4C2C-9BA1-C4050D78BE85}"/>
               </a:ext>
             </a:extLst>
           </p:cNvPr>
@@ -12641,10 +12875,9 @@
           <a:lstStyle/>
           <a:p>
             <a:r>
-              <a:rPr lang="de-DE" sz="2400" b="1" dirty="0" smtClean="0"/>
+              <a:rPr lang="de-DE" sz="2400" b="1" dirty="0"/>
               <a:t>Überschrift Subsequenz II</a:t>
             </a:r>
-            <a:endParaRPr lang="de-DE" sz="2400" b="1" dirty="0"/>
           </a:p>
         </p:txBody>
       </p:sp>
@@ -12710,7 +12943,7 @@
           <p:cNvPr id="58" name="Rechteck 57">
             <a:extLst>
               <a:ext uri="{FF2B5EF4-FFF2-40B4-BE49-F238E27FC236}">
-                <a16:creationId xmlns:a16="http://schemas.microsoft.com/office/drawing/2014/main" xmlns="" id="{32A3E22E-D260-4C45-BA90-93973AE9B3A5}"/>
+                <a16:creationId xmlns:a16="http://schemas.microsoft.com/office/drawing/2014/main" id="{32A3E22E-D260-4C45-BA90-93973AE9B3A5}"/>
               </a:ext>
             </a:extLst>
           </p:cNvPr>
@@ -12758,18 +12991,13 @@
           <a:p>
             <a:pPr algn="ctr"/>
             <a:r>
-              <a:rPr lang="de-DE" sz="1600" dirty="0" smtClean="0">
+              <a:rPr lang="de-DE" sz="1600" dirty="0">
                 <a:solidFill>
                   <a:schemeClr val="tx1"/>
                 </a:solidFill>
               </a:rPr>
               <a:t>5.4</a:t>
             </a:r>
-            <a:endParaRPr lang="de-DE" sz="1600" dirty="0">
-              <a:solidFill>
-                <a:schemeClr val="tx1"/>
-              </a:solidFill>
-            </a:endParaRPr>
           </a:p>
         </p:txBody>
       </p:sp>
@@ -12778,7 +13006,7 @@
           <p:cNvPr id="59" name="Textfeld 58">
             <a:extLst>
               <a:ext uri="{FF2B5EF4-FFF2-40B4-BE49-F238E27FC236}">
-                <a16:creationId xmlns:a16="http://schemas.microsoft.com/office/drawing/2014/main" xmlns="" id="{672F2C52-F706-4C2C-9BA1-C4050D78BE85}"/>
+                <a16:creationId xmlns:a16="http://schemas.microsoft.com/office/drawing/2014/main" id="{672F2C52-F706-4C2C-9BA1-C4050D78BE85}"/>
               </a:ext>
             </a:extLst>
           </p:cNvPr>
@@ -12802,10 +13030,9 @@
           <a:lstStyle/>
           <a:p>
             <a:r>
-              <a:rPr lang="de-DE" sz="2400" dirty="0" smtClean="0"/>
+              <a:rPr lang="de-DE" sz="2400" dirty="0"/>
               <a:t>Schritt in Subsequenz</a:t>
             </a:r>
-            <a:endParaRPr lang="de-DE" sz="2400" dirty="0"/>
           </a:p>
         </p:txBody>
       </p:sp>
@@ -12814,7 +13041,7 @@
           <p:cNvPr id="60" name="Rechteck 59">
             <a:extLst>
               <a:ext uri="{FF2B5EF4-FFF2-40B4-BE49-F238E27FC236}">
-                <a16:creationId xmlns:a16="http://schemas.microsoft.com/office/drawing/2014/main" xmlns="" id="{32A3E22E-D260-4C45-BA90-93973AE9B3A5}"/>
+                <a16:creationId xmlns:a16="http://schemas.microsoft.com/office/drawing/2014/main" id="{32A3E22E-D260-4C45-BA90-93973AE9B3A5}"/>
               </a:ext>
             </a:extLst>
           </p:cNvPr>
@@ -12862,18 +13089,13 @@
           <a:p>
             <a:pPr algn="ctr"/>
             <a:r>
-              <a:rPr lang="de-DE" sz="1600" dirty="0" smtClean="0">
+              <a:rPr lang="de-DE" sz="1600" dirty="0">
                 <a:solidFill>
                   <a:schemeClr val="tx1"/>
                 </a:solidFill>
               </a:rPr>
               <a:t>5.4.1</a:t>
             </a:r>
-            <a:endParaRPr lang="de-DE" sz="1600" dirty="0">
-              <a:solidFill>
-                <a:schemeClr val="tx1"/>
-              </a:solidFill>
-            </a:endParaRPr>
           </a:p>
         </p:txBody>
       </p:sp>
@@ -12933,7 +13155,7 @@
           <p:cNvPr id="62" name="Rechteck 61">
             <a:extLst>
               <a:ext uri="{FF2B5EF4-FFF2-40B4-BE49-F238E27FC236}">
-                <a16:creationId xmlns:a16="http://schemas.microsoft.com/office/drawing/2014/main" xmlns="" id="{32A3E22E-D260-4C45-BA90-93973AE9B3A5}"/>
+                <a16:creationId xmlns:a16="http://schemas.microsoft.com/office/drawing/2014/main" id="{32A3E22E-D260-4C45-BA90-93973AE9B3A5}"/>
               </a:ext>
             </a:extLst>
           </p:cNvPr>
@@ -12981,18 +13203,13 @@
           <a:p>
             <a:pPr algn="ctr"/>
             <a:r>
-              <a:rPr lang="de-DE" sz="1600" dirty="0" smtClean="0">
+              <a:rPr lang="de-DE" sz="1600" dirty="0">
                 <a:solidFill>
                   <a:schemeClr val="tx1"/>
                 </a:solidFill>
               </a:rPr>
               <a:t>5.4.2</a:t>
             </a:r>
-            <a:endParaRPr lang="de-DE" sz="1600" dirty="0">
-              <a:solidFill>
-                <a:schemeClr val="tx1"/>
-              </a:solidFill>
-            </a:endParaRPr>
           </a:p>
         </p:txBody>
       </p:sp>
@@ -13001,7 +13218,7 @@
           <p:cNvPr id="63" name="Textfeld 62">
             <a:extLst>
               <a:ext uri="{FF2B5EF4-FFF2-40B4-BE49-F238E27FC236}">
-                <a16:creationId xmlns:a16="http://schemas.microsoft.com/office/drawing/2014/main" xmlns="" id="{672F2C52-F706-4C2C-9BA1-C4050D78BE85}"/>
+                <a16:creationId xmlns:a16="http://schemas.microsoft.com/office/drawing/2014/main" id="{672F2C52-F706-4C2C-9BA1-C4050D78BE85}"/>
               </a:ext>
             </a:extLst>
           </p:cNvPr>
@@ -13025,10 +13242,9 @@
           <a:lstStyle/>
           <a:p>
             <a:r>
-              <a:rPr lang="de-DE" sz="2400" dirty="0" smtClean="0"/>
+              <a:rPr lang="de-DE" sz="2400" dirty="0"/>
               <a:t>Letzter Schritt in Subsequenz</a:t>
             </a:r>
-            <a:endParaRPr lang="de-DE" sz="2400" dirty="0"/>
           </a:p>
         </p:txBody>
       </p:sp>
@@ -13055,14 +13271,9 @@
           <a:lstStyle/>
           <a:p>
             <a:r>
-              <a:rPr lang="de-DE" dirty="0" smtClean="0"/>
-              <a:t>Darstellung </a:t>
-            </a:r>
-            <a:r>
-              <a:rPr lang="de-DE" dirty="0" smtClean="0"/>
-              <a:t>mit umgeschalteter Darstellung für umgebende Schritte </a:t>
-            </a:r>
-            <a:endParaRPr lang="de-DE" dirty="0"/>
+              <a:rPr lang="de-DE" dirty="0"/>
+              <a:t>Darstellung mit umgeschalteter Darstellung für umgebende Schritte </a:t>
+            </a:r>
           </a:p>
         </p:txBody>
       </p:sp>
@@ -13121,7 +13332,7 @@
           <p:cNvPr id="66" name="Textfeld 65">
             <a:extLst>
               <a:ext uri="{FF2B5EF4-FFF2-40B4-BE49-F238E27FC236}">
-                <a16:creationId xmlns:a16="http://schemas.microsoft.com/office/drawing/2014/main" xmlns="" id="{672F2C52-F706-4C2C-9BA1-C4050D78BE85}"/>
+                <a16:creationId xmlns:a16="http://schemas.microsoft.com/office/drawing/2014/main" id="{672F2C52-F706-4C2C-9BA1-C4050D78BE85}"/>
               </a:ext>
             </a:extLst>
           </p:cNvPr>
@@ -13145,10 +13356,9 @@
           <a:lstStyle/>
           <a:p>
             <a:r>
-              <a:rPr lang="de-DE" sz="2400" dirty="0" smtClean="0"/>
+              <a:rPr lang="de-DE" sz="2400" dirty="0"/>
               <a:t>Schritt zwischen Subsequenzen</a:t>
             </a:r>
-            <a:endParaRPr lang="de-DE" sz="2400" dirty="0"/>
           </a:p>
         </p:txBody>
       </p:sp>
@@ -13214,7 +13424,7 @@
           <p:cNvPr id="70" name="Rechteck 69">
             <a:extLst>
               <a:ext uri="{FF2B5EF4-FFF2-40B4-BE49-F238E27FC236}">
-                <a16:creationId xmlns:a16="http://schemas.microsoft.com/office/drawing/2014/main" xmlns="" id="{32A3E22E-D260-4C45-BA90-93973AE9B3A5}"/>
+                <a16:creationId xmlns:a16="http://schemas.microsoft.com/office/drawing/2014/main" id="{32A3E22E-D260-4C45-BA90-93973AE9B3A5}"/>
               </a:ext>
             </a:extLst>
           </p:cNvPr>
@@ -13262,18 +13472,13 @@
           <a:p>
             <a:pPr algn="ctr"/>
             <a:r>
-              <a:rPr lang="de-DE" sz="1600" dirty="0" smtClean="0">
+              <a:rPr lang="de-DE" sz="1600" dirty="0">
                 <a:solidFill>
                   <a:schemeClr val="tx1"/>
                 </a:solidFill>
               </a:rPr>
               <a:t>5.3</a:t>
             </a:r>
-            <a:endParaRPr lang="de-DE" sz="1600" dirty="0">
-              <a:solidFill>
-                <a:schemeClr val="tx1"/>
-              </a:solidFill>
-            </a:endParaRPr>
           </a:p>
         </p:txBody>
       </p:sp>
@@ -13389,7 +13594,7 @@
           <p:cNvPr id="74" name="Rechteck 73">
             <a:extLst>
               <a:ext uri="{FF2B5EF4-FFF2-40B4-BE49-F238E27FC236}">
-                <a16:creationId xmlns:a16="http://schemas.microsoft.com/office/drawing/2014/main" xmlns="" id="{32A3E22E-D260-4C45-BA90-93973AE9B3A5}"/>
+                <a16:creationId xmlns:a16="http://schemas.microsoft.com/office/drawing/2014/main" id="{32A3E22E-D260-4C45-BA90-93973AE9B3A5}"/>
               </a:ext>
             </a:extLst>
           </p:cNvPr>
@@ -13437,18 +13642,13 @@
           <a:p>
             <a:pPr algn="ctr"/>
             <a:r>
-              <a:rPr lang="de-DE" sz="1600" dirty="0" smtClean="0">
+              <a:rPr lang="de-DE" sz="1600" dirty="0">
                 <a:solidFill>
                   <a:schemeClr val="tx1"/>
                 </a:solidFill>
               </a:rPr>
               <a:t>5.3</a:t>
             </a:r>
-            <a:endParaRPr lang="de-DE" sz="1600" dirty="0">
-              <a:solidFill>
-                <a:schemeClr val="tx1"/>
-              </a:solidFill>
-            </a:endParaRPr>
           </a:p>
         </p:txBody>
       </p:sp>
@@ -13564,7 +13764,7 @@
           <p:cNvPr id="78" name="Rechteck 77">
             <a:extLst>
               <a:ext uri="{FF2B5EF4-FFF2-40B4-BE49-F238E27FC236}">
-                <a16:creationId xmlns:a16="http://schemas.microsoft.com/office/drawing/2014/main" xmlns="" id="{32A3E22E-D260-4C45-BA90-93973AE9B3A5}"/>
+                <a16:creationId xmlns:a16="http://schemas.microsoft.com/office/drawing/2014/main" id="{32A3E22E-D260-4C45-BA90-93973AE9B3A5}"/>
               </a:ext>
             </a:extLst>
           </p:cNvPr>
@@ -13612,18 +13812,13 @@
           <a:p>
             <a:pPr algn="ctr"/>
             <a:r>
-              <a:rPr lang="de-DE" sz="1600" dirty="0" smtClean="0">
+              <a:rPr lang="de-DE" sz="1600" dirty="0">
                 <a:solidFill>
                   <a:schemeClr val="tx1"/>
                 </a:solidFill>
               </a:rPr>
               <a:t>5.5</a:t>
             </a:r>
-            <a:endParaRPr lang="de-DE" sz="1600" dirty="0">
-              <a:solidFill>
-                <a:schemeClr val="tx1"/>
-              </a:solidFill>
-            </a:endParaRPr>
           </a:p>
         </p:txBody>
       </p:sp>
@@ -13632,7 +13827,7 @@
           <p:cNvPr id="40" name="Textfeld 39">
             <a:extLst>
               <a:ext uri="{FF2B5EF4-FFF2-40B4-BE49-F238E27FC236}">
-                <a16:creationId xmlns:a16="http://schemas.microsoft.com/office/drawing/2014/main" xmlns="" id="{672F2C52-F706-4C2C-9BA1-C4050D78BE85}"/>
+                <a16:creationId xmlns:a16="http://schemas.microsoft.com/office/drawing/2014/main" id="{672F2C52-F706-4C2C-9BA1-C4050D78BE85}"/>
               </a:ext>
             </a:extLst>
           </p:cNvPr>
@@ -13656,14 +13851,9 @@
           <a:lstStyle/>
           <a:p>
             <a:r>
-              <a:rPr lang="de-DE" sz="2400" dirty="0" smtClean="0"/>
-              <a:t>Nachfolgeschritt, gleiche </a:t>
-            </a:r>
-            <a:r>
-              <a:rPr lang="de-DE" sz="2400" dirty="0" smtClean="0"/>
-              <a:t>Sequenz</a:t>
-            </a:r>
-            <a:endParaRPr lang="de-DE" sz="2400" dirty="0"/>
+              <a:rPr lang="de-DE" sz="2400" dirty="0"/>
+              <a:t>Nachfolgeschritt, gleiche Sequenz</a:t>
+            </a:r>
           </a:p>
         </p:txBody>
       </p:sp>
@@ -13672,7 +13862,7 @@
           <p:cNvPr id="36" name="Textfeld 35">
             <a:extLst>
               <a:ext uri="{FF2B5EF4-FFF2-40B4-BE49-F238E27FC236}">
-                <a16:creationId xmlns:a16="http://schemas.microsoft.com/office/drawing/2014/main" xmlns="" id="{672F2C52-F706-4C2C-9BA1-C4050D78BE85}"/>
+                <a16:creationId xmlns:a16="http://schemas.microsoft.com/office/drawing/2014/main" id="{672F2C52-F706-4C2C-9BA1-C4050D78BE85}"/>
               </a:ext>
             </a:extLst>
           </p:cNvPr>
@@ -13696,14 +13886,9 @@
           <a:lstStyle/>
           <a:p>
             <a:r>
-              <a:rPr lang="de-DE" sz="2400" dirty="0" smtClean="0"/>
-              <a:t>Vorgängerschritt, gleiche </a:t>
-            </a:r>
-            <a:r>
-              <a:rPr lang="de-DE" sz="2400" dirty="0" smtClean="0"/>
-              <a:t>Sequenz</a:t>
-            </a:r>
-            <a:endParaRPr lang="de-DE" sz="2400" dirty="0"/>
+              <a:rPr lang="de-DE" sz="2400" dirty="0"/>
+              <a:t>Vorgängerschritt, gleiche Sequenz</a:t>
+            </a:r>
           </a:p>
         </p:txBody>
       </p:sp>
@@ -13730,12 +13915,12 @@
           <a:lstStyle/>
           <a:p>
             <a:r>
-              <a:rPr lang="de-DE" sz="2800" dirty="0" smtClean="0"/>
+              <a:rPr lang="de-DE" sz="2800" dirty="0"/>
               <a:t>Vorschlag zur Verallgemeinerung des Konzepts:</a:t>
             </a:r>
           </a:p>
           <a:p>
-            <a:endParaRPr lang="de-DE" sz="2800" dirty="0" smtClean="0"/>
+            <a:endParaRPr lang="de-DE" sz="2800" dirty="0"/>
           </a:p>
           <a:p>
             <a:pPr marL="457200" indent="-457200">
@@ -13743,7 +13928,7 @@
               <a:buChar char="•"/>
             </a:pPr>
             <a:r>
-              <a:rPr lang="de-DE" sz="2800" dirty="0" smtClean="0"/>
+              <a:rPr lang="de-DE" sz="2800" dirty="0"/>
               <a:t>Abgesetzte Darstellung ist nur Default für Subsequenzen</a:t>
             </a:r>
           </a:p>
@@ -13752,7 +13937,7 @@
               <a:buFont typeface="Arial" panose="020B0604020202020204" pitchFamily="34" charset="0"/>
               <a:buChar char="•"/>
             </a:pPr>
-            <a:endParaRPr lang="de-DE" sz="2800" dirty="0" smtClean="0"/>
+            <a:endParaRPr lang="de-DE" sz="2800" dirty="0"/>
           </a:p>
           <a:p>
             <a:pPr marL="457200" indent="-457200">
@@ -13760,10 +13945,9 @@
               <a:buChar char="•"/>
             </a:pPr>
             <a:r>
-              <a:rPr lang="de-DE" sz="2800" dirty="0" smtClean="0"/>
+              <a:rPr lang="de-DE" sz="2800" dirty="0"/>
               <a:t>Jeder Schritt kann auf diese oder die klassische Anzeige umgestellt werden</a:t>
             </a:r>
-            <a:endParaRPr lang="de-DE" sz="2800" dirty="0"/>
           </a:p>
         </p:txBody>
       </p:sp>
@@ -13821,13 +14005,8 @@
           <a:p>
             <a:r>
               <a:rPr lang="de-DE" dirty="0"/>
-              <a:t>A</a:t>
-            </a:r>
-            <a:r>
-              <a:rPr lang="de-DE" dirty="0" smtClean="0"/>
-              <a:t>bgesetzte Subsequenz(en) im Änderungsmodus - neu / gelöscht / bestehend</a:t>
-            </a:r>
-            <a:endParaRPr lang="de-DE" dirty="0"/>
+              <a:t>Abgesetzte Subsequenz(en) im Änderungsmodus - neu / gelöscht / bestehend</a:t>
+            </a:r>
           </a:p>
         </p:txBody>
       </p:sp>
@@ -13854,33 +14033,32 @@
           <a:lstStyle/>
           <a:p>
             <a:r>
-              <a:rPr lang="de-DE" sz="2400" dirty="0" err="1" smtClean="0"/>
+              <a:rPr lang="de-DE" sz="2400" dirty="0" err="1"/>
               <a:t>To</a:t>
             </a:r>
             <a:r>
-              <a:rPr lang="de-DE" sz="2400" dirty="0" smtClean="0"/>
+              <a:rPr lang="de-DE" sz="2400" dirty="0"/>
               <a:t> </a:t>
             </a:r>
             <a:r>
-              <a:rPr lang="de-DE" sz="2400" dirty="0" err="1" smtClean="0"/>
+              <a:rPr lang="de-DE" sz="2400" dirty="0" err="1"/>
               <a:t>be</a:t>
             </a:r>
             <a:r>
-              <a:rPr lang="de-DE" sz="2400" dirty="0" smtClean="0"/>
+              <a:rPr lang="de-DE" sz="2400" dirty="0"/>
               <a:t> </a:t>
             </a:r>
             <a:r>
-              <a:rPr lang="de-DE" sz="2400" dirty="0" err="1" smtClean="0"/>
+              <a:rPr lang="de-DE" sz="2400" dirty="0" err="1"/>
               <a:t>defined</a:t>
             </a:r>
-            <a:endParaRPr lang="de-DE" sz="2400" dirty="0" smtClean="0"/>
-          </a:p>
-          <a:p>
-            <a:r>
-              <a:rPr lang="de-DE" sz="2400" dirty="0" smtClean="0"/>
+            <a:endParaRPr lang="de-DE" sz="2400" dirty="0"/>
+          </a:p>
+          <a:p>
+            <a:r>
+              <a:rPr lang="de-DE" sz="2400" dirty="0"/>
               <a:t>Inter-Team-Abstimmung erforderlich</a:t>
             </a:r>
-            <a:endParaRPr lang="de-DE" sz="2400" dirty="0"/>
           </a:p>
         </p:txBody>
       </p:sp>

</xml_diff>

<commit_message>
Quelle für Schrittverschiebung mit Hintergrundfarbe
</commit_message>
<xml_diff>
--- a/specifications/specman-layouts.pptx
+++ b/specifications/specman-layouts.pptx
@@ -7255,7 +7255,7 @@
             <a:avLst/>
           </a:prstGeom>
           <a:solidFill>
-            <a:schemeClr val="bg1"/>
+            <a:srgbClr val="FFFF99"/>
           </a:solidFill>
           <a:ln w="19050">
             <a:solidFill>
@@ -7284,7 +7284,11 @@
           <a:lstStyle/>
           <a:p>
             <a:pPr algn="ctr"/>
-            <a:endParaRPr lang="de-DE"/>
+            <a:endParaRPr lang="de-DE" dirty="0">
+              <a:highlight>
+                <a:srgbClr val="FFFF99"/>
+              </a:highlight>
+            </a:endParaRPr>
           </a:p>
         </p:txBody>
       </p:sp>
@@ -7398,7 +7402,7 @@
         </p:nvSpPr>
         <p:spPr>
           <a:xfrm flipH="1">
-            <a:off x="1390650" y="6179596"/>
+            <a:off x="1374000" y="6181332"/>
             <a:ext cx="8134349" cy="307777"/>
           </a:xfrm>
           <a:prstGeom prst="rect">

</xml_diff>